<commit_message>
[403_03] Sửa lại format ppt
</commit_message>
<xml_diff>
--- a/KnowledgeSystem/AppResources/403_03_SurfaceRustHealth.pptx
+++ b/KnowledgeSystem/AppResources/403_03_SurfaceRustHealth.pptx
@@ -8,12 +8,12 @@
     <p:notesMasterId r:id="rId8"/>
   </p:notesMasterIdLst>
   <p:sldIdLst>
-    <p:sldId id="269" r:id="rId2"/>
-    <p:sldId id="275" r:id="rId3"/>
+    <p:sldId id="274" r:id="rId2"/>
+    <p:sldId id="269" r:id="rId3"/>
     <p:sldId id="273" r:id="rId4"/>
-    <p:sldId id="276" r:id="rId5"/>
-    <p:sldId id="274" r:id="rId6"/>
-    <p:sldId id="277" r:id="rId7"/>
+    <p:sldId id="277" r:id="rId5"/>
+    <p:sldId id="278" r:id="rId6"/>
+    <p:sldId id="279" r:id="rId7"/>
   </p:sldIdLst>
   <p:sldSz cx="12192000" cy="6858000"/>
   <p:notesSz cx="6858000" cy="9144000"/>
@@ -202,7 +202,7 @@
           <a:p>
             <a:fld id="{1C940E6E-64BF-49C8-A610-7930AC81B279}" type="datetimeFigureOut">
               <a:rPr lang="en-US" smtClean="0"/>
-              <a:t>2025/05/17</a:t>
+              <a:t>2025/05/22</a:t>
             </a:fld>
             <a:endParaRPr lang="en-US"/>
           </a:p>
@@ -525,7 +525,7 @@
     </p:spTree>
     <p:extLst>
       <p:ext uri="{BB962C8B-B14F-4D97-AF65-F5344CB8AC3E}">
-        <p14:creationId xmlns:p14="http://schemas.microsoft.com/office/powerpoint/2010/main" val="2813935764"/>
+        <p14:creationId xmlns:p14="http://schemas.microsoft.com/office/powerpoint/2010/main" val="1444729550"/>
       </p:ext>
     </p:extLst>
   </p:cSld>
@@ -591,7 +591,7 @@
     </p:spTree>
     <p:extLst>
       <p:ext uri="{BB962C8B-B14F-4D97-AF65-F5344CB8AC3E}">
-        <p14:creationId xmlns:p14="http://schemas.microsoft.com/office/powerpoint/2010/main" val="2662781293"/>
+        <p14:creationId xmlns:p14="http://schemas.microsoft.com/office/powerpoint/2010/main" val="2813935764"/>
       </p:ext>
     </p:extLst>
   </p:cSld>
@@ -723,7 +723,7 @@
     </p:spTree>
     <p:extLst>
       <p:ext uri="{BB962C8B-B14F-4D97-AF65-F5344CB8AC3E}">
-        <p14:creationId xmlns:p14="http://schemas.microsoft.com/office/powerpoint/2010/main" val="454133062"/>
+        <p14:creationId xmlns:p14="http://schemas.microsoft.com/office/powerpoint/2010/main" val="2517935655"/>
       </p:ext>
     </p:extLst>
   </p:cSld>
@@ -789,7 +789,7 @@
     </p:spTree>
     <p:extLst>
       <p:ext uri="{BB962C8B-B14F-4D97-AF65-F5344CB8AC3E}">
-        <p14:creationId xmlns:p14="http://schemas.microsoft.com/office/powerpoint/2010/main" val="1444729550"/>
+        <p14:creationId xmlns:p14="http://schemas.microsoft.com/office/powerpoint/2010/main" val="348799873"/>
       </p:ext>
     </p:extLst>
   </p:cSld>
@@ -855,7 +855,7 @@
     </p:spTree>
     <p:extLst>
       <p:ext uri="{BB962C8B-B14F-4D97-AF65-F5344CB8AC3E}">
-        <p14:creationId xmlns:p14="http://schemas.microsoft.com/office/powerpoint/2010/main" val="2517935655"/>
+        <p14:creationId xmlns:p14="http://schemas.microsoft.com/office/powerpoint/2010/main" val="4293506734"/>
       </p:ext>
     </p:extLst>
   </p:cSld>
@@ -1012,7 +1012,7 @@
           <a:p>
             <a:fld id="{06215139-CAC5-4AD9-98A4-100E1C427056}" type="datetimeFigureOut">
               <a:rPr lang="en-US" smtClean="0"/>
-              <a:t>2025/05/17</a:t>
+              <a:t>2025/05/22</a:t>
             </a:fld>
             <a:endParaRPr lang="en-US"/>
           </a:p>
@@ -1210,7 +1210,7 @@
           <a:p>
             <a:fld id="{06215139-CAC5-4AD9-98A4-100E1C427056}" type="datetimeFigureOut">
               <a:rPr lang="en-US" smtClean="0"/>
-              <a:t>2025/05/17</a:t>
+              <a:t>2025/05/22</a:t>
             </a:fld>
             <a:endParaRPr lang="en-US"/>
           </a:p>
@@ -1418,7 +1418,7 @@
           <a:p>
             <a:fld id="{06215139-CAC5-4AD9-98A4-100E1C427056}" type="datetimeFigureOut">
               <a:rPr lang="en-US" smtClean="0"/>
-              <a:t>2025/05/17</a:t>
+              <a:t>2025/05/22</a:t>
             </a:fld>
             <a:endParaRPr lang="en-US"/>
           </a:p>
@@ -1616,7 +1616,7 @@
           <a:p>
             <a:fld id="{06215139-CAC5-4AD9-98A4-100E1C427056}" type="datetimeFigureOut">
               <a:rPr lang="en-US" smtClean="0"/>
-              <a:t>2025/05/17</a:t>
+              <a:t>2025/05/22</a:t>
             </a:fld>
             <a:endParaRPr lang="en-US"/>
           </a:p>
@@ -1891,7 +1891,7 @@
           <a:p>
             <a:fld id="{06215139-CAC5-4AD9-98A4-100E1C427056}" type="datetimeFigureOut">
               <a:rPr lang="en-US" smtClean="0"/>
-              <a:t>2025/05/17</a:t>
+              <a:t>2025/05/22</a:t>
             </a:fld>
             <a:endParaRPr lang="en-US"/>
           </a:p>
@@ -2156,7 +2156,7 @@
           <a:p>
             <a:fld id="{06215139-CAC5-4AD9-98A4-100E1C427056}" type="datetimeFigureOut">
               <a:rPr lang="en-US" smtClean="0"/>
-              <a:t>2025/05/17</a:t>
+              <a:t>2025/05/22</a:t>
             </a:fld>
             <a:endParaRPr lang="en-US"/>
           </a:p>
@@ -2568,7 +2568,7 @@
           <a:p>
             <a:fld id="{06215139-CAC5-4AD9-98A4-100E1C427056}" type="datetimeFigureOut">
               <a:rPr lang="en-US" smtClean="0"/>
-              <a:t>2025/05/17</a:t>
+              <a:t>2025/05/22</a:t>
             </a:fld>
             <a:endParaRPr lang="en-US"/>
           </a:p>
@@ -2709,7 +2709,7 @@
           <a:p>
             <a:fld id="{06215139-CAC5-4AD9-98A4-100E1C427056}" type="datetimeFigureOut">
               <a:rPr lang="en-US" smtClean="0"/>
-              <a:t>2025/05/17</a:t>
+              <a:t>2025/05/22</a:t>
             </a:fld>
             <a:endParaRPr lang="en-US"/>
           </a:p>
@@ -2822,7 +2822,7 @@
           <a:p>
             <a:fld id="{06215139-CAC5-4AD9-98A4-100E1C427056}" type="datetimeFigureOut">
               <a:rPr lang="en-US" smtClean="0"/>
-              <a:t>2025/05/17</a:t>
+              <a:t>2025/05/22</a:t>
             </a:fld>
             <a:endParaRPr lang="en-US"/>
           </a:p>
@@ -3133,7 +3133,7 @@
           <a:p>
             <a:fld id="{06215139-CAC5-4AD9-98A4-100E1C427056}" type="datetimeFigureOut">
               <a:rPr lang="en-US" smtClean="0"/>
-              <a:t>2025/05/17</a:t>
+              <a:t>2025/05/22</a:t>
             </a:fld>
             <a:endParaRPr lang="en-US"/>
           </a:p>
@@ -3421,7 +3421,7 @@
           <a:p>
             <a:fld id="{06215139-CAC5-4AD9-98A4-100E1C427056}" type="datetimeFigureOut">
               <a:rPr lang="en-US" smtClean="0"/>
-              <a:t>2025/05/17</a:t>
+              <a:t>2025/05/22</a:t>
             </a:fld>
             <a:endParaRPr lang="en-US"/>
           </a:p>
@@ -3662,7 +3662,7 @@
           <a:p>
             <a:fld id="{06215139-CAC5-4AD9-98A4-100E1C427056}" type="datetimeFigureOut">
               <a:rPr lang="en-US" smtClean="0"/>
-              <a:t>2025/05/17</a:t>
+              <a:t>2025/05/22</a:t>
             </a:fld>
             <a:endParaRPr lang="en-US"/>
           </a:p>
@@ -4228,14 +4228,14 @@
           <p:nvPr>
             <p:extLst>
               <p:ext uri="{D42A27DB-BD31-4B8C-83A1-F6EECF244321}">
-                <p14:modId xmlns:p14="http://schemas.microsoft.com/office/powerpoint/2010/main" val="2513225803"/>
+                <p14:modId xmlns:p14="http://schemas.microsoft.com/office/powerpoint/2010/main" val="392838083"/>
               </p:ext>
             </p:extLst>
           </p:nvPr>
         </p:nvGraphicFramePr>
         <p:xfrm>
-          <a:off x="29029" y="573948"/>
-          <a:ext cx="11887198" cy="6163047"/>
+          <a:off x="136609" y="573948"/>
+          <a:ext cx="11887201" cy="6163047"/>
         </p:xfrm>
         <a:graphic>
           <a:graphicData uri="http://schemas.openxmlformats.org/drawingml/2006/table">
@@ -4258,21 +4258,21 @@
                     </a:ext>
                   </a:extLst>
                 </a:gridCol>
-                <a:gridCol w="3425371">
+                <a:gridCol w="3425372">
                   <a:extLst>
                     <a:ext uri="{9D8B030D-6E8A-4147-A177-3AD203B41FA5}">
                       <a16:colId xmlns:a16="http://schemas.microsoft.com/office/drawing/2014/main" val="20002"/>
                     </a:ext>
                   </a:extLst>
                 </a:gridCol>
-                <a:gridCol w="3425371">
+                <a:gridCol w="3425372">
                   <a:extLst>
                     <a:ext uri="{9D8B030D-6E8A-4147-A177-3AD203B41FA5}">
                       <a16:colId xmlns:a16="http://schemas.microsoft.com/office/drawing/2014/main" val="20003"/>
                     </a:ext>
                   </a:extLst>
                 </a:gridCol>
-                <a:gridCol w="3425371">
+                <a:gridCol w="3425372">
                   <a:extLst>
                     <a:ext uri="{9D8B030D-6E8A-4147-A177-3AD203B41FA5}">
                       <a16:colId xmlns:a16="http://schemas.microsoft.com/office/drawing/2014/main" val="20004"/>
@@ -4321,36 +4321,20 @@
                     <a:p>
                       <a:pPr algn="ctr"/>
                       <a:r>
-                        <a:rPr lang="zh-CN" altLang="en-US" b="1" dirty="0">
-                          <a:latin typeface="Times New Roman" panose="02020603050405020304" pitchFamily="18" charset="0"/>
-                          <a:ea typeface="標楷體" panose="03000509000000000000" pitchFamily="65" charset="-120"/>
-                          <a:cs typeface="Times New Roman" panose="02020603050405020304" pitchFamily="18" charset="0"/>
-                        </a:rPr>
-                        <a:t>銹皮厚度</a:t>
-                      </a:r>
-                      <a:r>
-                        <a:rPr lang="zh-TW" altLang="en-US" b="1" dirty="0">
-                          <a:latin typeface="Times New Roman" panose="02020603050405020304" pitchFamily="18" charset="0"/>
-                          <a:ea typeface="標楷體" panose="03000509000000000000" pitchFamily="65" charset="-120"/>
-                          <a:cs typeface="Times New Roman" panose="02020603050405020304" pitchFamily="18" charset="0"/>
-                        </a:rPr>
-                        <a:t>量測</a:t>
-                      </a:r>
-                      <a:r>
-                        <a:rPr lang="zh-CN" altLang="en-US" b="1" dirty="0">
-                          <a:latin typeface="Times New Roman" panose="02020603050405020304" pitchFamily="18" charset="0"/>
-                          <a:ea typeface="標楷體" panose="03000509000000000000" pitchFamily="65" charset="-120"/>
-                          <a:cs typeface="Times New Roman" panose="02020603050405020304" pitchFamily="18" charset="0"/>
-                        </a:rPr>
-                        <a:t>及硬度</a:t>
-                      </a:r>
-                      <a:r>
-                        <a:rPr lang="zh-TW" altLang="en-US" b="1" dirty="0">
-                          <a:latin typeface="Times New Roman" panose="02020603050405020304" pitchFamily="18" charset="0"/>
-                          <a:ea typeface="標楷體" panose="03000509000000000000" pitchFamily="65" charset="-120"/>
-                          <a:cs typeface="Times New Roman" panose="02020603050405020304" pitchFamily="18" charset="0"/>
-                        </a:rPr>
-                        <a:t>試驗</a:t>
+                        <a:rPr lang="en-US" altLang="zh-CN" b="1">
+                          <a:latin typeface="Times New Roman" panose="02020603050405020304" pitchFamily="18" charset="0"/>
+                          <a:ea typeface="標楷體" panose="03000509000000000000" pitchFamily="65" charset="-120"/>
+                          <a:cs typeface="Times New Roman" panose="02020603050405020304" pitchFamily="18" charset="0"/>
+                        </a:rPr>
+                        <a:t>XRD</a:t>
+                      </a:r>
+                      <a:r>
+                        <a:rPr lang="zh-CN" altLang="en-US" b="1">
+                          <a:latin typeface="Times New Roman" panose="02020603050405020304" pitchFamily="18" charset="0"/>
+                          <a:ea typeface="標楷體" panose="03000509000000000000" pitchFamily="65" charset="-120"/>
+                          <a:cs typeface="Times New Roman" panose="02020603050405020304" pitchFamily="18" charset="0"/>
+                        </a:rPr>
+                        <a:t>表面分析</a:t>
                       </a:r>
                     </a:p>
                   </a:txBody>
@@ -4541,8 +4525,8 @@
                   </a:ext>
                 </a:extLst>
               </a:tr>
-              <a:tr h="1946567">
-                <a:tc rowSpan="3">
+              <a:tr h="2678087">
+                <a:tc>
                   <a:txBody>
                     <a:bodyPr/>
                     <a:lstStyle/>
@@ -4679,346 +4663,8 @@
                   </a:ext>
                 </a:extLst>
               </a:tr>
-              <a:tr h="365760">
-                <a:tc vMerge="1">
-                  <a:txBody>
-                    <a:bodyPr/>
-                    <a:lstStyle/>
-                    <a:p>
-                      <a:pPr marL="0" marR="0" indent="0" algn="ctr" defTabSz="914400" rtl="0" eaLnBrk="1" fontAlgn="auto" latinLnBrk="0" hangingPunct="1">
-                        <a:lnSpc>
-                          <a:spcPct val="100000"/>
-                        </a:lnSpc>
-                        <a:spcBef>
-                          <a:spcPts val="0"/>
-                        </a:spcBef>
-                        <a:spcAft>
-                          <a:spcPts val="0"/>
-                        </a:spcAft>
-                        <a:buClrTx/>
-                        <a:buSzTx/>
-                        <a:buFontTx/>
-                        <a:buNone/>
-                        <a:tabLst/>
-                        <a:defRPr/>
-                      </a:pPr>
-                      <a:endParaRPr lang="zh-TW" altLang="en-US" dirty="0">
-                        <a:latin typeface="Times New Roman" panose="02020603050405020304" pitchFamily="18" charset="0"/>
-                        <a:ea typeface="標楷體" panose="03000509000000000000" pitchFamily="65" charset="-120"/>
-                        <a:cs typeface="Times New Roman" panose="02020603050405020304" pitchFamily="18" charset="0"/>
-                      </a:endParaRPr>
-                    </a:p>
-                  </a:txBody>
-                  <a:tcPr anchor="ctr"/>
-                </a:tc>
-                <a:tc>
-                  <a:txBody>
-                    <a:bodyPr/>
-                    <a:lstStyle/>
-                    <a:p>
-                      <a:r>
-                        <a:rPr lang="zh-CN" altLang="en-US" dirty="0">
-                          <a:latin typeface="Times New Roman" panose="02020603050405020304" pitchFamily="18" charset="0"/>
-                          <a:ea typeface="標楷體" panose="03000509000000000000" pitchFamily="65" charset="-120"/>
-                          <a:cs typeface="Times New Roman" panose="02020603050405020304" pitchFamily="18" charset="0"/>
-                        </a:rPr>
-                        <a:t>厚度</a:t>
-                      </a:r>
-                      <a:r>
-                        <a:rPr lang="en-US" altLang="zh-CN" dirty="0">
-                          <a:latin typeface="Times New Roman" panose="02020603050405020304" pitchFamily="18" charset="0"/>
-                          <a:ea typeface="標楷體" panose="03000509000000000000" pitchFamily="65" charset="-120"/>
-                          <a:cs typeface="Times New Roman" panose="02020603050405020304" pitchFamily="18" charset="0"/>
-                        </a:rPr>
-                        <a:t>(</a:t>
-                      </a:r>
-                      <a:r>
-                        <a:rPr lang="en-US" altLang="zh-CN" dirty="0" err="1">
-                          <a:latin typeface="Times New Roman" panose="02020603050405020304" pitchFamily="18" charset="0"/>
-                          <a:ea typeface="標楷體" panose="03000509000000000000" pitchFamily="65" charset="-120"/>
-                          <a:cs typeface="Times New Roman" panose="02020603050405020304" pitchFamily="18" charset="0"/>
-                        </a:rPr>
-                        <a:t>μm</a:t>
-                      </a:r>
-                      <a:r>
-                        <a:rPr lang="en-US" altLang="zh-CN" dirty="0">
-                          <a:latin typeface="Times New Roman" panose="02020603050405020304" pitchFamily="18" charset="0"/>
-                          <a:ea typeface="標楷體" panose="03000509000000000000" pitchFamily="65" charset="-120"/>
-                          <a:cs typeface="Times New Roman" panose="02020603050405020304" pitchFamily="18" charset="0"/>
-                        </a:rPr>
-                        <a:t>)</a:t>
-                      </a:r>
-                      <a:endParaRPr lang="zh-TW" altLang="en-US" dirty="0">
-                        <a:latin typeface="Times New Roman" panose="02020603050405020304" pitchFamily="18" charset="0"/>
-                        <a:ea typeface="標楷體" panose="03000509000000000000" pitchFamily="65" charset="-120"/>
-                        <a:cs typeface="Times New Roman" panose="02020603050405020304" pitchFamily="18" charset="0"/>
-                      </a:endParaRPr>
-                    </a:p>
-                  </a:txBody>
-                  <a:tcPr anchor="ctr"/>
-                </a:tc>
-                <a:tc>
-                  <a:txBody>
-                    <a:bodyPr/>
-                    <a:lstStyle/>
-                    <a:p>
-                      <a:pPr marL="0" marR="0" indent="0" algn="ctr" defTabSz="914400" rtl="0" eaLnBrk="1" fontAlgn="auto" latinLnBrk="0" hangingPunct="1">
-                        <a:lnSpc>
-                          <a:spcPct val="100000"/>
-                        </a:lnSpc>
-                        <a:spcBef>
-                          <a:spcPts val="0"/>
-                        </a:spcBef>
-                        <a:spcAft>
-                          <a:spcPts val="0"/>
-                        </a:spcAft>
-                        <a:buClrTx/>
-                        <a:buSzTx/>
-                        <a:buFontTx/>
-                        <a:buNone/>
-                        <a:tabLst/>
-                        <a:defRPr/>
-                      </a:pPr>
-                      <a:r>
-                        <a:rPr lang="en-US" altLang="zh-CN">
-                          <a:latin typeface="Times New Roman" panose="02020603050405020304" pitchFamily="18" charset="0"/>
-                          <a:ea typeface="標楷體" panose="03000509000000000000" pitchFamily="65" charset="-120"/>
-                          <a:cs typeface="Times New Roman" panose="02020603050405020304" pitchFamily="18" charset="0"/>
-                        </a:rPr>
-                        <a:t>T0-1μm</a:t>
-                      </a:r>
-                      <a:endParaRPr lang="zh-TW" altLang="en-US" dirty="0">
-                        <a:latin typeface="Times New Roman" panose="02020603050405020304" pitchFamily="18" charset="0"/>
-                        <a:ea typeface="標楷體" panose="03000509000000000000" pitchFamily="65" charset="-120"/>
-                        <a:cs typeface="Times New Roman" panose="02020603050405020304" pitchFamily="18" charset="0"/>
-                      </a:endParaRPr>
-                    </a:p>
-                  </a:txBody>
-                  <a:tcPr anchor="ctr"/>
-                </a:tc>
-                <a:tc>
-                  <a:txBody>
-                    <a:bodyPr/>
-                    <a:lstStyle/>
-                    <a:p>
-                      <a:pPr marL="0" marR="0" indent="0" algn="ctr" defTabSz="914400" rtl="0" eaLnBrk="1" fontAlgn="auto" latinLnBrk="0" hangingPunct="1">
-                        <a:lnSpc>
-                          <a:spcPct val="100000"/>
-                        </a:lnSpc>
-                        <a:spcBef>
-                          <a:spcPts val="0"/>
-                        </a:spcBef>
-                        <a:spcAft>
-                          <a:spcPts val="0"/>
-                        </a:spcAft>
-                        <a:buClrTx/>
-                        <a:buSzTx/>
-                        <a:buFontTx/>
-                        <a:buNone/>
-                        <a:tabLst/>
-                        <a:defRPr/>
-                      </a:pPr>
-                      <a:r>
-                        <a:rPr lang="en-US" altLang="zh-CN">
-                          <a:latin typeface="Times New Roman" panose="02020603050405020304" pitchFamily="18" charset="0"/>
-                          <a:ea typeface="標楷體" panose="03000509000000000000" pitchFamily="65" charset="-120"/>
-                          <a:cs typeface="Times New Roman" panose="02020603050405020304" pitchFamily="18" charset="0"/>
-                        </a:rPr>
-                        <a:t>T1-1μm</a:t>
-                      </a:r>
-                      <a:endParaRPr lang="zh-TW" altLang="en-US" dirty="0">
-                        <a:latin typeface="Times New Roman" panose="02020603050405020304" pitchFamily="18" charset="0"/>
-                        <a:ea typeface="標楷體" panose="03000509000000000000" pitchFamily="65" charset="-120"/>
-                        <a:cs typeface="Times New Roman" panose="02020603050405020304" pitchFamily="18" charset="0"/>
-                      </a:endParaRPr>
-                    </a:p>
-                  </a:txBody>
-                  <a:tcPr anchor="ctr"/>
-                </a:tc>
-                <a:tc>
-                  <a:txBody>
-                    <a:bodyPr/>
-                    <a:lstStyle/>
-                    <a:p>
-                      <a:pPr marL="0" marR="0" indent="0" algn="ctr" defTabSz="914400" rtl="0" eaLnBrk="1" fontAlgn="auto" latinLnBrk="0" hangingPunct="1">
-                        <a:lnSpc>
-                          <a:spcPct val="100000"/>
-                        </a:lnSpc>
-                        <a:spcBef>
-                          <a:spcPts val="0"/>
-                        </a:spcBef>
-                        <a:spcAft>
-                          <a:spcPts val="0"/>
-                        </a:spcAft>
-                        <a:buClrTx/>
-                        <a:buSzTx/>
-                        <a:buFontTx/>
-                        <a:buNone/>
-                        <a:tabLst/>
-                        <a:defRPr/>
-                      </a:pPr>
-                      <a:r>
-                        <a:rPr lang="en-US" altLang="zh-CN">
-                          <a:latin typeface="Times New Roman" panose="02020603050405020304" pitchFamily="18" charset="0"/>
-                          <a:ea typeface="標楷體" panose="03000509000000000000" pitchFamily="65" charset="-120"/>
-                          <a:cs typeface="Times New Roman" panose="02020603050405020304" pitchFamily="18" charset="0"/>
-                        </a:rPr>
-                        <a:t>T2-1μm</a:t>
-                      </a:r>
-                      <a:endParaRPr lang="zh-TW" altLang="en-US" dirty="0">
-                        <a:latin typeface="Times New Roman" panose="02020603050405020304" pitchFamily="18" charset="0"/>
-                        <a:ea typeface="標楷體" panose="03000509000000000000" pitchFamily="65" charset="-120"/>
-                        <a:cs typeface="Times New Roman" panose="02020603050405020304" pitchFamily="18" charset="0"/>
-                      </a:endParaRPr>
-                    </a:p>
-                  </a:txBody>
-                  <a:tcPr anchor="ctr"/>
-                </a:tc>
-                <a:extLst>
-                  <a:ext uri="{0D108BD9-81ED-4DB2-BD59-A6C34878D82A}">
-                    <a16:rowId xmlns:a16="http://schemas.microsoft.com/office/drawing/2014/main" val="10003"/>
-                  </a:ext>
-                </a:extLst>
-              </a:tr>
-              <a:tr h="365760">
-                <a:tc vMerge="1">
-                  <a:txBody>
-                    <a:bodyPr/>
-                    <a:lstStyle/>
-                    <a:p>
-                      <a:pPr marL="0" marR="0" indent="0" algn="ctr" defTabSz="914400" rtl="0" eaLnBrk="1" fontAlgn="auto" latinLnBrk="0" hangingPunct="1">
-                        <a:lnSpc>
-                          <a:spcPct val="100000"/>
-                        </a:lnSpc>
-                        <a:spcBef>
-                          <a:spcPts val="0"/>
-                        </a:spcBef>
-                        <a:spcAft>
-                          <a:spcPts val="0"/>
-                        </a:spcAft>
-                        <a:buClrTx/>
-                        <a:buSzTx/>
-                        <a:buFontTx/>
-                        <a:buNone/>
-                        <a:tabLst/>
-                        <a:defRPr/>
-                      </a:pPr>
-                      <a:endParaRPr lang="zh-TW" altLang="en-US" dirty="0">
-                        <a:latin typeface="Times New Roman" panose="02020603050405020304" pitchFamily="18" charset="0"/>
-                        <a:ea typeface="標楷體" panose="03000509000000000000" pitchFamily="65" charset="-120"/>
-                        <a:cs typeface="Times New Roman" panose="02020603050405020304" pitchFamily="18" charset="0"/>
-                      </a:endParaRPr>
-                    </a:p>
-                  </a:txBody>
-                  <a:tcPr anchor="ctr"/>
-                </a:tc>
-                <a:tc>
-                  <a:txBody>
-                    <a:bodyPr/>
-                    <a:lstStyle/>
-                    <a:p>
-                      <a:r>
-                        <a:rPr lang="zh-CN" altLang="en-US" dirty="0">
-                          <a:latin typeface="Times New Roman" panose="02020603050405020304" pitchFamily="18" charset="0"/>
-                          <a:ea typeface="標楷體" panose="03000509000000000000" pitchFamily="65" charset="-120"/>
-                          <a:cs typeface="Times New Roman" panose="02020603050405020304" pitchFamily="18" charset="0"/>
-                        </a:rPr>
-                        <a:t>硬度</a:t>
-                      </a:r>
-                      <a:r>
-                        <a:rPr lang="en-US" altLang="zh-CN" dirty="0">
-                          <a:latin typeface="Times New Roman" panose="02020603050405020304" pitchFamily="18" charset="0"/>
-                          <a:ea typeface="標楷體" panose="03000509000000000000" pitchFamily="65" charset="-120"/>
-                          <a:cs typeface="Times New Roman" panose="02020603050405020304" pitchFamily="18" charset="0"/>
-                        </a:rPr>
-                        <a:t>(HV)</a:t>
-                      </a:r>
-                      <a:endParaRPr lang="zh-TW" altLang="en-US" dirty="0">
-                        <a:latin typeface="Times New Roman" panose="02020603050405020304" pitchFamily="18" charset="0"/>
-                        <a:ea typeface="標楷體" panose="03000509000000000000" pitchFamily="65" charset="-120"/>
-                        <a:cs typeface="Times New Roman" panose="02020603050405020304" pitchFamily="18" charset="0"/>
-                      </a:endParaRPr>
-                    </a:p>
-                  </a:txBody>
-                  <a:tcPr anchor="ctr"/>
-                </a:tc>
-                <a:tc>
-                  <a:txBody>
-                    <a:bodyPr/>
-                    <a:lstStyle/>
-                    <a:p>
-                      <a:pPr algn="ctr"/>
-                      <a:r>
-                        <a:rPr lang="en-US" altLang="zh-CN">
-                          <a:latin typeface="Times New Roman" panose="02020603050405020304" pitchFamily="18" charset="0"/>
-                          <a:ea typeface="標楷體" panose="03000509000000000000" pitchFamily="65" charset="-120"/>
-                          <a:cs typeface="Times New Roman" panose="02020603050405020304" pitchFamily="18" charset="0"/>
-                        </a:rPr>
-                        <a:t>T0-2</a:t>
-                      </a:r>
-                      <a:endParaRPr lang="zh-TW" altLang="en-US" dirty="0">
-                        <a:latin typeface="Times New Roman" panose="02020603050405020304" pitchFamily="18" charset="0"/>
-                        <a:ea typeface="標楷體" panose="03000509000000000000" pitchFamily="65" charset="-120"/>
-                        <a:cs typeface="Times New Roman" panose="02020603050405020304" pitchFamily="18" charset="0"/>
-                      </a:endParaRPr>
-                    </a:p>
-                  </a:txBody>
-                  <a:tcPr anchor="ctr"/>
-                </a:tc>
-                <a:tc>
-                  <a:txBody>
-                    <a:bodyPr/>
-                    <a:lstStyle/>
-                    <a:p>
-                      <a:pPr algn="ctr"/>
-                      <a:r>
-                        <a:rPr lang="en-US" altLang="zh-CN">
-                          <a:latin typeface="Times New Roman" panose="02020603050405020304" pitchFamily="18" charset="0"/>
-                          <a:ea typeface="標楷體" panose="03000509000000000000" pitchFamily="65" charset="-120"/>
-                          <a:cs typeface="Times New Roman" panose="02020603050405020304" pitchFamily="18" charset="0"/>
-                        </a:rPr>
-                        <a:t>T1-2</a:t>
-                      </a:r>
-                      <a:endParaRPr lang="zh-TW" altLang="en-US" dirty="0">
-                        <a:latin typeface="Times New Roman" panose="02020603050405020304" pitchFamily="18" charset="0"/>
-                        <a:ea typeface="標楷體" panose="03000509000000000000" pitchFamily="65" charset="-120"/>
-                        <a:cs typeface="Times New Roman" panose="02020603050405020304" pitchFamily="18" charset="0"/>
-                      </a:endParaRPr>
-                    </a:p>
-                  </a:txBody>
-                  <a:tcPr anchor="ctr"/>
-                </a:tc>
-                <a:tc>
-                  <a:txBody>
-                    <a:bodyPr/>
-                    <a:lstStyle/>
-                    <a:p>
-                      <a:pPr algn="ctr"/>
-                      <a:r>
-                        <a:rPr lang="en-US" altLang="zh-CN">
-                          <a:latin typeface="Times New Roman" panose="02020603050405020304" pitchFamily="18" charset="0"/>
-                          <a:ea typeface="標楷體" panose="03000509000000000000" pitchFamily="65" charset="-120"/>
-                          <a:cs typeface="Times New Roman" panose="02020603050405020304" pitchFamily="18" charset="0"/>
-                        </a:rPr>
-                        <a:t>T2-2</a:t>
-                      </a:r>
-                      <a:endParaRPr lang="zh-TW" altLang="en-US" dirty="0">
-                        <a:latin typeface="Times New Roman" panose="02020603050405020304" pitchFamily="18" charset="0"/>
-                        <a:ea typeface="標楷體" panose="03000509000000000000" pitchFamily="65" charset="-120"/>
-                        <a:cs typeface="Times New Roman" panose="02020603050405020304" pitchFamily="18" charset="0"/>
-                      </a:endParaRPr>
-                    </a:p>
-                  </a:txBody>
-                  <a:tcPr anchor="ctr"/>
-                </a:tc>
-                <a:extLst>
-                  <a:ext uri="{0D108BD9-81ED-4DB2-BD59-A6C34878D82A}">
-                    <a16:rowId xmlns:a16="http://schemas.microsoft.com/office/drawing/2014/main" val="10004"/>
-                  </a:ext>
-                </a:extLst>
-              </a:tr>
-              <a:tr h="1950908">
-                <a:tc rowSpan="3">
+              <a:tr h="2687100">
+                <a:tc>
                   <a:txBody>
                     <a:bodyPr/>
                     <a:lstStyle/>
@@ -5240,344 +4886,6 @@
                 <a:extLst>
                   <a:ext uri="{0D108BD9-81ED-4DB2-BD59-A6C34878D82A}">
                     <a16:rowId xmlns:a16="http://schemas.microsoft.com/office/drawing/2014/main" val="10005"/>
-                  </a:ext>
-                </a:extLst>
-              </a:tr>
-              <a:tr h="368096">
-                <a:tc vMerge="1">
-                  <a:txBody>
-                    <a:bodyPr/>
-                    <a:lstStyle/>
-                    <a:p>
-                      <a:pPr marL="0" marR="0" indent="0" algn="ctr" defTabSz="914400" rtl="0" eaLnBrk="1" fontAlgn="auto" latinLnBrk="0" hangingPunct="1">
-                        <a:lnSpc>
-                          <a:spcPct val="100000"/>
-                        </a:lnSpc>
-                        <a:spcBef>
-                          <a:spcPts val="0"/>
-                        </a:spcBef>
-                        <a:spcAft>
-                          <a:spcPts val="0"/>
-                        </a:spcAft>
-                        <a:buClrTx/>
-                        <a:buSzTx/>
-                        <a:buFontTx/>
-                        <a:buNone/>
-                        <a:tabLst/>
-                        <a:defRPr/>
-                      </a:pPr>
-                      <a:endParaRPr lang="zh-TW" altLang="en-US" dirty="0">
-                        <a:latin typeface="Times New Roman" panose="02020603050405020304" pitchFamily="18" charset="0"/>
-                        <a:ea typeface="標楷體" panose="03000509000000000000" pitchFamily="65" charset="-120"/>
-                        <a:cs typeface="Times New Roman" panose="02020603050405020304" pitchFamily="18" charset="0"/>
-                      </a:endParaRPr>
-                    </a:p>
-                  </a:txBody>
-                  <a:tcPr anchor="ctr"/>
-                </a:tc>
-                <a:tc>
-                  <a:txBody>
-                    <a:bodyPr/>
-                    <a:lstStyle/>
-                    <a:p>
-                      <a:r>
-                        <a:rPr lang="zh-CN" altLang="en-US" dirty="0">
-                          <a:latin typeface="Times New Roman" panose="02020603050405020304" pitchFamily="18" charset="0"/>
-                          <a:ea typeface="標楷體" panose="03000509000000000000" pitchFamily="65" charset="-120"/>
-                          <a:cs typeface="Times New Roman" panose="02020603050405020304" pitchFamily="18" charset="0"/>
-                        </a:rPr>
-                        <a:t>厚度</a:t>
-                      </a:r>
-                      <a:r>
-                        <a:rPr lang="en-US" altLang="zh-CN" dirty="0">
-                          <a:latin typeface="Times New Roman" panose="02020603050405020304" pitchFamily="18" charset="0"/>
-                          <a:ea typeface="標楷體" panose="03000509000000000000" pitchFamily="65" charset="-120"/>
-                          <a:cs typeface="Times New Roman" panose="02020603050405020304" pitchFamily="18" charset="0"/>
-                        </a:rPr>
-                        <a:t>(</a:t>
-                      </a:r>
-                      <a:r>
-                        <a:rPr lang="en-US" altLang="zh-CN" dirty="0" err="1">
-                          <a:latin typeface="Times New Roman" panose="02020603050405020304" pitchFamily="18" charset="0"/>
-                          <a:ea typeface="標楷體" panose="03000509000000000000" pitchFamily="65" charset="-120"/>
-                          <a:cs typeface="Times New Roman" panose="02020603050405020304" pitchFamily="18" charset="0"/>
-                        </a:rPr>
-                        <a:t>μm</a:t>
-                      </a:r>
-                      <a:r>
-                        <a:rPr lang="en-US" altLang="zh-CN" dirty="0">
-                          <a:latin typeface="Times New Roman" panose="02020603050405020304" pitchFamily="18" charset="0"/>
-                          <a:ea typeface="標楷體" panose="03000509000000000000" pitchFamily="65" charset="-120"/>
-                          <a:cs typeface="Times New Roman" panose="02020603050405020304" pitchFamily="18" charset="0"/>
-                        </a:rPr>
-                        <a:t>)</a:t>
-                      </a:r>
-                      <a:endParaRPr lang="zh-TW" altLang="en-US" dirty="0">
-                        <a:latin typeface="Times New Roman" panose="02020603050405020304" pitchFamily="18" charset="0"/>
-                        <a:ea typeface="標楷體" panose="03000509000000000000" pitchFamily="65" charset="-120"/>
-                        <a:cs typeface="Times New Roman" panose="02020603050405020304" pitchFamily="18" charset="0"/>
-                      </a:endParaRPr>
-                    </a:p>
-                  </a:txBody>
-                  <a:tcPr anchor="ctr"/>
-                </a:tc>
-                <a:tc>
-                  <a:txBody>
-                    <a:bodyPr/>
-                    <a:lstStyle/>
-                    <a:p>
-                      <a:pPr marL="0" marR="0" indent="0" algn="ctr" defTabSz="914400" rtl="0" eaLnBrk="1" fontAlgn="auto" latinLnBrk="0" hangingPunct="1">
-                        <a:lnSpc>
-                          <a:spcPct val="100000"/>
-                        </a:lnSpc>
-                        <a:spcBef>
-                          <a:spcPts val="0"/>
-                        </a:spcBef>
-                        <a:spcAft>
-                          <a:spcPts val="0"/>
-                        </a:spcAft>
-                        <a:buClrTx/>
-                        <a:buSzTx/>
-                        <a:buFontTx/>
-                        <a:buNone/>
-                        <a:tabLst/>
-                        <a:defRPr/>
-                      </a:pPr>
-                      <a:r>
-                        <a:rPr lang="en-US" altLang="zh-CN">
-                          <a:latin typeface="Times New Roman" panose="02020603050405020304" pitchFamily="18" charset="0"/>
-                          <a:ea typeface="標楷體" panose="03000509000000000000" pitchFamily="65" charset="-120"/>
-                          <a:cs typeface="Times New Roman" panose="02020603050405020304" pitchFamily="18" charset="0"/>
-                        </a:rPr>
-                        <a:t>B0-1μm</a:t>
-                      </a:r>
-                      <a:endParaRPr lang="zh-TW" altLang="en-US" dirty="0">
-                        <a:latin typeface="Times New Roman" panose="02020603050405020304" pitchFamily="18" charset="0"/>
-                        <a:ea typeface="標楷體" panose="03000509000000000000" pitchFamily="65" charset="-120"/>
-                        <a:cs typeface="Times New Roman" panose="02020603050405020304" pitchFamily="18" charset="0"/>
-                      </a:endParaRPr>
-                    </a:p>
-                  </a:txBody>
-                  <a:tcPr anchor="ctr"/>
-                </a:tc>
-                <a:tc>
-                  <a:txBody>
-                    <a:bodyPr/>
-                    <a:lstStyle/>
-                    <a:p>
-                      <a:pPr marL="0" marR="0" indent="0" algn="ctr" defTabSz="914400" rtl="0" eaLnBrk="1" fontAlgn="auto" latinLnBrk="0" hangingPunct="1">
-                        <a:lnSpc>
-                          <a:spcPct val="100000"/>
-                        </a:lnSpc>
-                        <a:spcBef>
-                          <a:spcPts val="0"/>
-                        </a:spcBef>
-                        <a:spcAft>
-                          <a:spcPts val="0"/>
-                        </a:spcAft>
-                        <a:buClrTx/>
-                        <a:buSzTx/>
-                        <a:buFontTx/>
-                        <a:buNone/>
-                        <a:tabLst/>
-                        <a:defRPr/>
-                      </a:pPr>
-                      <a:r>
-                        <a:rPr lang="en-US" altLang="zh-CN">
-                          <a:latin typeface="Times New Roman" panose="02020603050405020304" pitchFamily="18" charset="0"/>
-                          <a:ea typeface="標楷體" panose="03000509000000000000" pitchFamily="65" charset="-120"/>
-                          <a:cs typeface="Times New Roman" panose="02020603050405020304" pitchFamily="18" charset="0"/>
-                        </a:rPr>
-                        <a:t>B1-1μm</a:t>
-                      </a:r>
-                      <a:endParaRPr lang="zh-TW" altLang="en-US" dirty="0">
-                        <a:latin typeface="Times New Roman" panose="02020603050405020304" pitchFamily="18" charset="0"/>
-                        <a:ea typeface="標楷體" panose="03000509000000000000" pitchFamily="65" charset="-120"/>
-                        <a:cs typeface="Times New Roman" panose="02020603050405020304" pitchFamily="18" charset="0"/>
-                      </a:endParaRPr>
-                    </a:p>
-                  </a:txBody>
-                  <a:tcPr anchor="ctr"/>
-                </a:tc>
-                <a:tc>
-                  <a:txBody>
-                    <a:bodyPr/>
-                    <a:lstStyle/>
-                    <a:p>
-                      <a:pPr marL="0" marR="0" indent="0" algn="ctr" defTabSz="914400" rtl="0" eaLnBrk="1" fontAlgn="auto" latinLnBrk="0" hangingPunct="1">
-                        <a:lnSpc>
-                          <a:spcPct val="100000"/>
-                        </a:lnSpc>
-                        <a:spcBef>
-                          <a:spcPts val="0"/>
-                        </a:spcBef>
-                        <a:spcAft>
-                          <a:spcPts val="0"/>
-                        </a:spcAft>
-                        <a:buClrTx/>
-                        <a:buSzTx/>
-                        <a:buFontTx/>
-                        <a:buNone/>
-                        <a:tabLst/>
-                        <a:defRPr/>
-                      </a:pPr>
-                      <a:r>
-                        <a:rPr lang="en-US" altLang="zh-CN">
-                          <a:latin typeface="Times New Roman" panose="02020603050405020304" pitchFamily="18" charset="0"/>
-                          <a:ea typeface="標楷體" panose="03000509000000000000" pitchFamily="65" charset="-120"/>
-                          <a:cs typeface="Times New Roman" panose="02020603050405020304" pitchFamily="18" charset="0"/>
-                        </a:rPr>
-                        <a:t>B2-1μm</a:t>
-                      </a:r>
-                      <a:endParaRPr lang="zh-TW" altLang="en-US" dirty="0">
-                        <a:latin typeface="Times New Roman" panose="02020603050405020304" pitchFamily="18" charset="0"/>
-                        <a:ea typeface="標楷體" panose="03000509000000000000" pitchFamily="65" charset="-120"/>
-                        <a:cs typeface="Times New Roman" panose="02020603050405020304" pitchFamily="18" charset="0"/>
-                      </a:endParaRPr>
-                    </a:p>
-                  </a:txBody>
-                  <a:tcPr anchor="ctr"/>
-                </a:tc>
-                <a:extLst>
-                  <a:ext uri="{0D108BD9-81ED-4DB2-BD59-A6C34878D82A}">
-                    <a16:rowId xmlns:a16="http://schemas.microsoft.com/office/drawing/2014/main" val="10006"/>
-                  </a:ext>
-                </a:extLst>
-              </a:tr>
-              <a:tr h="368096">
-                <a:tc vMerge="1">
-                  <a:txBody>
-                    <a:bodyPr/>
-                    <a:lstStyle/>
-                    <a:p>
-                      <a:pPr marL="0" marR="0" indent="0" algn="ctr" defTabSz="914400" rtl="0" eaLnBrk="1" fontAlgn="auto" latinLnBrk="0" hangingPunct="1">
-                        <a:lnSpc>
-                          <a:spcPct val="100000"/>
-                        </a:lnSpc>
-                        <a:spcBef>
-                          <a:spcPts val="0"/>
-                        </a:spcBef>
-                        <a:spcAft>
-                          <a:spcPts val="0"/>
-                        </a:spcAft>
-                        <a:buClrTx/>
-                        <a:buSzTx/>
-                        <a:buFontTx/>
-                        <a:buNone/>
-                        <a:tabLst/>
-                        <a:defRPr/>
-                      </a:pPr>
-                      <a:endParaRPr lang="zh-TW" altLang="en-US" dirty="0">
-                        <a:latin typeface="Times New Roman" panose="02020603050405020304" pitchFamily="18" charset="0"/>
-                        <a:ea typeface="標楷體" panose="03000509000000000000" pitchFamily="65" charset="-120"/>
-                        <a:cs typeface="Times New Roman" panose="02020603050405020304" pitchFamily="18" charset="0"/>
-                      </a:endParaRPr>
-                    </a:p>
-                  </a:txBody>
-                  <a:tcPr anchor="ctr"/>
-                </a:tc>
-                <a:tc>
-                  <a:txBody>
-                    <a:bodyPr/>
-                    <a:lstStyle/>
-                    <a:p>
-                      <a:r>
-                        <a:rPr lang="zh-CN" altLang="en-US" dirty="0">
-                          <a:latin typeface="Times New Roman" panose="02020603050405020304" pitchFamily="18" charset="0"/>
-                          <a:ea typeface="標楷體" panose="03000509000000000000" pitchFamily="65" charset="-120"/>
-                          <a:cs typeface="Times New Roman" panose="02020603050405020304" pitchFamily="18" charset="0"/>
-                        </a:rPr>
-                        <a:t>硬度</a:t>
-                      </a:r>
-                      <a:r>
-                        <a:rPr lang="en-US" altLang="zh-CN" dirty="0">
-                          <a:latin typeface="Times New Roman" panose="02020603050405020304" pitchFamily="18" charset="0"/>
-                          <a:ea typeface="標楷體" panose="03000509000000000000" pitchFamily="65" charset="-120"/>
-                          <a:cs typeface="Times New Roman" panose="02020603050405020304" pitchFamily="18" charset="0"/>
-                        </a:rPr>
-                        <a:t>(HV)</a:t>
-                      </a:r>
-                      <a:endParaRPr lang="zh-TW" altLang="en-US" dirty="0">
-                        <a:latin typeface="Times New Roman" panose="02020603050405020304" pitchFamily="18" charset="0"/>
-                        <a:ea typeface="標楷體" panose="03000509000000000000" pitchFamily="65" charset="-120"/>
-                        <a:cs typeface="Times New Roman" panose="02020603050405020304" pitchFamily="18" charset="0"/>
-                      </a:endParaRPr>
-                    </a:p>
-                  </a:txBody>
-                  <a:tcPr anchor="ctr"/>
-                </a:tc>
-                <a:tc>
-                  <a:txBody>
-                    <a:bodyPr/>
-                    <a:lstStyle/>
-                    <a:p>
-                      <a:pPr algn="ctr"/>
-                      <a:r>
-                        <a:rPr lang="en-US" altLang="zh-CN">
-                          <a:latin typeface="Times New Roman" panose="02020603050405020304" pitchFamily="18" charset="0"/>
-                          <a:ea typeface="標楷體" panose="03000509000000000000" pitchFamily="65" charset="-120"/>
-                          <a:cs typeface="Times New Roman" panose="02020603050405020304" pitchFamily="18" charset="0"/>
-                        </a:rPr>
-                        <a:t>B0-2</a:t>
-                      </a:r>
-                      <a:endParaRPr lang="zh-TW" altLang="en-US" dirty="0">
-                        <a:latin typeface="Times New Roman" panose="02020603050405020304" pitchFamily="18" charset="0"/>
-                        <a:ea typeface="標楷體" panose="03000509000000000000" pitchFamily="65" charset="-120"/>
-                        <a:cs typeface="Times New Roman" panose="02020603050405020304" pitchFamily="18" charset="0"/>
-                      </a:endParaRPr>
-                    </a:p>
-                  </a:txBody>
-                  <a:tcPr anchor="ctr"/>
-                </a:tc>
-                <a:tc>
-                  <a:txBody>
-                    <a:bodyPr/>
-                    <a:lstStyle/>
-                    <a:p>
-                      <a:pPr algn="ctr"/>
-                      <a:r>
-                        <a:rPr lang="en-US" altLang="zh-CN">
-                          <a:latin typeface="Times New Roman" panose="02020603050405020304" pitchFamily="18" charset="0"/>
-                          <a:ea typeface="標楷體" panose="03000509000000000000" pitchFamily="65" charset="-120"/>
-                          <a:cs typeface="Times New Roman" panose="02020603050405020304" pitchFamily="18" charset="0"/>
-                        </a:rPr>
-                        <a:t>B1-2</a:t>
-                      </a:r>
-                      <a:endParaRPr lang="zh-TW" altLang="en-US" dirty="0">
-                        <a:latin typeface="Times New Roman" panose="02020603050405020304" pitchFamily="18" charset="0"/>
-                        <a:ea typeface="標楷體" panose="03000509000000000000" pitchFamily="65" charset="-120"/>
-                        <a:cs typeface="Times New Roman" panose="02020603050405020304" pitchFamily="18" charset="0"/>
-                      </a:endParaRPr>
-                    </a:p>
-                  </a:txBody>
-                  <a:tcPr anchor="ctr"/>
-                </a:tc>
-                <a:tc>
-                  <a:txBody>
-                    <a:bodyPr/>
-                    <a:lstStyle/>
-                    <a:p>
-                      <a:pPr algn="ctr"/>
-                      <a:r>
-                        <a:rPr lang="en-US" altLang="zh-CN">
-                          <a:latin typeface="Times New Roman" panose="02020603050405020304" pitchFamily="18" charset="0"/>
-                          <a:ea typeface="標楷體" panose="03000509000000000000" pitchFamily="65" charset="-120"/>
-                          <a:cs typeface="Times New Roman" panose="02020603050405020304" pitchFamily="18" charset="0"/>
-                        </a:rPr>
-                        <a:t>B2-2</a:t>
-                      </a:r>
-                      <a:endParaRPr lang="zh-TW" altLang="en-US" dirty="0">
-                        <a:latin typeface="Times New Roman" panose="02020603050405020304" pitchFamily="18" charset="0"/>
-                        <a:ea typeface="標楷體" panose="03000509000000000000" pitchFamily="65" charset="-120"/>
-                        <a:cs typeface="Times New Roman" panose="02020603050405020304" pitchFamily="18" charset="0"/>
-                      </a:endParaRPr>
-                    </a:p>
-                  </a:txBody>
-                  <a:tcPr anchor="ctr"/>
-                </a:tc>
-                <a:extLst>
-                  <a:ext uri="{0D108BD9-81ED-4DB2-BD59-A6C34878D82A}">
-                    <a16:rowId xmlns:a16="http://schemas.microsoft.com/office/drawing/2014/main" val="10007"/>
                   </a:ext>
                 </a:extLst>
               </a:tr>
@@ -5588,7 +4896,7 @@
     </p:spTree>
     <p:extLst>
       <p:ext uri="{BB962C8B-B14F-4D97-AF65-F5344CB8AC3E}">
-        <p14:creationId xmlns:p14="http://schemas.microsoft.com/office/powerpoint/2010/main" val="975892046"/>
+        <p14:creationId xmlns:p14="http://schemas.microsoft.com/office/powerpoint/2010/main" val="3049125031"/>
       </p:ext>
     </p:extLst>
   </p:cSld>
@@ -5729,7 +5037,7 @@
               <a:t>-</a:t>
             </a:r>
             <a:r>
-              <a:rPr lang="zh-CN" altLang="en-US" b="1" dirty="0">
+              <a:rPr lang="zh-CN" altLang="en-US" b="1">
                 <a:solidFill>
                   <a:srgbClr val="000000"/>
                 </a:solidFill>
@@ -5737,7 +5045,7 @@
                 <a:ea typeface="標楷體" panose="03000509000000000000" pitchFamily="65" charset="-120"/>
                 <a:cs typeface="Times New Roman" panose="02020603050405020304" pitchFamily="18" charset="0"/>
               </a:rPr>
-              <a:t>尾端</a:t>
+              <a:t>頭端</a:t>
             </a:r>
             <a:r>
               <a:rPr lang="zh-CN" altLang="en-US" sz="1600" dirty="0">
@@ -5764,14 +5072,14 @@
           <p:nvPr>
             <p:extLst>
               <p:ext uri="{D42A27DB-BD31-4B8C-83A1-F6EECF244321}">
-                <p14:modId xmlns:p14="http://schemas.microsoft.com/office/powerpoint/2010/main" val="2013833558"/>
+                <p14:modId xmlns:p14="http://schemas.microsoft.com/office/powerpoint/2010/main" val="3258229529"/>
               </p:ext>
             </p:extLst>
           </p:nvPr>
         </p:nvGraphicFramePr>
         <p:xfrm>
-          <a:off x="29029" y="573948"/>
-          <a:ext cx="11887198" cy="6163047"/>
+          <a:off x="136609" y="573948"/>
+          <a:ext cx="11887197" cy="6163047"/>
         </p:xfrm>
         <a:graphic>
           <a:graphicData uri="http://schemas.openxmlformats.org/drawingml/2006/table">
@@ -5787,28 +5095,28 @@
                     </a:ext>
                   </a:extLst>
                 </a:gridCol>
-                <a:gridCol w="1132114">
+                <a:gridCol w="1634565">
                   <a:extLst>
                     <a:ext uri="{9D8B030D-6E8A-4147-A177-3AD203B41FA5}">
                       <a16:colId xmlns:a16="http://schemas.microsoft.com/office/drawing/2014/main" val="20001"/>
                     </a:ext>
                   </a:extLst>
                 </a:gridCol>
-                <a:gridCol w="3425371">
+                <a:gridCol w="3257887">
                   <a:extLst>
                     <a:ext uri="{9D8B030D-6E8A-4147-A177-3AD203B41FA5}">
                       <a16:colId xmlns:a16="http://schemas.microsoft.com/office/drawing/2014/main" val="20002"/>
                     </a:ext>
                   </a:extLst>
                 </a:gridCol>
-                <a:gridCol w="3425371">
+                <a:gridCol w="3257887">
                   <a:extLst>
                     <a:ext uri="{9D8B030D-6E8A-4147-A177-3AD203B41FA5}">
                       <a16:colId xmlns:a16="http://schemas.microsoft.com/office/drawing/2014/main" val="20003"/>
                     </a:ext>
                   </a:extLst>
                 </a:gridCol>
-                <a:gridCol w="3425371">
+                <a:gridCol w="3257887">
                   <a:extLst>
                     <a:ext uri="{9D8B030D-6E8A-4147-A177-3AD203B41FA5}">
                       <a16:colId xmlns:a16="http://schemas.microsoft.com/office/drawing/2014/main" val="20004"/>
@@ -6454,7 +5762,7 @@
                     <a:lstStyle/>
                     <a:p>
                       <a:r>
-                        <a:rPr lang="zh-CN" altLang="en-US" dirty="0">
+                        <a:rPr lang="zh-CN" altLang="en-US">
                           <a:latin typeface="Times New Roman" panose="02020603050405020304" pitchFamily="18" charset="0"/>
                           <a:ea typeface="標楷體" panose="03000509000000000000" pitchFamily="65" charset="-120"/>
                           <a:cs typeface="Times New Roman" panose="02020603050405020304" pitchFamily="18" charset="0"/>
@@ -6462,12 +5770,28 @@
                         <a:t>硬度</a:t>
                       </a:r>
                       <a:r>
-                        <a:rPr lang="en-US" altLang="zh-CN" dirty="0">
-                          <a:latin typeface="Times New Roman" panose="02020603050405020304" pitchFamily="18" charset="0"/>
-                          <a:ea typeface="標楷體" panose="03000509000000000000" pitchFamily="65" charset="-120"/>
-                          <a:cs typeface="Times New Roman" panose="02020603050405020304" pitchFamily="18" charset="0"/>
-                        </a:rPr>
-                        <a:t>(HV)</a:t>
+                        <a:rPr lang="en-US" altLang="zh-CN">
+                          <a:latin typeface="Times New Roman" panose="02020603050405020304" pitchFamily="18" charset="0"/>
+                          <a:ea typeface="標楷體" panose="03000509000000000000" pitchFamily="65" charset="-120"/>
+                          <a:cs typeface="Times New Roman" panose="02020603050405020304" pitchFamily="18" charset="0"/>
+                        </a:rPr>
+                        <a:t>(</a:t>
+                      </a:r>
+                      <a:r>
+                        <a:rPr lang="vi-VN" altLang="zh-CN">
+                          <a:latin typeface="Times New Roman" panose="02020603050405020304" pitchFamily="18" charset="0"/>
+                          <a:ea typeface="標楷體" panose="03000509000000000000" pitchFamily="65" charset="-120"/>
+                          <a:cs typeface="Times New Roman" panose="02020603050405020304" pitchFamily="18" charset="0"/>
+                        </a:rPr>
+                        <a:t>HV0.005</a:t>
+                      </a:r>
+                      <a:r>
+                        <a:rPr lang="en-US" altLang="zh-CN">
+                          <a:latin typeface="Times New Roman" panose="02020603050405020304" pitchFamily="18" charset="0"/>
+                          <a:ea typeface="標楷體" panose="03000509000000000000" pitchFamily="65" charset="-120"/>
+                          <a:cs typeface="Times New Roman" panose="02020603050405020304" pitchFamily="18" charset="0"/>
+                        </a:rPr>
+                        <a:t>)</a:t>
                       </a:r>
                       <a:endParaRPr lang="zh-TW" altLang="en-US" dirty="0">
                         <a:latin typeface="Times New Roman" panose="02020603050405020304" pitchFamily="18" charset="0"/>
@@ -7124,7 +6448,7 @@
     </p:spTree>
     <p:extLst>
       <p:ext uri="{BB962C8B-B14F-4D97-AF65-F5344CB8AC3E}">
-        <p14:creationId xmlns:p14="http://schemas.microsoft.com/office/powerpoint/2010/main" val="2727710128"/>
+        <p14:creationId xmlns:p14="http://schemas.microsoft.com/office/powerpoint/2010/main" val="975892046"/>
       </p:ext>
     </p:extLst>
   </p:cSld>
@@ -7300,14 +6624,14 @@
           <p:nvPr>
             <p:extLst>
               <p:ext uri="{D42A27DB-BD31-4B8C-83A1-F6EECF244321}">
-                <p14:modId xmlns:p14="http://schemas.microsoft.com/office/powerpoint/2010/main" val="3569204130"/>
+                <p14:modId xmlns:p14="http://schemas.microsoft.com/office/powerpoint/2010/main" val="3494406594"/>
               </p:ext>
             </p:extLst>
           </p:nvPr>
         </p:nvGraphicFramePr>
         <p:xfrm>
-          <a:off x="29029" y="573948"/>
-          <a:ext cx="11887201" cy="6163047"/>
+          <a:off x="136609" y="573948"/>
+          <a:ext cx="11887199" cy="6163047"/>
         </p:xfrm>
         <a:graphic>
           <a:graphicData uri="http://schemas.openxmlformats.org/drawingml/2006/table">
@@ -7323,49 +6647,49 @@
                     </a:ext>
                   </a:extLst>
                 </a:gridCol>
-                <a:gridCol w="1132114">
+                <a:gridCol w="1632320">
                   <a:extLst>
                     <a:ext uri="{9D8B030D-6E8A-4147-A177-3AD203B41FA5}">
                       <a16:colId xmlns:a16="http://schemas.microsoft.com/office/drawing/2014/main" val="20001"/>
                     </a:ext>
                   </a:extLst>
                 </a:gridCol>
-                <a:gridCol w="1712686">
+                <a:gridCol w="1629318">
                   <a:extLst>
                     <a:ext uri="{9D8B030D-6E8A-4147-A177-3AD203B41FA5}">
                       <a16:colId xmlns:a16="http://schemas.microsoft.com/office/drawing/2014/main" val="20002"/>
                     </a:ext>
                   </a:extLst>
                 </a:gridCol>
-                <a:gridCol w="1712686">
+                <a:gridCol w="1629318">
                   <a:extLst>
                     <a:ext uri="{9D8B030D-6E8A-4147-A177-3AD203B41FA5}">
                       <a16:colId xmlns:a16="http://schemas.microsoft.com/office/drawing/2014/main" val="3795221645"/>
                     </a:ext>
                   </a:extLst>
                 </a:gridCol>
-                <a:gridCol w="1712686">
+                <a:gridCol w="1629318">
                   <a:extLst>
                     <a:ext uri="{9D8B030D-6E8A-4147-A177-3AD203B41FA5}">
                       <a16:colId xmlns:a16="http://schemas.microsoft.com/office/drawing/2014/main" val="20003"/>
                     </a:ext>
                   </a:extLst>
                 </a:gridCol>
-                <a:gridCol w="1712686">
+                <a:gridCol w="1629318">
                   <a:extLst>
                     <a:ext uri="{9D8B030D-6E8A-4147-A177-3AD203B41FA5}">
                       <a16:colId xmlns:a16="http://schemas.microsoft.com/office/drawing/2014/main" val="3614160323"/>
                     </a:ext>
                   </a:extLst>
                 </a:gridCol>
-                <a:gridCol w="1712686">
+                <a:gridCol w="1629318">
                   <a:extLst>
                     <a:ext uri="{9D8B030D-6E8A-4147-A177-3AD203B41FA5}">
                       <a16:colId xmlns:a16="http://schemas.microsoft.com/office/drawing/2014/main" val="20004"/>
                     </a:ext>
                   </a:extLst>
                 </a:gridCol>
-                <a:gridCol w="1712686">
+                <a:gridCol w="1629318">
                   <a:extLst>
                     <a:ext uri="{9D8B030D-6E8A-4147-A177-3AD203B41FA5}">
                       <a16:colId xmlns:a16="http://schemas.microsoft.com/office/drawing/2014/main" val="3542158680"/>
@@ -8089,12 +7413,20 @@
                     <a:p>
                       <a:pPr algn="ctr"/>
                       <a:r>
-                        <a:rPr lang="zh-CN" altLang="en-US" dirty="0">
+                        <a:rPr lang="zh-CN" altLang="en-US">
                           <a:latin typeface="Times New Roman" panose="02020603050405020304" pitchFamily="18" charset="0"/>
                           <a:ea typeface="標楷體" panose="03000509000000000000" pitchFamily="65" charset="-120"/>
                           <a:cs typeface="Times New Roman" panose="02020603050405020304" pitchFamily="18" charset="0"/>
                         </a:rPr>
                         <a:t>相比例</a:t>
+                      </a:r>
+                      <a:r>
+                        <a:rPr lang="vi-VN" altLang="zh-CN">
+                          <a:latin typeface="Times New Roman" panose="02020603050405020304" pitchFamily="18" charset="0"/>
+                          <a:ea typeface="標楷體" panose="03000509000000000000" pitchFamily="65" charset="-120"/>
+                          <a:cs typeface="Times New Roman" panose="02020603050405020304" pitchFamily="18" charset="0"/>
+                        </a:rPr>
+                        <a:t>(%)</a:t>
                       </a:r>
                       <a:endParaRPr lang="zh-TW" altLang="en-US" dirty="0">
                         <a:latin typeface="Times New Roman" panose="02020603050405020304" pitchFamily="18" charset="0"/>
@@ -9290,13 +8622,13 @@
           <p:nvPr>
             <p:extLst>
               <p:ext uri="{D42A27DB-BD31-4B8C-83A1-F6EECF244321}">
-                <p14:modId xmlns:p14="http://schemas.microsoft.com/office/powerpoint/2010/main" val="4094878965"/>
+                <p14:modId xmlns:p14="http://schemas.microsoft.com/office/powerpoint/2010/main" val="3533348854"/>
               </p:ext>
             </p:extLst>
           </p:nvPr>
         </p:nvGraphicFramePr>
         <p:xfrm>
-          <a:off x="29029" y="573948"/>
+          <a:off x="136605" y="573948"/>
           <a:ext cx="11887201" cy="6163047"/>
         </p:xfrm>
         <a:graphic>
@@ -9320,48 +8652,27 @@
                     </a:ext>
                   </a:extLst>
                 </a:gridCol>
-                <a:gridCol w="1712686">
+                <a:gridCol w="3425372">
                   <a:extLst>
                     <a:ext uri="{9D8B030D-6E8A-4147-A177-3AD203B41FA5}">
                       <a16:colId xmlns:a16="http://schemas.microsoft.com/office/drawing/2014/main" val="20002"/>
                     </a:ext>
                   </a:extLst>
                 </a:gridCol>
-                <a:gridCol w="1712686">
-                  <a:extLst>
-                    <a:ext uri="{9D8B030D-6E8A-4147-A177-3AD203B41FA5}">
-                      <a16:colId xmlns:a16="http://schemas.microsoft.com/office/drawing/2014/main" val="3795221645"/>
-                    </a:ext>
-                  </a:extLst>
-                </a:gridCol>
-                <a:gridCol w="1712686">
+                <a:gridCol w="3425372">
                   <a:extLst>
                     <a:ext uri="{9D8B030D-6E8A-4147-A177-3AD203B41FA5}">
                       <a16:colId xmlns:a16="http://schemas.microsoft.com/office/drawing/2014/main" val="20003"/>
                     </a:ext>
                   </a:extLst>
                 </a:gridCol>
-                <a:gridCol w="1712686">
-                  <a:extLst>
-                    <a:ext uri="{9D8B030D-6E8A-4147-A177-3AD203B41FA5}">
-                      <a16:colId xmlns:a16="http://schemas.microsoft.com/office/drawing/2014/main" val="3614160323"/>
-                    </a:ext>
-                  </a:extLst>
-                </a:gridCol>
-                <a:gridCol w="1712686">
+                <a:gridCol w="3425372">
                   <a:extLst>
                     <a:ext uri="{9D8B030D-6E8A-4147-A177-3AD203B41FA5}">
                       <a16:colId xmlns:a16="http://schemas.microsoft.com/office/drawing/2014/main" val="20004"/>
                     </a:ext>
                   </a:extLst>
                 </a:gridCol>
-                <a:gridCol w="1712686">
-                  <a:extLst>
-                    <a:ext uri="{9D8B030D-6E8A-4147-A177-3AD203B41FA5}">
-                      <a16:colId xmlns:a16="http://schemas.microsoft.com/office/drawing/2014/main" val="3542158680"/>
-                    </a:ext>
-                  </a:extLst>
-                </a:gridCol>
               </a:tblGrid>
               <a:tr h="398930">
                 <a:tc gridSpan="2">
@@ -9397,7 +8708,7 @@
                   </a:txBody>
                   <a:tcPr/>
                 </a:tc>
-                <a:tc gridSpan="6">
+                <a:tc gridSpan="3">
                   <a:txBody>
                     <a:bodyPr/>
                     <a:lstStyle/>
@@ -9409,34 +8720,19 @@
                           <a:ea typeface="標楷體" panose="03000509000000000000" pitchFamily="65" charset="-120"/>
                           <a:cs typeface="Times New Roman" panose="02020603050405020304" pitchFamily="18" charset="0"/>
                         </a:rPr>
-                        <a:t>SEM</a:t>
-                      </a:r>
-                      <a:r>
-                        <a:rPr lang="zh-TW" altLang="en-US" b="1">
-                          <a:latin typeface="Times New Roman" panose="02020603050405020304" pitchFamily="18" charset="0"/>
-                          <a:ea typeface="標楷體" panose="03000509000000000000" pitchFamily="65" charset="-120"/>
-                          <a:cs typeface="Times New Roman" panose="02020603050405020304" pitchFamily="18" charset="0"/>
-                        </a:rPr>
-                        <a:t>相比例</a:t>
-                      </a:r>
-                      <a:endParaRPr lang="zh-TW" altLang="en-US" b="1" dirty="0">
-                        <a:latin typeface="Times New Roman" panose="02020603050405020304" pitchFamily="18" charset="0"/>
-                        <a:ea typeface="標楷體" panose="03000509000000000000" pitchFamily="65" charset="-120"/>
-                        <a:cs typeface="Times New Roman" panose="02020603050405020304" pitchFamily="18" charset="0"/>
-                      </a:endParaRPr>
-                    </a:p>
-                  </a:txBody>
-                  <a:tcPr anchor="ctr"/>
-                </a:tc>
-                <a:tc hMerge="1">
-                  <a:txBody>
-                    <a:bodyPr/>
-                    <a:lstStyle/>
-                    <a:p>
-                      <a:endParaRPr lang="en-US"/>
-                    </a:p>
-                  </a:txBody>
-                  <a:tcPr/>
+                        <a:t>XRD</a:t>
+                      </a:r>
+                      <a:r>
+                        <a:rPr lang="zh-CN" altLang="en-US" b="1">
+                          <a:latin typeface="Times New Roman" panose="02020603050405020304" pitchFamily="18" charset="0"/>
+                          <a:ea typeface="標楷體" panose="03000509000000000000" pitchFamily="65" charset="-120"/>
+                          <a:cs typeface="Times New Roman" panose="02020603050405020304" pitchFamily="18" charset="0"/>
+                        </a:rPr>
+                        <a:t>表面分析</a:t>
+                      </a:r>
+                    </a:p>
+                  </a:txBody>
+                  <a:tcPr anchor="ctr"/>
                 </a:tc>
                 <a:tc hMerge="1">
                   <a:txBody>
@@ -9454,31 +8750,11 @@
                     <a:bodyPr/>
                     <a:lstStyle/>
                     <a:p>
-                      <a:endParaRPr lang="en-US"/>
-                    </a:p>
-                  </a:txBody>
-                  <a:tcPr/>
-                </a:tc>
-                <a:tc hMerge="1">
-                  <a:txBody>
-                    <a:bodyPr/>
-                    <a:lstStyle/>
-                    <a:p>
                       <a:pPr algn="ctr"/>
                       <a:endParaRPr lang="zh-TW" altLang="en-US" dirty="0"/>
                     </a:p>
                   </a:txBody>
                   <a:tcPr anchor="ctr"/>
-                </a:tc>
-                <a:tc hMerge="1">
-                  <a:txBody>
-                    <a:bodyPr/>
-                    <a:lstStyle/>
-                    <a:p>
-                      <a:endParaRPr lang="en-US"/>
-                    </a:p>
-                  </a:txBody>
-                  <a:tcPr/>
                 </a:tc>
                 <a:extLst>
                   <a:ext uri="{0D108BD9-81ED-4DB2-BD59-A6C34878D82A}">
@@ -9520,7 +8796,7 @@
                   </a:txBody>
                   <a:tcPr/>
                 </a:tc>
-                <a:tc gridSpan="2">
+                <a:tc>
                   <a:txBody>
                     <a:bodyPr/>
                     <a:lstStyle/>
@@ -9559,17 +8835,7 @@
                   </a:txBody>
                   <a:tcPr anchor="ctr"/>
                 </a:tc>
-                <a:tc hMerge="1">
-                  <a:txBody>
-                    <a:bodyPr/>
-                    <a:lstStyle/>
-                    <a:p>
-                      <a:endParaRPr lang="en-US"/>
-                    </a:p>
-                  </a:txBody>
-                  <a:tcPr/>
-                </a:tc>
-                <a:tc gridSpan="2">
+                <a:tc>
                   <a:txBody>
                     <a:bodyPr/>
                     <a:lstStyle/>
@@ -9608,17 +8874,7 @@
                   </a:txBody>
                   <a:tcPr anchor="ctr"/>
                 </a:tc>
-                <a:tc hMerge="1">
-                  <a:txBody>
-                    <a:bodyPr/>
-                    <a:lstStyle/>
-                    <a:p>
-                      <a:endParaRPr lang="en-US"/>
-                    </a:p>
-                  </a:txBody>
-                  <a:tcPr/>
-                </a:tc>
-                <a:tc gridSpan="2">
+                <a:tc>
                   <a:txBody>
                     <a:bodyPr/>
                     <a:lstStyle/>
@@ -9657,24 +8913,14 @@
                   </a:txBody>
                   <a:tcPr anchor="ctr"/>
                 </a:tc>
-                <a:tc hMerge="1">
-                  <a:txBody>
-                    <a:bodyPr/>
-                    <a:lstStyle/>
-                    <a:p>
-                      <a:endParaRPr lang="en-US"/>
-                    </a:p>
-                  </a:txBody>
-                  <a:tcPr/>
-                </a:tc>
                 <a:extLst>
                   <a:ext uri="{0D108BD9-81ED-4DB2-BD59-A6C34878D82A}">
                     <a16:rowId xmlns:a16="http://schemas.microsoft.com/office/drawing/2014/main" val="10001"/>
                   </a:ext>
                 </a:extLst>
               </a:tr>
-              <a:tr h="1946567">
-                <a:tc rowSpan="3">
+              <a:tr h="2678087">
+                <a:tc>
                   <a:txBody>
                     <a:bodyPr/>
                     <a:lstStyle/>
@@ -9752,7 +8998,7 @@
                   </a:txBody>
                   <a:tcPr anchor="ctr"/>
                 </a:tc>
-                <a:tc gridSpan="2">
+                <a:tc>
                   <a:txBody>
                     <a:bodyPr/>
                     <a:lstStyle/>
@@ -9775,17 +9021,7 @@
                   </a:txBody>
                   <a:tcPr anchor="ctr"/>
                 </a:tc>
-                <a:tc hMerge="1">
-                  <a:txBody>
-                    <a:bodyPr/>
-                    <a:lstStyle/>
-                    <a:p>
-                      <a:endParaRPr lang="en-US"/>
-                    </a:p>
-                  </a:txBody>
-                  <a:tcPr/>
-                </a:tc>
-                <a:tc gridSpan="2">
+                <a:tc>
                   <a:txBody>
                     <a:bodyPr/>
                     <a:lstStyle/>
@@ -9800,17 +9036,7 @@
                   </a:txBody>
                   <a:tcPr anchor="ctr"/>
                 </a:tc>
-                <a:tc hMerge="1">
-                  <a:txBody>
-                    <a:bodyPr/>
-                    <a:lstStyle/>
-                    <a:p>
-                      <a:endParaRPr lang="en-US"/>
-                    </a:p>
-                  </a:txBody>
-                  <a:tcPr/>
-                </a:tc>
-                <a:tc gridSpan="2">
+                <a:tc>
                   <a:txBody>
                     <a:bodyPr/>
                     <a:lstStyle/>
@@ -9824,16 +9050,6 @@
                     </a:p>
                   </a:txBody>
                   <a:tcPr anchor="ctr"/>
-                </a:tc>
-                <a:tc hMerge="1">
-                  <a:txBody>
-                    <a:bodyPr/>
-                    <a:lstStyle/>
-                    <a:p>
-                      <a:endParaRPr lang="en-US"/>
-                    </a:p>
-                  </a:txBody>
-                  <a:tcPr/>
                 </a:tc>
                 <a:extLst>
                   <a:ext uri="{0D108BD9-81ED-4DB2-BD59-A6C34878D82A}">
@@ -9841,8 +9057,8 @@
                   </a:ext>
                 </a:extLst>
               </a:tr>
-              <a:tr h="365760">
-                <a:tc vMerge="1">
+              <a:tr h="2687100">
+                <a:tc>
                   <a:txBody>
                     <a:bodyPr/>
                     <a:lstStyle/>
@@ -9864,184 +9080,24 @@
                         <a:tabLst/>
                         <a:defRPr/>
                       </a:pPr>
-                      <a:endParaRPr lang="zh-TW" altLang="en-US" dirty="0">
-                        <a:latin typeface="Times New Roman" panose="02020603050405020304" pitchFamily="18" charset="0"/>
-                        <a:ea typeface="標楷體" panose="03000509000000000000" pitchFamily="65" charset="-120"/>
-                        <a:cs typeface="Times New Roman" panose="02020603050405020304" pitchFamily="18" charset="0"/>
-                      </a:endParaRPr>
-                    </a:p>
-                  </a:txBody>
-                  <a:tcPr anchor="ctr"/>
-                </a:tc>
-                <a:tc>
-                  <a:txBody>
-                    <a:bodyPr/>
-                    <a:lstStyle/>
-                    <a:p>
-                      <a:pPr algn="ctr"/>
                       <a:r>
                         <a:rPr lang="zh-CN" altLang="en-US" dirty="0">
                           <a:latin typeface="Times New Roman" panose="02020603050405020304" pitchFamily="18" charset="0"/>
                           <a:ea typeface="標楷體" panose="03000509000000000000" pitchFamily="65" charset="-120"/>
                           <a:cs typeface="Times New Roman" panose="02020603050405020304" pitchFamily="18" charset="0"/>
                         </a:rPr>
-                        <a:t>顏色</a:t>
-                      </a:r>
-                      <a:endParaRPr lang="zh-TW" altLang="en-US" dirty="0">
-                        <a:latin typeface="Times New Roman" panose="02020603050405020304" pitchFamily="18" charset="0"/>
-                        <a:ea typeface="標楷體" panose="03000509000000000000" pitchFamily="65" charset="-120"/>
-                        <a:cs typeface="Times New Roman" panose="02020603050405020304" pitchFamily="18" charset="0"/>
-                      </a:endParaRPr>
-                    </a:p>
-                  </a:txBody>
-                  <a:tcPr anchor="ctr"/>
-                </a:tc>
-                <a:tc>
-                  <a:txBody>
-                    <a:bodyPr/>
-                    <a:lstStyle/>
-                    <a:p>
-                      <a:pPr algn="ctr"/>
-                      <a:r>
-                        <a:rPr lang="zh-CN" altLang="en-US" dirty="0">
-                          <a:latin typeface="Times New Roman" panose="02020603050405020304" pitchFamily="18" charset="0"/>
-                          <a:ea typeface="標楷體" panose="03000509000000000000" pitchFamily="65" charset="-120"/>
-                          <a:cs typeface="Times New Roman" panose="02020603050405020304" pitchFamily="18" charset="0"/>
-                        </a:rPr>
-                        <a:t>白色</a:t>
-                      </a:r>
-                      <a:endParaRPr lang="zh-TW" altLang="en-US" dirty="0">
-                        <a:latin typeface="Times New Roman" panose="02020603050405020304" pitchFamily="18" charset="0"/>
-                        <a:ea typeface="標楷體" panose="03000509000000000000" pitchFamily="65" charset="-120"/>
-                        <a:cs typeface="Times New Roman" panose="02020603050405020304" pitchFamily="18" charset="0"/>
-                      </a:endParaRPr>
-                    </a:p>
-                  </a:txBody>
-                  <a:tcPr anchor="ctr"/>
-                </a:tc>
-                <a:tc>
-                  <a:txBody>
-                    <a:bodyPr/>
-                    <a:lstStyle/>
-                    <a:p>
-                      <a:pPr algn="ctr"/>
-                      <a:r>
-                        <a:rPr lang="zh-CN" altLang="en-US" dirty="0">
-                          <a:latin typeface="Times New Roman" panose="02020603050405020304" pitchFamily="18" charset="0"/>
-                          <a:ea typeface="標楷體" panose="03000509000000000000" pitchFamily="65" charset="-120"/>
-                          <a:cs typeface="Times New Roman" panose="02020603050405020304" pitchFamily="18" charset="0"/>
-                        </a:rPr>
-                        <a:t>灰色</a:t>
-                      </a:r>
-                      <a:endParaRPr lang="zh-TW" altLang="en-US" dirty="0">
-                        <a:latin typeface="Times New Roman" panose="02020603050405020304" pitchFamily="18" charset="0"/>
-                        <a:ea typeface="標楷體" panose="03000509000000000000" pitchFamily="65" charset="-120"/>
-                        <a:cs typeface="Times New Roman" panose="02020603050405020304" pitchFamily="18" charset="0"/>
-                      </a:endParaRPr>
-                    </a:p>
-                  </a:txBody>
-                  <a:tcPr anchor="ctr"/>
-                </a:tc>
-                <a:tc>
-                  <a:txBody>
-                    <a:bodyPr/>
-                    <a:lstStyle/>
-                    <a:p>
-                      <a:pPr algn="ctr"/>
-                      <a:r>
-                        <a:rPr lang="zh-CN" altLang="en-US" dirty="0">
-                          <a:latin typeface="Times New Roman" panose="02020603050405020304" pitchFamily="18" charset="0"/>
-                          <a:ea typeface="標楷體" panose="03000509000000000000" pitchFamily="65" charset="-120"/>
-                          <a:cs typeface="Times New Roman" panose="02020603050405020304" pitchFamily="18" charset="0"/>
-                        </a:rPr>
-                        <a:t>白色</a:t>
-                      </a:r>
-                      <a:endParaRPr lang="zh-TW" altLang="en-US" dirty="0">
-                        <a:latin typeface="Times New Roman" panose="02020603050405020304" pitchFamily="18" charset="0"/>
-                        <a:ea typeface="標楷體" panose="03000509000000000000" pitchFamily="65" charset="-120"/>
-                        <a:cs typeface="Times New Roman" panose="02020603050405020304" pitchFamily="18" charset="0"/>
-                      </a:endParaRPr>
-                    </a:p>
-                  </a:txBody>
-                  <a:tcPr anchor="ctr"/>
-                </a:tc>
-                <a:tc>
-                  <a:txBody>
-                    <a:bodyPr/>
-                    <a:lstStyle/>
-                    <a:p>
-                      <a:pPr algn="ctr"/>
-                      <a:r>
-                        <a:rPr lang="zh-CN" altLang="en-US" dirty="0">
-                          <a:latin typeface="Times New Roman" panose="02020603050405020304" pitchFamily="18" charset="0"/>
-                          <a:ea typeface="標楷體" panose="03000509000000000000" pitchFamily="65" charset="-120"/>
-                          <a:cs typeface="Times New Roman" panose="02020603050405020304" pitchFamily="18" charset="0"/>
-                        </a:rPr>
-                        <a:t>灰色</a:t>
-                      </a:r>
-                      <a:endParaRPr lang="zh-TW" altLang="en-US" dirty="0">
-                        <a:latin typeface="Times New Roman" panose="02020603050405020304" pitchFamily="18" charset="0"/>
-                        <a:ea typeface="標楷體" panose="03000509000000000000" pitchFamily="65" charset="-120"/>
-                        <a:cs typeface="Times New Roman" panose="02020603050405020304" pitchFamily="18" charset="0"/>
-                      </a:endParaRPr>
-                    </a:p>
-                  </a:txBody>
-                  <a:tcPr anchor="ctr"/>
-                </a:tc>
-                <a:tc>
-                  <a:txBody>
-                    <a:bodyPr/>
-                    <a:lstStyle/>
-                    <a:p>
-                      <a:pPr algn="ctr"/>
-                      <a:r>
-                        <a:rPr lang="zh-CN" altLang="en-US" dirty="0">
-                          <a:latin typeface="Times New Roman" panose="02020603050405020304" pitchFamily="18" charset="0"/>
-                          <a:ea typeface="標楷體" panose="03000509000000000000" pitchFamily="65" charset="-120"/>
-                          <a:cs typeface="Times New Roman" panose="02020603050405020304" pitchFamily="18" charset="0"/>
-                        </a:rPr>
-                        <a:t>白色</a:t>
-                      </a:r>
-                      <a:endParaRPr lang="zh-TW" altLang="en-US" dirty="0">
-                        <a:latin typeface="Times New Roman" panose="02020603050405020304" pitchFamily="18" charset="0"/>
-                        <a:ea typeface="標楷體" panose="03000509000000000000" pitchFamily="65" charset="-120"/>
-                        <a:cs typeface="Times New Roman" panose="02020603050405020304" pitchFamily="18" charset="0"/>
-                      </a:endParaRPr>
-                    </a:p>
-                  </a:txBody>
-                  <a:tcPr anchor="ctr"/>
-                </a:tc>
-                <a:tc>
-                  <a:txBody>
-                    <a:bodyPr/>
-                    <a:lstStyle/>
-                    <a:p>
-                      <a:pPr algn="ctr"/>
-                      <a:r>
-                        <a:rPr lang="zh-CN" altLang="en-US" dirty="0">
-                          <a:latin typeface="Times New Roman" panose="02020603050405020304" pitchFamily="18" charset="0"/>
-                          <a:ea typeface="標楷體" panose="03000509000000000000" pitchFamily="65" charset="-120"/>
-                          <a:cs typeface="Times New Roman" panose="02020603050405020304" pitchFamily="18" charset="0"/>
-                        </a:rPr>
-                        <a:t>灰色</a:t>
-                      </a:r>
-                      <a:endParaRPr lang="zh-TW" altLang="en-US" dirty="0">
-                        <a:latin typeface="Times New Roman" panose="02020603050405020304" pitchFamily="18" charset="0"/>
-                        <a:ea typeface="標楷體" panose="03000509000000000000" pitchFamily="65" charset="-120"/>
-                        <a:cs typeface="Times New Roman" panose="02020603050405020304" pitchFamily="18" charset="0"/>
-                      </a:endParaRPr>
-                    </a:p>
-                  </a:txBody>
-                  <a:tcPr anchor="ctr"/>
-                </a:tc>
-                <a:extLst>
-                  <a:ext uri="{0D108BD9-81ED-4DB2-BD59-A6C34878D82A}">
-                    <a16:rowId xmlns:a16="http://schemas.microsoft.com/office/drawing/2014/main" val="10003"/>
-                  </a:ext>
-                </a:extLst>
-              </a:tr>
-              <a:tr h="365760">
-                <a:tc vMerge="1">
+                        <a:t>下表面</a:t>
+                      </a:r>
+                      <a:endParaRPr lang="zh-TW" altLang="en-US" dirty="0">
+                        <a:latin typeface="Times New Roman" panose="02020603050405020304" pitchFamily="18" charset="0"/>
+                        <a:ea typeface="標楷體" panose="03000509000000000000" pitchFamily="65" charset="-120"/>
+                        <a:cs typeface="Times New Roman" panose="02020603050405020304" pitchFamily="18" charset="0"/>
+                      </a:endParaRPr>
+                    </a:p>
+                  </a:txBody>
+                  <a:tcPr anchor="ctr"/>
+                </a:tc>
+                <a:tc>
                   <a:txBody>
                     <a:bodyPr/>
                     <a:lstStyle/>
@@ -10063,352 +9119,12 @@
                         <a:tabLst/>
                         <a:defRPr/>
                       </a:pPr>
-                      <a:endParaRPr lang="zh-TW" altLang="en-US" dirty="0">
-                        <a:latin typeface="Times New Roman" panose="02020603050405020304" pitchFamily="18" charset="0"/>
-                        <a:ea typeface="標楷體" panose="03000509000000000000" pitchFamily="65" charset="-120"/>
-                        <a:cs typeface="Times New Roman" panose="02020603050405020304" pitchFamily="18" charset="0"/>
-                      </a:endParaRPr>
-                    </a:p>
-                  </a:txBody>
-                  <a:tcPr anchor="ctr"/>
-                </a:tc>
-                <a:tc>
-                  <a:txBody>
-                    <a:bodyPr/>
-                    <a:lstStyle/>
-                    <a:p>
-                      <a:pPr algn="ctr"/>
                       <a:r>
                         <a:rPr lang="zh-CN" altLang="en-US" dirty="0">
                           <a:latin typeface="Times New Roman" panose="02020603050405020304" pitchFamily="18" charset="0"/>
                           <a:ea typeface="標楷體" panose="03000509000000000000" pitchFamily="65" charset="-120"/>
                           <a:cs typeface="Times New Roman" panose="02020603050405020304" pitchFamily="18" charset="0"/>
                         </a:rPr>
-                        <a:t>相比例</a:t>
-                      </a:r>
-                      <a:endParaRPr lang="zh-TW" altLang="en-US" dirty="0">
-                        <a:latin typeface="Times New Roman" panose="02020603050405020304" pitchFamily="18" charset="0"/>
-                        <a:ea typeface="標楷體" panose="03000509000000000000" pitchFamily="65" charset="-120"/>
-                        <a:cs typeface="Times New Roman" panose="02020603050405020304" pitchFamily="18" charset="0"/>
-                      </a:endParaRPr>
-                    </a:p>
-                  </a:txBody>
-                  <a:tcPr anchor="ctr"/>
-                </a:tc>
-                <a:tc>
-                  <a:txBody>
-                    <a:bodyPr/>
-                    <a:lstStyle/>
-                    <a:p>
-                      <a:pPr algn="ctr" fontAlgn="ctr"/>
-                      <a:r>
-                        <a:rPr lang="en-US" altLang="zh-CN" sz="1800" b="0" i="0" u="none" strike="noStrike">
-                          <a:solidFill>
-                            <a:srgbClr val="000000"/>
-                          </a:solidFill>
-                          <a:effectLst/>
-                          <a:latin typeface="Times New Roman" panose="02020603050405020304" pitchFamily="18" charset="0"/>
-                          <a:cs typeface="Times New Roman" panose="02020603050405020304" pitchFamily="18" charset="0"/>
-                        </a:rPr>
-                        <a:t>T0</a:t>
-                      </a:r>
-                      <a:r>
-                        <a:rPr lang="vi-VN" altLang="zh-CN" sz="1800" b="0" i="0" u="none" strike="noStrike">
-                          <a:solidFill>
-                            <a:srgbClr val="000000"/>
-                          </a:solidFill>
-                          <a:effectLst/>
-                          <a:latin typeface="Times New Roman" panose="02020603050405020304" pitchFamily="18" charset="0"/>
-                          <a:cs typeface="Times New Roman" panose="02020603050405020304" pitchFamily="18" charset="0"/>
-                        </a:rPr>
-                        <a:t>-1</a:t>
-                      </a:r>
-                      <a:endParaRPr lang="en-US" altLang="zh-CN" sz="1800" b="0" i="0" u="none" strike="noStrike">
-                        <a:solidFill>
-                          <a:srgbClr val="000000"/>
-                        </a:solidFill>
-                        <a:effectLst/>
-                        <a:latin typeface="Times New Roman" panose="02020603050405020304" pitchFamily="18" charset="0"/>
-                        <a:cs typeface="Times New Roman" panose="02020603050405020304" pitchFamily="18" charset="0"/>
-                      </a:endParaRPr>
-                    </a:p>
-                  </a:txBody>
-                  <a:tcPr marL="9525" marR="9525" marT="9525" marB="0" anchor="ctr"/>
-                </a:tc>
-                <a:tc>
-                  <a:txBody>
-                    <a:bodyPr/>
-                    <a:lstStyle/>
-                    <a:p>
-                      <a:pPr algn="ctr" fontAlgn="ctr"/>
-                      <a:r>
-                        <a:rPr lang="en-US" altLang="zh-CN" sz="1800" b="0" i="0" u="none" strike="noStrike">
-                          <a:solidFill>
-                            <a:srgbClr val="000000"/>
-                          </a:solidFill>
-                          <a:effectLst/>
-                          <a:latin typeface="Times New Roman" panose="02020603050405020304" pitchFamily="18" charset="0"/>
-                          <a:cs typeface="Times New Roman" panose="02020603050405020304" pitchFamily="18" charset="0"/>
-                        </a:rPr>
-                        <a:t>T0</a:t>
-                      </a:r>
-                      <a:r>
-                        <a:rPr lang="vi-VN" altLang="zh-CN" sz="1800" b="0" i="0" u="none" strike="noStrike">
-                          <a:solidFill>
-                            <a:srgbClr val="000000"/>
-                          </a:solidFill>
-                          <a:effectLst/>
-                          <a:latin typeface="Times New Roman" panose="02020603050405020304" pitchFamily="18" charset="0"/>
-                          <a:cs typeface="Times New Roman" panose="02020603050405020304" pitchFamily="18" charset="0"/>
-                        </a:rPr>
-                        <a:t>-2</a:t>
-                      </a:r>
-                      <a:endParaRPr lang="en-US" altLang="zh-CN" sz="1800" b="0" i="0" u="none" strike="noStrike" dirty="0">
-                        <a:solidFill>
-                          <a:srgbClr val="000000"/>
-                        </a:solidFill>
-                        <a:effectLst/>
-                        <a:latin typeface="Times New Roman" panose="02020603050405020304" pitchFamily="18" charset="0"/>
-                        <a:cs typeface="Times New Roman" panose="02020603050405020304" pitchFamily="18" charset="0"/>
-                      </a:endParaRPr>
-                    </a:p>
-                  </a:txBody>
-                  <a:tcPr marL="9525" marR="9525" marT="9525" marB="0" anchor="ctr"/>
-                </a:tc>
-                <a:tc>
-                  <a:txBody>
-                    <a:bodyPr/>
-                    <a:lstStyle/>
-                    <a:p>
-                      <a:pPr algn="ctr" fontAlgn="ctr"/>
-                      <a:r>
-                        <a:rPr lang="en-US" altLang="zh-CN" sz="1800" b="0" i="0" u="none" strike="noStrike">
-                          <a:solidFill>
-                            <a:srgbClr val="000000"/>
-                          </a:solidFill>
-                          <a:effectLst/>
-                          <a:latin typeface="Times New Roman" panose="02020603050405020304" pitchFamily="18" charset="0"/>
-                          <a:cs typeface="Times New Roman" panose="02020603050405020304" pitchFamily="18" charset="0"/>
-                        </a:rPr>
-                        <a:t>T1</a:t>
-                      </a:r>
-                      <a:r>
-                        <a:rPr lang="vi-VN" altLang="zh-CN" sz="1800" b="0" i="0" u="none" strike="noStrike">
-                          <a:solidFill>
-                            <a:srgbClr val="000000"/>
-                          </a:solidFill>
-                          <a:effectLst/>
-                          <a:latin typeface="Times New Roman" panose="02020603050405020304" pitchFamily="18" charset="0"/>
-                          <a:cs typeface="Times New Roman" panose="02020603050405020304" pitchFamily="18" charset="0"/>
-                        </a:rPr>
-                        <a:t>-1</a:t>
-                      </a:r>
-                      <a:endParaRPr lang="en-US" altLang="zh-CN" sz="1800" b="0" i="0" u="none" strike="noStrike">
-                        <a:solidFill>
-                          <a:srgbClr val="000000"/>
-                        </a:solidFill>
-                        <a:effectLst/>
-                        <a:latin typeface="Times New Roman" panose="02020603050405020304" pitchFamily="18" charset="0"/>
-                        <a:cs typeface="Times New Roman" panose="02020603050405020304" pitchFamily="18" charset="0"/>
-                      </a:endParaRPr>
-                    </a:p>
-                  </a:txBody>
-                  <a:tcPr marL="9525" marR="9525" marT="9525" marB="0" anchor="ctr"/>
-                </a:tc>
-                <a:tc>
-                  <a:txBody>
-                    <a:bodyPr/>
-                    <a:lstStyle/>
-                    <a:p>
-                      <a:pPr algn="ctr" fontAlgn="ctr"/>
-                      <a:r>
-                        <a:rPr lang="en-US" altLang="zh-CN" sz="1800" b="0" i="0" u="none" strike="noStrike">
-                          <a:solidFill>
-                            <a:srgbClr val="000000"/>
-                          </a:solidFill>
-                          <a:effectLst/>
-                          <a:latin typeface="Times New Roman" panose="02020603050405020304" pitchFamily="18" charset="0"/>
-                          <a:cs typeface="Times New Roman" panose="02020603050405020304" pitchFamily="18" charset="0"/>
-                        </a:rPr>
-                        <a:t>T1</a:t>
-                      </a:r>
-                      <a:r>
-                        <a:rPr lang="vi-VN" altLang="zh-CN" sz="1800" b="0" i="0" u="none" strike="noStrike">
-                          <a:solidFill>
-                            <a:srgbClr val="000000"/>
-                          </a:solidFill>
-                          <a:effectLst/>
-                          <a:latin typeface="Times New Roman" panose="02020603050405020304" pitchFamily="18" charset="0"/>
-                          <a:cs typeface="Times New Roman" panose="02020603050405020304" pitchFamily="18" charset="0"/>
-                        </a:rPr>
-                        <a:t>-2</a:t>
-                      </a:r>
-                      <a:endParaRPr lang="en-US" altLang="zh-CN" sz="1800" b="0" i="0" u="none" strike="noStrike" dirty="0">
-                        <a:solidFill>
-                          <a:srgbClr val="000000"/>
-                        </a:solidFill>
-                        <a:effectLst/>
-                        <a:latin typeface="Times New Roman" panose="02020603050405020304" pitchFamily="18" charset="0"/>
-                        <a:cs typeface="Times New Roman" panose="02020603050405020304" pitchFamily="18" charset="0"/>
-                      </a:endParaRPr>
-                    </a:p>
-                  </a:txBody>
-                  <a:tcPr marL="9525" marR="9525" marT="9525" marB="0" anchor="ctr"/>
-                </a:tc>
-                <a:tc>
-                  <a:txBody>
-                    <a:bodyPr/>
-                    <a:lstStyle/>
-                    <a:p>
-                      <a:pPr algn="ctr" fontAlgn="ctr"/>
-                      <a:r>
-                        <a:rPr lang="en-US" altLang="zh-CN" sz="1800" b="0" i="0" u="none" strike="noStrike">
-                          <a:solidFill>
-                            <a:srgbClr val="000000"/>
-                          </a:solidFill>
-                          <a:effectLst/>
-                          <a:latin typeface="Times New Roman" panose="02020603050405020304" pitchFamily="18" charset="0"/>
-                          <a:cs typeface="Times New Roman" panose="02020603050405020304" pitchFamily="18" charset="0"/>
-                        </a:rPr>
-                        <a:t>T2</a:t>
-                      </a:r>
-                      <a:r>
-                        <a:rPr lang="vi-VN" altLang="zh-CN" sz="1800" b="0" i="0" u="none" strike="noStrike">
-                          <a:solidFill>
-                            <a:srgbClr val="000000"/>
-                          </a:solidFill>
-                          <a:effectLst/>
-                          <a:latin typeface="Times New Roman" panose="02020603050405020304" pitchFamily="18" charset="0"/>
-                          <a:cs typeface="Times New Roman" panose="02020603050405020304" pitchFamily="18" charset="0"/>
-                        </a:rPr>
-                        <a:t>-1</a:t>
-                      </a:r>
-                      <a:endParaRPr lang="en-US" altLang="zh-CN" sz="1800" b="0" i="0" u="none" strike="noStrike">
-                        <a:solidFill>
-                          <a:srgbClr val="000000"/>
-                        </a:solidFill>
-                        <a:effectLst/>
-                        <a:latin typeface="Times New Roman" panose="02020603050405020304" pitchFamily="18" charset="0"/>
-                        <a:cs typeface="Times New Roman" panose="02020603050405020304" pitchFamily="18" charset="0"/>
-                      </a:endParaRPr>
-                    </a:p>
-                  </a:txBody>
-                  <a:tcPr marL="9525" marR="9525" marT="9525" marB="0" anchor="ctr"/>
-                </a:tc>
-                <a:tc>
-                  <a:txBody>
-                    <a:bodyPr/>
-                    <a:lstStyle/>
-                    <a:p>
-                      <a:pPr algn="ctr" fontAlgn="ctr"/>
-                      <a:r>
-                        <a:rPr lang="en-US" altLang="zh-CN" sz="1800" b="0" i="0" u="none" strike="noStrike">
-                          <a:solidFill>
-                            <a:srgbClr val="000000"/>
-                          </a:solidFill>
-                          <a:effectLst/>
-                          <a:latin typeface="Times New Roman" panose="02020603050405020304" pitchFamily="18" charset="0"/>
-                          <a:cs typeface="Times New Roman" panose="02020603050405020304" pitchFamily="18" charset="0"/>
-                        </a:rPr>
-                        <a:t>T2</a:t>
-                      </a:r>
-                      <a:r>
-                        <a:rPr lang="vi-VN" altLang="zh-CN" sz="1800" b="0" i="0" u="none" strike="noStrike">
-                          <a:solidFill>
-                            <a:srgbClr val="000000"/>
-                          </a:solidFill>
-                          <a:effectLst/>
-                          <a:latin typeface="Times New Roman" panose="02020603050405020304" pitchFamily="18" charset="0"/>
-                          <a:cs typeface="Times New Roman" panose="02020603050405020304" pitchFamily="18" charset="0"/>
-                        </a:rPr>
-                        <a:t>-2</a:t>
-                      </a:r>
-                      <a:endParaRPr lang="en-US" altLang="zh-CN" sz="1800" b="0" i="0" u="none" strike="noStrike" dirty="0">
-                        <a:solidFill>
-                          <a:srgbClr val="000000"/>
-                        </a:solidFill>
-                        <a:effectLst/>
-                        <a:latin typeface="Times New Roman" panose="02020603050405020304" pitchFamily="18" charset="0"/>
-                        <a:cs typeface="Times New Roman" panose="02020603050405020304" pitchFamily="18" charset="0"/>
-                      </a:endParaRPr>
-                    </a:p>
-                  </a:txBody>
-                  <a:tcPr marL="9525" marR="9525" marT="9525" marB="0" anchor="ctr"/>
-                </a:tc>
-                <a:extLst>
-                  <a:ext uri="{0D108BD9-81ED-4DB2-BD59-A6C34878D82A}">
-                    <a16:rowId xmlns:a16="http://schemas.microsoft.com/office/drawing/2014/main" val="10004"/>
-                  </a:ext>
-                </a:extLst>
-              </a:tr>
-              <a:tr h="1950908">
-                <a:tc rowSpan="3">
-                  <a:txBody>
-                    <a:bodyPr/>
-                    <a:lstStyle/>
-                    <a:p>
-                      <a:pPr marL="0" marR="0" indent="0" algn="ctr" defTabSz="914400" rtl="0" eaLnBrk="1" fontAlgn="auto" latinLnBrk="0" hangingPunct="1">
-                        <a:lnSpc>
-                          <a:spcPct val="100000"/>
-                        </a:lnSpc>
-                        <a:spcBef>
-                          <a:spcPts val="0"/>
-                        </a:spcBef>
-                        <a:spcAft>
-                          <a:spcPts val="0"/>
-                        </a:spcAft>
-                        <a:buClrTx/>
-                        <a:buSzTx/>
-                        <a:buFontTx/>
-                        <a:buNone/>
-                        <a:tabLst/>
-                        <a:defRPr/>
-                      </a:pPr>
-                      <a:r>
-                        <a:rPr lang="zh-CN" altLang="en-US" dirty="0">
-                          <a:latin typeface="Times New Roman" panose="02020603050405020304" pitchFamily="18" charset="0"/>
-                          <a:ea typeface="標楷體" panose="03000509000000000000" pitchFamily="65" charset="-120"/>
-                          <a:cs typeface="Times New Roman" panose="02020603050405020304" pitchFamily="18" charset="0"/>
-                        </a:rPr>
-                        <a:t>下表面</a:t>
-                      </a:r>
-                      <a:endParaRPr lang="zh-TW" altLang="en-US" dirty="0">
-                        <a:latin typeface="Times New Roman" panose="02020603050405020304" pitchFamily="18" charset="0"/>
-                        <a:ea typeface="標楷體" panose="03000509000000000000" pitchFamily="65" charset="-120"/>
-                        <a:cs typeface="Times New Roman" panose="02020603050405020304" pitchFamily="18" charset="0"/>
-                      </a:endParaRPr>
-                    </a:p>
-                  </a:txBody>
-                  <a:tcPr anchor="ctr"/>
-                </a:tc>
-                <a:tc>
-                  <a:txBody>
-                    <a:bodyPr/>
-                    <a:lstStyle/>
-                    <a:p>
-                      <a:pPr marL="0" marR="0" indent="0" algn="ctr" defTabSz="914400" rtl="0" eaLnBrk="1" fontAlgn="auto" latinLnBrk="0" hangingPunct="1">
-                        <a:lnSpc>
-                          <a:spcPct val="100000"/>
-                        </a:lnSpc>
-                        <a:spcBef>
-                          <a:spcPts val="0"/>
-                        </a:spcBef>
-                        <a:spcAft>
-                          <a:spcPts val="0"/>
-                        </a:spcAft>
-                        <a:buClrTx/>
-                        <a:buSzTx/>
-                        <a:buFontTx/>
-                        <a:buNone/>
-                        <a:tabLst/>
-                        <a:defRPr/>
-                      </a:pPr>
-                      <a:r>
-                        <a:rPr lang="zh-CN" altLang="en-US" dirty="0">
-                          <a:latin typeface="Times New Roman" panose="02020603050405020304" pitchFamily="18" charset="0"/>
-                          <a:ea typeface="標楷體" panose="03000509000000000000" pitchFamily="65" charset="-120"/>
-                          <a:cs typeface="Times New Roman" panose="02020603050405020304" pitchFamily="18" charset="0"/>
-                        </a:rPr>
                         <a:t>照片</a:t>
                       </a:r>
                       <a:endParaRPr lang="zh-TW" altLang="en-US" dirty="0">
@@ -10420,7 +9136,7 @@
                   </a:txBody>
                   <a:tcPr anchor="ctr"/>
                 </a:tc>
-                <a:tc gridSpan="2">
+                <a:tc>
                   <a:txBody>
                     <a:bodyPr/>
                     <a:lstStyle/>
@@ -10499,17 +9215,7 @@
                   </a:txBody>
                   <a:tcPr anchor="ctr"/>
                 </a:tc>
-                <a:tc hMerge="1">
-                  <a:txBody>
-                    <a:bodyPr/>
-                    <a:lstStyle/>
-                    <a:p>
-                      <a:endParaRPr lang="en-US"/>
-                    </a:p>
-                  </a:txBody>
-                  <a:tcPr/>
-                </a:tc>
-                <a:tc gridSpan="2">
+                <a:tc>
                   <a:txBody>
                     <a:bodyPr/>
                     <a:lstStyle/>
@@ -10540,17 +9246,7 @@
                   </a:txBody>
                   <a:tcPr anchor="ctr"/>
                 </a:tc>
-                <a:tc hMerge="1">
-                  <a:txBody>
-                    <a:bodyPr/>
-                    <a:lstStyle/>
-                    <a:p>
-                      <a:endParaRPr lang="en-US"/>
-                    </a:p>
-                  </a:txBody>
-                  <a:tcPr/>
-                </a:tc>
-                <a:tc gridSpan="2">
+                <a:tc>
                   <a:txBody>
                     <a:bodyPr/>
                     <a:lstStyle/>
@@ -10581,519 +9277,9 @@
                   </a:txBody>
                   <a:tcPr anchor="ctr"/>
                 </a:tc>
-                <a:tc hMerge="1">
-                  <a:txBody>
-                    <a:bodyPr/>
-                    <a:lstStyle/>
-                    <a:p>
-                      <a:endParaRPr lang="en-US"/>
-                    </a:p>
-                  </a:txBody>
-                  <a:tcPr/>
-                </a:tc>
                 <a:extLst>
                   <a:ext uri="{0D108BD9-81ED-4DB2-BD59-A6C34878D82A}">
                     <a16:rowId xmlns:a16="http://schemas.microsoft.com/office/drawing/2014/main" val="10005"/>
-                  </a:ext>
-                </a:extLst>
-              </a:tr>
-              <a:tr h="368096">
-                <a:tc vMerge="1">
-                  <a:txBody>
-                    <a:bodyPr/>
-                    <a:lstStyle/>
-                    <a:p>
-                      <a:pPr marL="0" marR="0" indent="0" algn="ctr" defTabSz="914400" rtl="0" eaLnBrk="1" fontAlgn="auto" latinLnBrk="0" hangingPunct="1">
-                        <a:lnSpc>
-                          <a:spcPct val="100000"/>
-                        </a:lnSpc>
-                        <a:spcBef>
-                          <a:spcPts val="0"/>
-                        </a:spcBef>
-                        <a:spcAft>
-                          <a:spcPts val="0"/>
-                        </a:spcAft>
-                        <a:buClrTx/>
-                        <a:buSzTx/>
-                        <a:buFontTx/>
-                        <a:buNone/>
-                        <a:tabLst/>
-                        <a:defRPr/>
-                      </a:pPr>
-                      <a:endParaRPr lang="zh-TW" altLang="en-US" dirty="0">
-                        <a:latin typeface="Times New Roman" panose="02020603050405020304" pitchFamily="18" charset="0"/>
-                        <a:ea typeface="標楷體" panose="03000509000000000000" pitchFamily="65" charset="-120"/>
-                        <a:cs typeface="Times New Roman" panose="02020603050405020304" pitchFamily="18" charset="0"/>
-                      </a:endParaRPr>
-                    </a:p>
-                  </a:txBody>
-                  <a:tcPr anchor="ctr"/>
-                </a:tc>
-                <a:tc>
-                  <a:txBody>
-                    <a:bodyPr/>
-                    <a:lstStyle/>
-                    <a:p>
-                      <a:pPr algn="ctr"/>
-                      <a:r>
-                        <a:rPr lang="zh-CN" altLang="en-US" dirty="0">
-                          <a:latin typeface="Times New Roman" panose="02020603050405020304" pitchFamily="18" charset="0"/>
-                          <a:ea typeface="標楷體" panose="03000509000000000000" pitchFamily="65" charset="-120"/>
-                          <a:cs typeface="Times New Roman" panose="02020603050405020304" pitchFamily="18" charset="0"/>
-                        </a:rPr>
-                        <a:t>顏色</a:t>
-                      </a:r>
-                      <a:endParaRPr lang="zh-TW" altLang="en-US" dirty="0">
-                        <a:latin typeface="Times New Roman" panose="02020603050405020304" pitchFamily="18" charset="0"/>
-                        <a:ea typeface="標楷體" panose="03000509000000000000" pitchFamily="65" charset="-120"/>
-                        <a:cs typeface="Times New Roman" panose="02020603050405020304" pitchFamily="18" charset="0"/>
-                      </a:endParaRPr>
-                    </a:p>
-                  </a:txBody>
-                  <a:tcPr anchor="ctr"/>
-                </a:tc>
-                <a:tc>
-                  <a:txBody>
-                    <a:bodyPr/>
-                    <a:lstStyle/>
-                    <a:p>
-                      <a:pPr algn="ctr"/>
-                      <a:r>
-                        <a:rPr lang="zh-CN" altLang="en-US" dirty="0">
-                          <a:latin typeface="Times New Roman" panose="02020603050405020304" pitchFamily="18" charset="0"/>
-                          <a:ea typeface="標楷體" panose="03000509000000000000" pitchFamily="65" charset="-120"/>
-                          <a:cs typeface="Times New Roman" panose="02020603050405020304" pitchFamily="18" charset="0"/>
-                        </a:rPr>
-                        <a:t>白色</a:t>
-                      </a:r>
-                      <a:endParaRPr lang="zh-TW" altLang="en-US" dirty="0">
-                        <a:latin typeface="Times New Roman" panose="02020603050405020304" pitchFamily="18" charset="0"/>
-                        <a:ea typeface="標楷體" panose="03000509000000000000" pitchFamily="65" charset="-120"/>
-                        <a:cs typeface="Times New Roman" panose="02020603050405020304" pitchFamily="18" charset="0"/>
-                      </a:endParaRPr>
-                    </a:p>
-                  </a:txBody>
-                  <a:tcPr anchor="ctr"/>
-                </a:tc>
-                <a:tc>
-                  <a:txBody>
-                    <a:bodyPr/>
-                    <a:lstStyle/>
-                    <a:p>
-                      <a:pPr algn="ctr"/>
-                      <a:r>
-                        <a:rPr lang="zh-CN" altLang="en-US" dirty="0">
-                          <a:latin typeface="Times New Roman" panose="02020603050405020304" pitchFamily="18" charset="0"/>
-                          <a:ea typeface="標楷體" panose="03000509000000000000" pitchFamily="65" charset="-120"/>
-                          <a:cs typeface="Times New Roman" panose="02020603050405020304" pitchFamily="18" charset="0"/>
-                        </a:rPr>
-                        <a:t>灰色</a:t>
-                      </a:r>
-                      <a:endParaRPr lang="zh-TW" altLang="en-US" dirty="0">
-                        <a:latin typeface="Times New Roman" panose="02020603050405020304" pitchFamily="18" charset="0"/>
-                        <a:ea typeface="標楷體" panose="03000509000000000000" pitchFamily="65" charset="-120"/>
-                        <a:cs typeface="Times New Roman" panose="02020603050405020304" pitchFamily="18" charset="0"/>
-                      </a:endParaRPr>
-                    </a:p>
-                  </a:txBody>
-                  <a:tcPr anchor="ctr"/>
-                </a:tc>
-                <a:tc>
-                  <a:txBody>
-                    <a:bodyPr/>
-                    <a:lstStyle/>
-                    <a:p>
-                      <a:pPr algn="ctr"/>
-                      <a:r>
-                        <a:rPr lang="zh-CN" altLang="en-US" dirty="0">
-                          <a:latin typeface="Times New Roman" panose="02020603050405020304" pitchFamily="18" charset="0"/>
-                          <a:ea typeface="標楷體" panose="03000509000000000000" pitchFamily="65" charset="-120"/>
-                          <a:cs typeface="Times New Roman" panose="02020603050405020304" pitchFamily="18" charset="0"/>
-                        </a:rPr>
-                        <a:t>白色</a:t>
-                      </a:r>
-                      <a:endParaRPr lang="zh-TW" altLang="en-US" dirty="0">
-                        <a:latin typeface="Times New Roman" panose="02020603050405020304" pitchFamily="18" charset="0"/>
-                        <a:ea typeface="標楷體" panose="03000509000000000000" pitchFamily="65" charset="-120"/>
-                        <a:cs typeface="Times New Roman" panose="02020603050405020304" pitchFamily="18" charset="0"/>
-                      </a:endParaRPr>
-                    </a:p>
-                  </a:txBody>
-                  <a:tcPr anchor="ctr"/>
-                </a:tc>
-                <a:tc>
-                  <a:txBody>
-                    <a:bodyPr/>
-                    <a:lstStyle/>
-                    <a:p>
-                      <a:pPr algn="ctr"/>
-                      <a:r>
-                        <a:rPr lang="zh-CN" altLang="en-US" dirty="0">
-                          <a:latin typeface="Times New Roman" panose="02020603050405020304" pitchFamily="18" charset="0"/>
-                          <a:ea typeface="標楷體" panose="03000509000000000000" pitchFamily="65" charset="-120"/>
-                          <a:cs typeface="Times New Roman" panose="02020603050405020304" pitchFamily="18" charset="0"/>
-                        </a:rPr>
-                        <a:t>灰色</a:t>
-                      </a:r>
-                      <a:endParaRPr lang="zh-TW" altLang="en-US" dirty="0">
-                        <a:latin typeface="Times New Roman" panose="02020603050405020304" pitchFamily="18" charset="0"/>
-                        <a:ea typeface="標楷體" panose="03000509000000000000" pitchFamily="65" charset="-120"/>
-                        <a:cs typeface="Times New Roman" panose="02020603050405020304" pitchFamily="18" charset="0"/>
-                      </a:endParaRPr>
-                    </a:p>
-                  </a:txBody>
-                  <a:tcPr anchor="ctr"/>
-                </a:tc>
-                <a:tc>
-                  <a:txBody>
-                    <a:bodyPr/>
-                    <a:lstStyle/>
-                    <a:p>
-                      <a:pPr algn="ctr"/>
-                      <a:r>
-                        <a:rPr lang="zh-CN" altLang="en-US" dirty="0">
-                          <a:latin typeface="Times New Roman" panose="02020603050405020304" pitchFamily="18" charset="0"/>
-                          <a:ea typeface="標楷體" panose="03000509000000000000" pitchFamily="65" charset="-120"/>
-                          <a:cs typeface="Times New Roman" panose="02020603050405020304" pitchFamily="18" charset="0"/>
-                        </a:rPr>
-                        <a:t>白色</a:t>
-                      </a:r>
-                      <a:endParaRPr lang="zh-TW" altLang="en-US" dirty="0">
-                        <a:latin typeface="Times New Roman" panose="02020603050405020304" pitchFamily="18" charset="0"/>
-                        <a:ea typeface="標楷體" panose="03000509000000000000" pitchFamily="65" charset="-120"/>
-                        <a:cs typeface="Times New Roman" panose="02020603050405020304" pitchFamily="18" charset="0"/>
-                      </a:endParaRPr>
-                    </a:p>
-                  </a:txBody>
-                  <a:tcPr anchor="ctr"/>
-                </a:tc>
-                <a:tc>
-                  <a:txBody>
-                    <a:bodyPr/>
-                    <a:lstStyle/>
-                    <a:p>
-                      <a:pPr algn="ctr"/>
-                      <a:r>
-                        <a:rPr lang="zh-CN" altLang="en-US" dirty="0">
-                          <a:latin typeface="Times New Roman" panose="02020603050405020304" pitchFamily="18" charset="0"/>
-                          <a:ea typeface="標楷體" panose="03000509000000000000" pitchFamily="65" charset="-120"/>
-                          <a:cs typeface="Times New Roman" panose="02020603050405020304" pitchFamily="18" charset="0"/>
-                        </a:rPr>
-                        <a:t>灰色</a:t>
-                      </a:r>
-                      <a:endParaRPr lang="zh-TW" altLang="en-US" dirty="0">
-                        <a:latin typeface="Times New Roman" panose="02020603050405020304" pitchFamily="18" charset="0"/>
-                        <a:ea typeface="標楷體" panose="03000509000000000000" pitchFamily="65" charset="-120"/>
-                        <a:cs typeface="Times New Roman" panose="02020603050405020304" pitchFamily="18" charset="0"/>
-                      </a:endParaRPr>
-                    </a:p>
-                  </a:txBody>
-                  <a:tcPr anchor="ctr"/>
-                </a:tc>
-                <a:extLst>
-                  <a:ext uri="{0D108BD9-81ED-4DB2-BD59-A6C34878D82A}">
-                    <a16:rowId xmlns:a16="http://schemas.microsoft.com/office/drawing/2014/main" val="10006"/>
-                  </a:ext>
-                </a:extLst>
-              </a:tr>
-              <a:tr h="368096">
-                <a:tc vMerge="1">
-                  <a:txBody>
-                    <a:bodyPr/>
-                    <a:lstStyle/>
-                    <a:p>
-                      <a:pPr marL="0" marR="0" indent="0" algn="ctr" defTabSz="914400" rtl="0" eaLnBrk="1" fontAlgn="auto" latinLnBrk="0" hangingPunct="1">
-                        <a:lnSpc>
-                          <a:spcPct val="100000"/>
-                        </a:lnSpc>
-                        <a:spcBef>
-                          <a:spcPts val="0"/>
-                        </a:spcBef>
-                        <a:spcAft>
-                          <a:spcPts val="0"/>
-                        </a:spcAft>
-                        <a:buClrTx/>
-                        <a:buSzTx/>
-                        <a:buFontTx/>
-                        <a:buNone/>
-                        <a:tabLst/>
-                        <a:defRPr/>
-                      </a:pPr>
-                      <a:endParaRPr lang="zh-TW" altLang="en-US" dirty="0">
-                        <a:latin typeface="Times New Roman" panose="02020603050405020304" pitchFamily="18" charset="0"/>
-                        <a:ea typeface="標楷體" panose="03000509000000000000" pitchFamily="65" charset="-120"/>
-                        <a:cs typeface="Times New Roman" panose="02020603050405020304" pitchFamily="18" charset="0"/>
-                      </a:endParaRPr>
-                    </a:p>
-                  </a:txBody>
-                  <a:tcPr anchor="ctr"/>
-                </a:tc>
-                <a:tc>
-                  <a:txBody>
-                    <a:bodyPr/>
-                    <a:lstStyle/>
-                    <a:p>
-                      <a:pPr algn="ctr"/>
-                      <a:r>
-                        <a:rPr lang="zh-CN" altLang="en-US" dirty="0">
-                          <a:latin typeface="Times New Roman" panose="02020603050405020304" pitchFamily="18" charset="0"/>
-                          <a:ea typeface="標楷體" panose="03000509000000000000" pitchFamily="65" charset="-120"/>
-                          <a:cs typeface="Times New Roman" panose="02020603050405020304" pitchFamily="18" charset="0"/>
-                        </a:rPr>
-                        <a:t>相比例</a:t>
-                      </a:r>
-                      <a:endParaRPr lang="zh-TW" altLang="en-US" dirty="0">
-                        <a:latin typeface="Times New Roman" panose="02020603050405020304" pitchFamily="18" charset="0"/>
-                        <a:ea typeface="標楷體" panose="03000509000000000000" pitchFamily="65" charset="-120"/>
-                        <a:cs typeface="Times New Roman" panose="02020603050405020304" pitchFamily="18" charset="0"/>
-                      </a:endParaRPr>
-                    </a:p>
-                  </a:txBody>
-                  <a:tcPr anchor="ctr"/>
-                </a:tc>
-                <a:tc>
-                  <a:txBody>
-                    <a:bodyPr/>
-                    <a:lstStyle/>
-                    <a:p>
-                      <a:pPr algn="ctr" fontAlgn="ctr"/>
-                      <a:r>
-                        <a:rPr lang="en-US" altLang="zh-CN" sz="1800" b="0" i="0" u="none" strike="noStrike">
-                          <a:solidFill>
-                            <a:srgbClr val="000000"/>
-                          </a:solidFill>
-                          <a:effectLst/>
-                          <a:latin typeface="Times New Roman" panose="02020603050405020304" pitchFamily="18" charset="0"/>
-                          <a:cs typeface="Times New Roman" panose="02020603050405020304" pitchFamily="18" charset="0"/>
-                        </a:rPr>
-                        <a:t>B0</a:t>
-                      </a:r>
-                      <a:r>
-                        <a:rPr lang="vi-VN" altLang="zh-CN" sz="1800" b="0" i="0" u="none" strike="noStrike">
-                          <a:solidFill>
-                            <a:srgbClr val="000000"/>
-                          </a:solidFill>
-                          <a:effectLst/>
-                          <a:latin typeface="Times New Roman" panose="02020603050405020304" pitchFamily="18" charset="0"/>
-                          <a:cs typeface="Times New Roman" panose="02020603050405020304" pitchFamily="18" charset="0"/>
-                        </a:rPr>
-                        <a:t>-1</a:t>
-                      </a:r>
-                      <a:endParaRPr lang="en-US" altLang="zh-CN" sz="1800" b="0" i="0" u="none" strike="noStrike">
-                        <a:solidFill>
-                          <a:srgbClr val="000000"/>
-                        </a:solidFill>
-                        <a:effectLst/>
-                        <a:latin typeface="Times New Roman" panose="02020603050405020304" pitchFamily="18" charset="0"/>
-                        <a:cs typeface="Times New Roman" panose="02020603050405020304" pitchFamily="18" charset="0"/>
-                      </a:endParaRPr>
-                    </a:p>
-                  </a:txBody>
-                  <a:tcPr marL="9525" marR="9525" marT="9525" marB="0" anchor="ctr"/>
-                </a:tc>
-                <a:tc>
-                  <a:txBody>
-                    <a:bodyPr/>
-                    <a:lstStyle/>
-                    <a:p>
-                      <a:pPr algn="ctr" fontAlgn="ctr"/>
-                      <a:r>
-                        <a:rPr lang="en-US" altLang="zh-CN" sz="1800" b="0" i="0" u="none" strike="noStrike">
-                          <a:solidFill>
-                            <a:srgbClr val="000000"/>
-                          </a:solidFill>
-                          <a:effectLst/>
-                          <a:latin typeface="Times New Roman" panose="02020603050405020304" pitchFamily="18" charset="0"/>
-                          <a:cs typeface="Times New Roman" panose="02020603050405020304" pitchFamily="18" charset="0"/>
-                        </a:rPr>
-                        <a:t>B0</a:t>
-                      </a:r>
-                      <a:r>
-                        <a:rPr lang="vi-VN" altLang="zh-CN" sz="1800" b="0" i="0" u="none" strike="noStrike">
-                          <a:solidFill>
-                            <a:srgbClr val="000000"/>
-                          </a:solidFill>
-                          <a:effectLst/>
-                          <a:latin typeface="Times New Roman" panose="02020603050405020304" pitchFamily="18" charset="0"/>
-                          <a:cs typeface="Times New Roman" panose="02020603050405020304" pitchFamily="18" charset="0"/>
-                        </a:rPr>
-                        <a:t>-2</a:t>
-                      </a:r>
-                      <a:endParaRPr lang="en-US" altLang="zh-CN" sz="1800" b="0" i="0" u="none" strike="noStrike" dirty="0">
-                        <a:solidFill>
-                          <a:srgbClr val="000000"/>
-                        </a:solidFill>
-                        <a:effectLst/>
-                        <a:latin typeface="Times New Roman" panose="02020603050405020304" pitchFamily="18" charset="0"/>
-                        <a:cs typeface="Times New Roman" panose="02020603050405020304" pitchFamily="18" charset="0"/>
-                      </a:endParaRPr>
-                    </a:p>
-                  </a:txBody>
-                  <a:tcPr marL="9525" marR="9525" marT="9525" marB="0" anchor="ctr"/>
-                </a:tc>
-                <a:tc>
-                  <a:txBody>
-                    <a:bodyPr/>
-                    <a:lstStyle/>
-                    <a:p>
-                      <a:pPr algn="ctr" fontAlgn="ctr"/>
-                      <a:r>
-                        <a:rPr lang="en-US" altLang="zh-CN" sz="1800" b="0" i="0" u="none" strike="noStrike">
-                          <a:solidFill>
-                            <a:srgbClr val="000000"/>
-                          </a:solidFill>
-                          <a:effectLst/>
-                          <a:latin typeface="Times New Roman" panose="02020603050405020304" pitchFamily="18" charset="0"/>
-                          <a:cs typeface="Times New Roman" panose="02020603050405020304" pitchFamily="18" charset="0"/>
-                        </a:rPr>
-                        <a:t>B1</a:t>
-                      </a:r>
-                      <a:r>
-                        <a:rPr lang="vi-VN" altLang="zh-CN" sz="1800" b="0" i="0" u="none" strike="noStrike">
-                          <a:solidFill>
-                            <a:srgbClr val="000000"/>
-                          </a:solidFill>
-                          <a:effectLst/>
-                          <a:latin typeface="Times New Roman" panose="02020603050405020304" pitchFamily="18" charset="0"/>
-                          <a:cs typeface="Times New Roman" panose="02020603050405020304" pitchFamily="18" charset="0"/>
-                        </a:rPr>
-                        <a:t>-1</a:t>
-                      </a:r>
-                      <a:endParaRPr lang="en-US" altLang="zh-CN" sz="1800" b="0" i="0" u="none" strike="noStrike">
-                        <a:solidFill>
-                          <a:srgbClr val="000000"/>
-                        </a:solidFill>
-                        <a:effectLst/>
-                        <a:latin typeface="Times New Roman" panose="02020603050405020304" pitchFamily="18" charset="0"/>
-                        <a:cs typeface="Times New Roman" panose="02020603050405020304" pitchFamily="18" charset="0"/>
-                      </a:endParaRPr>
-                    </a:p>
-                  </a:txBody>
-                  <a:tcPr marL="9525" marR="9525" marT="9525" marB="0" anchor="ctr"/>
-                </a:tc>
-                <a:tc>
-                  <a:txBody>
-                    <a:bodyPr/>
-                    <a:lstStyle/>
-                    <a:p>
-                      <a:pPr algn="ctr" fontAlgn="ctr"/>
-                      <a:r>
-                        <a:rPr lang="en-US" altLang="zh-CN" sz="1800" b="0" i="0" u="none" strike="noStrike">
-                          <a:solidFill>
-                            <a:srgbClr val="000000"/>
-                          </a:solidFill>
-                          <a:effectLst/>
-                          <a:latin typeface="Times New Roman" panose="02020603050405020304" pitchFamily="18" charset="0"/>
-                          <a:cs typeface="Times New Roman" panose="02020603050405020304" pitchFamily="18" charset="0"/>
-                        </a:rPr>
-                        <a:t>B1</a:t>
-                      </a:r>
-                      <a:r>
-                        <a:rPr lang="vi-VN" altLang="zh-CN" sz="1800" b="0" i="0" u="none" strike="noStrike">
-                          <a:solidFill>
-                            <a:srgbClr val="000000"/>
-                          </a:solidFill>
-                          <a:effectLst/>
-                          <a:latin typeface="Times New Roman" panose="02020603050405020304" pitchFamily="18" charset="0"/>
-                          <a:cs typeface="Times New Roman" panose="02020603050405020304" pitchFamily="18" charset="0"/>
-                        </a:rPr>
-                        <a:t>-2</a:t>
-                      </a:r>
-                      <a:endParaRPr lang="en-US" altLang="zh-CN" sz="1800" b="0" i="0" u="none" strike="noStrike" dirty="0">
-                        <a:solidFill>
-                          <a:srgbClr val="000000"/>
-                        </a:solidFill>
-                        <a:effectLst/>
-                        <a:latin typeface="Times New Roman" panose="02020603050405020304" pitchFamily="18" charset="0"/>
-                        <a:cs typeface="Times New Roman" panose="02020603050405020304" pitchFamily="18" charset="0"/>
-                      </a:endParaRPr>
-                    </a:p>
-                  </a:txBody>
-                  <a:tcPr marL="9525" marR="9525" marT="9525" marB="0" anchor="ctr"/>
-                </a:tc>
-                <a:tc>
-                  <a:txBody>
-                    <a:bodyPr/>
-                    <a:lstStyle/>
-                    <a:p>
-                      <a:pPr algn="ctr" fontAlgn="ctr"/>
-                      <a:r>
-                        <a:rPr lang="en-US" altLang="zh-CN" sz="1800" b="0" i="0" u="none" strike="noStrike">
-                          <a:solidFill>
-                            <a:srgbClr val="000000"/>
-                          </a:solidFill>
-                          <a:effectLst/>
-                          <a:latin typeface="Times New Roman" panose="02020603050405020304" pitchFamily="18" charset="0"/>
-                          <a:cs typeface="Times New Roman" panose="02020603050405020304" pitchFamily="18" charset="0"/>
-                        </a:rPr>
-                        <a:t>B2</a:t>
-                      </a:r>
-                      <a:r>
-                        <a:rPr lang="vi-VN" altLang="zh-CN" sz="1800" b="0" i="0" u="none" strike="noStrike">
-                          <a:solidFill>
-                            <a:srgbClr val="000000"/>
-                          </a:solidFill>
-                          <a:effectLst/>
-                          <a:latin typeface="Times New Roman" panose="02020603050405020304" pitchFamily="18" charset="0"/>
-                          <a:cs typeface="Times New Roman" panose="02020603050405020304" pitchFamily="18" charset="0"/>
-                        </a:rPr>
-                        <a:t>-1</a:t>
-                      </a:r>
-                      <a:endParaRPr lang="en-US" altLang="zh-CN" sz="1800" b="0" i="0" u="none" strike="noStrike">
-                        <a:solidFill>
-                          <a:srgbClr val="000000"/>
-                        </a:solidFill>
-                        <a:effectLst/>
-                        <a:latin typeface="Times New Roman" panose="02020603050405020304" pitchFamily="18" charset="0"/>
-                        <a:cs typeface="Times New Roman" panose="02020603050405020304" pitchFamily="18" charset="0"/>
-                      </a:endParaRPr>
-                    </a:p>
-                  </a:txBody>
-                  <a:tcPr marL="9525" marR="9525" marT="9525" marB="0" anchor="ctr"/>
-                </a:tc>
-                <a:tc>
-                  <a:txBody>
-                    <a:bodyPr/>
-                    <a:lstStyle/>
-                    <a:p>
-                      <a:pPr algn="ctr" fontAlgn="ctr"/>
-                      <a:r>
-                        <a:rPr lang="en-US" altLang="zh-CN" sz="1800" b="0" i="0" u="none" strike="noStrike">
-                          <a:solidFill>
-                            <a:srgbClr val="000000"/>
-                          </a:solidFill>
-                          <a:effectLst/>
-                          <a:latin typeface="Times New Roman" panose="02020603050405020304" pitchFamily="18" charset="0"/>
-                          <a:cs typeface="Times New Roman" panose="02020603050405020304" pitchFamily="18" charset="0"/>
-                        </a:rPr>
-                        <a:t>B2</a:t>
-                      </a:r>
-                      <a:r>
-                        <a:rPr lang="vi-VN" altLang="zh-CN" sz="1800" b="0" i="0" u="none" strike="noStrike">
-                          <a:solidFill>
-                            <a:srgbClr val="000000"/>
-                          </a:solidFill>
-                          <a:effectLst/>
-                          <a:latin typeface="Times New Roman" panose="02020603050405020304" pitchFamily="18" charset="0"/>
-                          <a:cs typeface="Times New Roman" panose="02020603050405020304" pitchFamily="18" charset="0"/>
-                        </a:rPr>
-                        <a:t>-2</a:t>
-                      </a:r>
-                      <a:endParaRPr lang="en-US" altLang="zh-CN" sz="1800" b="0" i="0" u="none" strike="noStrike" dirty="0">
-                        <a:solidFill>
-                          <a:srgbClr val="000000"/>
-                        </a:solidFill>
-                        <a:effectLst/>
-                        <a:latin typeface="Times New Roman" panose="02020603050405020304" pitchFamily="18" charset="0"/>
-                        <a:cs typeface="Times New Roman" panose="02020603050405020304" pitchFamily="18" charset="0"/>
-                      </a:endParaRPr>
-                    </a:p>
-                  </a:txBody>
-                  <a:tcPr marL="9525" marR="9525" marT="9525" marB="0" anchor="ctr"/>
-                </a:tc>
-                <a:extLst>
-                  <a:ext uri="{0D108BD9-81ED-4DB2-BD59-A6C34878D82A}">
-                    <a16:rowId xmlns:a16="http://schemas.microsoft.com/office/drawing/2014/main" val="10007"/>
                   </a:ext>
                 </a:extLst>
               </a:tr>
@@ -11104,7 +9290,7 @@
     </p:spTree>
     <p:extLst>
       <p:ext uri="{BB962C8B-B14F-4D97-AF65-F5344CB8AC3E}">
-        <p14:creationId xmlns:p14="http://schemas.microsoft.com/office/powerpoint/2010/main" val="158520088"/>
+        <p14:creationId xmlns:p14="http://schemas.microsoft.com/office/powerpoint/2010/main" val="1212513190"/>
       </p:ext>
     </p:extLst>
   </p:cSld>
@@ -11253,7 +9439,7 @@
                 <a:ea typeface="標楷體" panose="03000509000000000000" pitchFamily="65" charset="-120"/>
                 <a:cs typeface="Times New Roman" panose="02020603050405020304" pitchFamily="18" charset="0"/>
               </a:rPr>
-              <a:t>頭端</a:t>
+              <a:t>尾端</a:t>
             </a:r>
             <a:r>
               <a:rPr lang="zh-CN" altLang="en-US" sz="1600" dirty="0">
@@ -11280,14 +9466,14 @@
           <p:nvPr>
             <p:extLst>
               <p:ext uri="{D42A27DB-BD31-4B8C-83A1-F6EECF244321}">
-                <p14:modId xmlns:p14="http://schemas.microsoft.com/office/powerpoint/2010/main" val="1561876761"/>
+                <p14:modId xmlns:p14="http://schemas.microsoft.com/office/powerpoint/2010/main" val="657514633"/>
               </p:ext>
             </p:extLst>
           </p:nvPr>
         </p:nvGraphicFramePr>
         <p:xfrm>
-          <a:off x="29029" y="573948"/>
-          <a:ext cx="11887201" cy="6163047"/>
+          <a:off x="136609" y="573948"/>
+          <a:ext cx="11887197" cy="6163047"/>
         </p:xfrm>
         <a:graphic>
           <a:graphicData uri="http://schemas.openxmlformats.org/drawingml/2006/table">
@@ -11303,28 +9489,28 @@
                     </a:ext>
                   </a:extLst>
                 </a:gridCol>
-                <a:gridCol w="1132114">
+                <a:gridCol w="1634565">
                   <a:extLst>
                     <a:ext uri="{9D8B030D-6E8A-4147-A177-3AD203B41FA5}">
                       <a16:colId xmlns:a16="http://schemas.microsoft.com/office/drawing/2014/main" val="20001"/>
                     </a:ext>
                   </a:extLst>
                 </a:gridCol>
-                <a:gridCol w="3425372">
+                <a:gridCol w="3257887">
                   <a:extLst>
                     <a:ext uri="{9D8B030D-6E8A-4147-A177-3AD203B41FA5}">
                       <a16:colId xmlns:a16="http://schemas.microsoft.com/office/drawing/2014/main" val="20002"/>
                     </a:ext>
                   </a:extLst>
                 </a:gridCol>
-                <a:gridCol w="3425372">
+                <a:gridCol w="3257887">
                   <a:extLst>
                     <a:ext uri="{9D8B030D-6E8A-4147-A177-3AD203B41FA5}">
                       <a16:colId xmlns:a16="http://schemas.microsoft.com/office/drawing/2014/main" val="20003"/>
                     </a:ext>
                   </a:extLst>
                 </a:gridCol>
-                <a:gridCol w="3425372">
+                <a:gridCol w="3257887">
                   <a:extLst>
                     <a:ext uri="{9D8B030D-6E8A-4147-A177-3AD203B41FA5}">
                       <a16:colId xmlns:a16="http://schemas.microsoft.com/office/drawing/2014/main" val="20004"/>
@@ -11373,20 +9559,36 @@
                     <a:p>
                       <a:pPr algn="ctr"/>
                       <a:r>
-                        <a:rPr lang="en-US" altLang="zh-CN" b="1">
-                          <a:latin typeface="Times New Roman" panose="02020603050405020304" pitchFamily="18" charset="0"/>
-                          <a:ea typeface="標楷體" panose="03000509000000000000" pitchFamily="65" charset="-120"/>
-                          <a:cs typeface="Times New Roman" panose="02020603050405020304" pitchFamily="18" charset="0"/>
-                        </a:rPr>
-                        <a:t>XRD</a:t>
-                      </a:r>
-                      <a:r>
-                        <a:rPr lang="zh-CN" altLang="en-US" b="1">
-                          <a:latin typeface="Times New Roman" panose="02020603050405020304" pitchFamily="18" charset="0"/>
-                          <a:ea typeface="標楷體" panose="03000509000000000000" pitchFamily="65" charset="-120"/>
-                          <a:cs typeface="Times New Roman" panose="02020603050405020304" pitchFamily="18" charset="0"/>
-                        </a:rPr>
-                        <a:t>表面分析</a:t>
+                        <a:rPr lang="zh-CN" altLang="en-US" b="1" dirty="0">
+                          <a:latin typeface="Times New Roman" panose="02020603050405020304" pitchFamily="18" charset="0"/>
+                          <a:ea typeface="標楷體" panose="03000509000000000000" pitchFamily="65" charset="-120"/>
+                          <a:cs typeface="Times New Roman" panose="02020603050405020304" pitchFamily="18" charset="0"/>
+                        </a:rPr>
+                        <a:t>銹皮厚度</a:t>
+                      </a:r>
+                      <a:r>
+                        <a:rPr lang="zh-TW" altLang="en-US" b="1" dirty="0">
+                          <a:latin typeface="Times New Roman" panose="02020603050405020304" pitchFamily="18" charset="0"/>
+                          <a:ea typeface="標楷體" panose="03000509000000000000" pitchFamily="65" charset="-120"/>
+                          <a:cs typeface="Times New Roman" panose="02020603050405020304" pitchFamily="18" charset="0"/>
+                        </a:rPr>
+                        <a:t>量測</a:t>
+                      </a:r>
+                      <a:r>
+                        <a:rPr lang="zh-CN" altLang="en-US" b="1" dirty="0">
+                          <a:latin typeface="Times New Roman" panose="02020603050405020304" pitchFamily="18" charset="0"/>
+                          <a:ea typeface="標楷體" panose="03000509000000000000" pitchFamily="65" charset="-120"/>
+                          <a:cs typeface="Times New Roman" panose="02020603050405020304" pitchFamily="18" charset="0"/>
+                        </a:rPr>
+                        <a:t>及硬度</a:t>
+                      </a:r>
+                      <a:r>
+                        <a:rPr lang="zh-TW" altLang="en-US" b="1" dirty="0">
+                          <a:latin typeface="Times New Roman" panose="02020603050405020304" pitchFamily="18" charset="0"/>
+                          <a:ea typeface="標楷體" panose="03000509000000000000" pitchFamily="65" charset="-120"/>
+                          <a:cs typeface="Times New Roman" panose="02020603050405020304" pitchFamily="18" charset="0"/>
+                        </a:rPr>
+                        <a:t>試驗</a:t>
                       </a:r>
                     </a:p>
                   </a:txBody>
@@ -11577,8 +9779,8 @@
                   </a:ext>
                 </a:extLst>
               </a:tr>
-              <a:tr h="2678087">
-                <a:tc>
+              <a:tr h="1946567">
+                <a:tc rowSpan="3">
                   <a:txBody>
                     <a:bodyPr/>
                     <a:lstStyle/>
@@ -11715,8 +9917,362 @@
                   </a:ext>
                 </a:extLst>
               </a:tr>
-              <a:tr h="2687100">
-                <a:tc>
+              <a:tr h="365760">
+                <a:tc vMerge="1">
+                  <a:txBody>
+                    <a:bodyPr/>
+                    <a:lstStyle/>
+                    <a:p>
+                      <a:pPr marL="0" marR="0" indent="0" algn="ctr" defTabSz="914400" rtl="0" eaLnBrk="1" fontAlgn="auto" latinLnBrk="0" hangingPunct="1">
+                        <a:lnSpc>
+                          <a:spcPct val="100000"/>
+                        </a:lnSpc>
+                        <a:spcBef>
+                          <a:spcPts val="0"/>
+                        </a:spcBef>
+                        <a:spcAft>
+                          <a:spcPts val="0"/>
+                        </a:spcAft>
+                        <a:buClrTx/>
+                        <a:buSzTx/>
+                        <a:buFontTx/>
+                        <a:buNone/>
+                        <a:tabLst/>
+                        <a:defRPr/>
+                      </a:pPr>
+                      <a:endParaRPr lang="zh-TW" altLang="en-US" dirty="0">
+                        <a:latin typeface="Times New Roman" panose="02020603050405020304" pitchFamily="18" charset="0"/>
+                        <a:ea typeface="標楷體" panose="03000509000000000000" pitchFamily="65" charset="-120"/>
+                        <a:cs typeface="Times New Roman" panose="02020603050405020304" pitchFamily="18" charset="0"/>
+                      </a:endParaRPr>
+                    </a:p>
+                  </a:txBody>
+                  <a:tcPr anchor="ctr"/>
+                </a:tc>
+                <a:tc>
+                  <a:txBody>
+                    <a:bodyPr/>
+                    <a:lstStyle/>
+                    <a:p>
+                      <a:r>
+                        <a:rPr lang="zh-CN" altLang="en-US" dirty="0">
+                          <a:latin typeface="Times New Roman" panose="02020603050405020304" pitchFamily="18" charset="0"/>
+                          <a:ea typeface="標楷體" panose="03000509000000000000" pitchFamily="65" charset="-120"/>
+                          <a:cs typeface="Times New Roman" panose="02020603050405020304" pitchFamily="18" charset="0"/>
+                        </a:rPr>
+                        <a:t>厚度</a:t>
+                      </a:r>
+                      <a:r>
+                        <a:rPr lang="en-US" altLang="zh-CN" dirty="0">
+                          <a:latin typeface="Times New Roman" panose="02020603050405020304" pitchFamily="18" charset="0"/>
+                          <a:ea typeface="標楷體" panose="03000509000000000000" pitchFamily="65" charset="-120"/>
+                          <a:cs typeface="Times New Roman" panose="02020603050405020304" pitchFamily="18" charset="0"/>
+                        </a:rPr>
+                        <a:t>(</a:t>
+                      </a:r>
+                      <a:r>
+                        <a:rPr lang="en-US" altLang="zh-CN" dirty="0" err="1">
+                          <a:latin typeface="Times New Roman" panose="02020603050405020304" pitchFamily="18" charset="0"/>
+                          <a:ea typeface="標楷體" panose="03000509000000000000" pitchFamily="65" charset="-120"/>
+                          <a:cs typeface="Times New Roman" panose="02020603050405020304" pitchFamily="18" charset="0"/>
+                        </a:rPr>
+                        <a:t>μm</a:t>
+                      </a:r>
+                      <a:r>
+                        <a:rPr lang="en-US" altLang="zh-CN" dirty="0">
+                          <a:latin typeface="Times New Roman" panose="02020603050405020304" pitchFamily="18" charset="0"/>
+                          <a:ea typeface="標楷體" panose="03000509000000000000" pitchFamily="65" charset="-120"/>
+                          <a:cs typeface="Times New Roman" panose="02020603050405020304" pitchFamily="18" charset="0"/>
+                        </a:rPr>
+                        <a:t>)</a:t>
+                      </a:r>
+                      <a:endParaRPr lang="zh-TW" altLang="en-US" dirty="0">
+                        <a:latin typeface="Times New Roman" panose="02020603050405020304" pitchFamily="18" charset="0"/>
+                        <a:ea typeface="標楷體" panose="03000509000000000000" pitchFamily="65" charset="-120"/>
+                        <a:cs typeface="Times New Roman" panose="02020603050405020304" pitchFamily="18" charset="0"/>
+                      </a:endParaRPr>
+                    </a:p>
+                  </a:txBody>
+                  <a:tcPr anchor="ctr"/>
+                </a:tc>
+                <a:tc>
+                  <a:txBody>
+                    <a:bodyPr/>
+                    <a:lstStyle/>
+                    <a:p>
+                      <a:pPr marL="0" marR="0" indent="0" algn="ctr" defTabSz="914400" rtl="0" eaLnBrk="1" fontAlgn="auto" latinLnBrk="0" hangingPunct="1">
+                        <a:lnSpc>
+                          <a:spcPct val="100000"/>
+                        </a:lnSpc>
+                        <a:spcBef>
+                          <a:spcPts val="0"/>
+                        </a:spcBef>
+                        <a:spcAft>
+                          <a:spcPts val="0"/>
+                        </a:spcAft>
+                        <a:buClrTx/>
+                        <a:buSzTx/>
+                        <a:buFontTx/>
+                        <a:buNone/>
+                        <a:tabLst/>
+                        <a:defRPr/>
+                      </a:pPr>
+                      <a:r>
+                        <a:rPr lang="en-US" altLang="zh-CN">
+                          <a:latin typeface="Times New Roman" panose="02020603050405020304" pitchFamily="18" charset="0"/>
+                          <a:ea typeface="標楷體" panose="03000509000000000000" pitchFamily="65" charset="-120"/>
+                          <a:cs typeface="Times New Roman" panose="02020603050405020304" pitchFamily="18" charset="0"/>
+                        </a:rPr>
+                        <a:t>T0-1μm</a:t>
+                      </a:r>
+                      <a:endParaRPr lang="zh-TW" altLang="en-US" dirty="0">
+                        <a:latin typeface="Times New Roman" panose="02020603050405020304" pitchFamily="18" charset="0"/>
+                        <a:ea typeface="標楷體" panose="03000509000000000000" pitchFamily="65" charset="-120"/>
+                        <a:cs typeface="Times New Roman" panose="02020603050405020304" pitchFamily="18" charset="0"/>
+                      </a:endParaRPr>
+                    </a:p>
+                  </a:txBody>
+                  <a:tcPr anchor="ctr"/>
+                </a:tc>
+                <a:tc>
+                  <a:txBody>
+                    <a:bodyPr/>
+                    <a:lstStyle/>
+                    <a:p>
+                      <a:pPr marL="0" marR="0" indent="0" algn="ctr" defTabSz="914400" rtl="0" eaLnBrk="1" fontAlgn="auto" latinLnBrk="0" hangingPunct="1">
+                        <a:lnSpc>
+                          <a:spcPct val="100000"/>
+                        </a:lnSpc>
+                        <a:spcBef>
+                          <a:spcPts val="0"/>
+                        </a:spcBef>
+                        <a:spcAft>
+                          <a:spcPts val="0"/>
+                        </a:spcAft>
+                        <a:buClrTx/>
+                        <a:buSzTx/>
+                        <a:buFontTx/>
+                        <a:buNone/>
+                        <a:tabLst/>
+                        <a:defRPr/>
+                      </a:pPr>
+                      <a:r>
+                        <a:rPr lang="en-US" altLang="zh-CN">
+                          <a:latin typeface="Times New Roman" panose="02020603050405020304" pitchFamily="18" charset="0"/>
+                          <a:ea typeface="標楷體" panose="03000509000000000000" pitchFamily="65" charset="-120"/>
+                          <a:cs typeface="Times New Roman" panose="02020603050405020304" pitchFamily="18" charset="0"/>
+                        </a:rPr>
+                        <a:t>T1-1μm</a:t>
+                      </a:r>
+                      <a:endParaRPr lang="zh-TW" altLang="en-US" dirty="0">
+                        <a:latin typeface="Times New Roman" panose="02020603050405020304" pitchFamily="18" charset="0"/>
+                        <a:ea typeface="標楷體" panose="03000509000000000000" pitchFamily="65" charset="-120"/>
+                        <a:cs typeface="Times New Roman" panose="02020603050405020304" pitchFamily="18" charset="0"/>
+                      </a:endParaRPr>
+                    </a:p>
+                  </a:txBody>
+                  <a:tcPr anchor="ctr"/>
+                </a:tc>
+                <a:tc>
+                  <a:txBody>
+                    <a:bodyPr/>
+                    <a:lstStyle/>
+                    <a:p>
+                      <a:pPr marL="0" marR="0" indent="0" algn="ctr" defTabSz="914400" rtl="0" eaLnBrk="1" fontAlgn="auto" latinLnBrk="0" hangingPunct="1">
+                        <a:lnSpc>
+                          <a:spcPct val="100000"/>
+                        </a:lnSpc>
+                        <a:spcBef>
+                          <a:spcPts val="0"/>
+                        </a:spcBef>
+                        <a:spcAft>
+                          <a:spcPts val="0"/>
+                        </a:spcAft>
+                        <a:buClrTx/>
+                        <a:buSzTx/>
+                        <a:buFontTx/>
+                        <a:buNone/>
+                        <a:tabLst/>
+                        <a:defRPr/>
+                      </a:pPr>
+                      <a:r>
+                        <a:rPr lang="en-US" altLang="zh-CN">
+                          <a:latin typeface="Times New Roman" panose="02020603050405020304" pitchFamily="18" charset="0"/>
+                          <a:ea typeface="標楷體" panose="03000509000000000000" pitchFamily="65" charset="-120"/>
+                          <a:cs typeface="Times New Roman" panose="02020603050405020304" pitchFamily="18" charset="0"/>
+                        </a:rPr>
+                        <a:t>T2-1μm</a:t>
+                      </a:r>
+                      <a:endParaRPr lang="zh-TW" altLang="en-US" dirty="0">
+                        <a:latin typeface="Times New Roman" panose="02020603050405020304" pitchFamily="18" charset="0"/>
+                        <a:ea typeface="標楷體" panose="03000509000000000000" pitchFamily="65" charset="-120"/>
+                        <a:cs typeface="Times New Roman" panose="02020603050405020304" pitchFamily="18" charset="0"/>
+                      </a:endParaRPr>
+                    </a:p>
+                  </a:txBody>
+                  <a:tcPr anchor="ctr"/>
+                </a:tc>
+                <a:extLst>
+                  <a:ext uri="{0D108BD9-81ED-4DB2-BD59-A6C34878D82A}">
+                    <a16:rowId xmlns:a16="http://schemas.microsoft.com/office/drawing/2014/main" val="10003"/>
+                  </a:ext>
+                </a:extLst>
+              </a:tr>
+              <a:tr h="365760">
+                <a:tc vMerge="1">
+                  <a:txBody>
+                    <a:bodyPr/>
+                    <a:lstStyle/>
+                    <a:p>
+                      <a:pPr marL="0" marR="0" indent="0" algn="ctr" defTabSz="914400" rtl="0" eaLnBrk="1" fontAlgn="auto" latinLnBrk="0" hangingPunct="1">
+                        <a:lnSpc>
+                          <a:spcPct val="100000"/>
+                        </a:lnSpc>
+                        <a:spcBef>
+                          <a:spcPts val="0"/>
+                        </a:spcBef>
+                        <a:spcAft>
+                          <a:spcPts val="0"/>
+                        </a:spcAft>
+                        <a:buClrTx/>
+                        <a:buSzTx/>
+                        <a:buFontTx/>
+                        <a:buNone/>
+                        <a:tabLst/>
+                        <a:defRPr/>
+                      </a:pPr>
+                      <a:endParaRPr lang="zh-TW" altLang="en-US" dirty="0">
+                        <a:latin typeface="Times New Roman" panose="02020603050405020304" pitchFamily="18" charset="0"/>
+                        <a:ea typeface="標楷體" panose="03000509000000000000" pitchFamily="65" charset="-120"/>
+                        <a:cs typeface="Times New Roman" panose="02020603050405020304" pitchFamily="18" charset="0"/>
+                      </a:endParaRPr>
+                    </a:p>
+                  </a:txBody>
+                  <a:tcPr anchor="ctr"/>
+                </a:tc>
+                <a:tc>
+                  <a:txBody>
+                    <a:bodyPr/>
+                    <a:lstStyle/>
+                    <a:p>
+                      <a:r>
+                        <a:rPr lang="zh-CN" altLang="en-US">
+                          <a:latin typeface="Times New Roman" panose="02020603050405020304" pitchFamily="18" charset="0"/>
+                          <a:ea typeface="標楷體" panose="03000509000000000000" pitchFamily="65" charset="-120"/>
+                          <a:cs typeface="Times New Roman" panose="02020603050405020304" pitchFamily="18" charset="0"/>
+                        </a:rPr>
+                        <a:t>硬度</a:t>
+                      </a:r>
+                      <a:r>
+                        <a:rPr lang="en-US" altLang="zh-CN">
+                          <a:latin typeface="Times New Roman" panose="02020603050405020304" pitchFamily="18" charset="0"/>
+                          <a:ea typeface="標楷體" panose="03000509000000000000" pitchFamily="65" charset="-120"/>
+                          <a:cs typeface="Times New Roman" panose="02020603050405020304" pitchFamily="18" charset="0"/>
+                        </a:rPr>
+                        <a:t>(</a:t>
+                      </a:r>
+                      <a:r>
+                        <a:rPr lang="vi-VN" altLang="zh-CN">
+                          <a:latin typeface="Times New Roman" panose="02020603050405020304" pitchFamily="18" charset="0"/>
+                          <a:ea typeface="標楷體" panose="03000509000000000000" pitchFamily="65" charset="-120"/>
+                          <a:cs typeface="Times New Roman" panose="02020603050405020304" pitchFamily="18" charset="0"/>
+                        </a:rPr>
+                        <a:t>HV0.005</a:t>
+                      </a:r>
+                      <a:r>
+                        <a:rPr lang="en-US" altLang="zh-CN">
+                          <a:latin typeface="Times New Roman" panose="02020603050405020304" pitchFamily="18" charset="0"/>
+                          <a:ea typeface="標楷體" panose="03000509000000000000" pitchFamily="65" charset="-120"/>
+                          <a:cs typeface="Times New Roman" panose="02020603050405020304" pitchFamily="18" charset="0"/>
+                        </a:rPr>
+                        <a:t>)</a:t>
+                      </a:r>
+                      <a:endParaRPr lang="zh-TW" altLang="en-US" dirty="0">
+                        <a:latin typeface="Times New Roman" panose="02020603050405020304" pitchFamily="18" charset="0"/>
+                        <a:ea typeface="標楷體" panose="03000509000000000000" pitchFamily="65" charset="-120"/>
+                        <a:cs typeface="Times New Roman" panose="02020603050405020304" pitchFamily="18" charset="0"/>
+                      </a:endParaRPr>
+                    </a:p>
+                  </a:txBody>
+                  <a:tcPr anchor="ctr"/>
+                </a:tc>
+                <a:tc>
+                  <a:txBody>
+                    <a:bodyPr/>
+                    <a:lstStyle/>
+                    <a:p>
+                      <a:pPr algn="ctr"/>
+                      <a:r>
+                        <a:rPr lang="en-US" altLang="zh-CN">
+                          <a:latin typeface="Times New Roman" panose="02020603050405020304" pitchFamily="18" charset="0"/>
+                          <a:ea typeface="標楷體" panose="03000509000000000000" pitchFamily="65" charset="-120"/>
+                          <a:cs typeface="Times New Roman" panose="02020603050405020304" pitchFamily="18" charset="0"/>
+                        </a:rPr>
+                        <a:t>T0-2</a:t>
+                      </a:r>
+                      <a:endParaRPr lang="zh-TW" altLang="en-US" dirty="0">
+                        <a:latin typeface="Times New Roman" panose="02020603050405020304" pitchFamily="18" charset="0"/>
+                        <a:ea typeface="標楷體" panose="03000509000000000000" pitchFamily="65" charset="-120"/>
+                        <a:cs typeface="Times New Roman" panose="02020603050405020304" pitchFamily="18" charset="0"/>
+                      </a:endParaRPr>
+                    </a:p>
+                  </a:txBody>
+                  <a:tcPr anchor="ctr"/>
+                </a:tc>
+                <a:tc>
+                  <a:txBody>
+                    <a:bodyPr/>
+                    <a:lstStyle/>
+                    <a:p>
+                      <a:pPr algn="ctr"/>
+                      <a:r>
+                        <a:rPr lang="en-US" altLang="zh-CN">
+                          <a:latin typeface="Times New Roman" panose="02020603050405020304" pitchFamily="18" charset="0"/>
+                          <a:ea typeface="標楷體" panose="03000509000000000000" pitchFamily="65" charset="-120"/>
+                          <a:cs typeface="Times New Roman" panose="02020603050405020304" pitchFamily="18" charset="0"/>
+                        </a:rPr>
+                        <a:t>T1-2</a:t>
+                      </a:r>
+                      <a:endParaRPr lang="zh-TW" altLang="en-US" dirty="0">
+                        <a:latin typeface="Times New Roman" panose="02020603050405020304" pitchFamily="18" charset="0"/>
+                        <a:ea typeface="標楷體" panose="03000509000000000000" pitchFamily="65" charset="-120"/>
+                        <a:cs typeface="Times New Roman" panose="02020603050405020304" pitchFamily="18" charset="0"/>
+                      </a:endParaRPr>
+                    </a:p>
+                  </a:txBody>
+                  <a:tcPr anchor="ctr"/>
+                </a:tc>
+                <a:tc>
+                  <a:txBody>
+                    <a:bodyPr/>
+                    <a:lstStyle/>
+                    <a:p>
+                      <a:pPr algn="ctr"/>
+                      <a:r>
+                        <a:rPr lang="en-US" altLang="zh-CN">
+                          <a:latin typeface="Times New Roman" panose="02020603050405020304" pitchFamily="18" charset="0"/>
+                          <a:ea typeface="標楷體" panose="03000509000000000000" pitchFamily="65" charset="-120"/>
+                          <a:cs typeface="Times New Roman" panose="02020603050405020304" pitchFamily="18" charset="0"/>
+                        </a:rPr>
+                        <a:t>T2-2</a:t>
+                      </a:r>
+                      <a:endParaRPr lang="zh-TW" altLang="en-US" dirty="0">
+                        <a:latin typeface="Times New Roman" panose="02020603050405020304" pitchFamily="18" charset="0"/>
+                        <a:ea typeface="標楷體" panose="03000509000000000000" pitchFamily="65" charset="-120"/>
+                        <a:cs typeface="Times New Roman" panose="02020603050405020304" pitchFamily="18" charset="0"/>
+                      </a:endParaRPr>
+                    </a:p>
+                  </a:txBody>
+                  <a:tcPr anchor="ctr"/>
+                </a:tc>
+                <a:extLst>
+                  <a:ext uri="{0D108BD9-81ED-4DB2-BD59-A6C34878D82A}">
+                    <a16:rowId xmlns:a16="http://schemas.microsoft.com/office/drawing/2014/main" val="10004"/>
+                  </a:ext>
+                </a:extLst>
+              </a:tr>
+              <a:tr h="1950908">
+                <a:tc rowSpan="3">
                   <a:txBody>
                     <a:bodyPr/>
                     <a:lstStyle/>
@@ -11938,6 +10494,344 @@
                 <a:extLst>
                   <a:ext uri="{0D108BD9-81ED-4DB2-BD59-A6C34878D82A}">
                     <a16:rowId xmlns:a16="http://schemas.microsoft.com/office/drawing/2014/main" val="10005"/>
+                  </a:ext>
+                </a:extLst>
+              </a:tr>
+              <a:tr h="368096">
+                <a:tc vMerge="1">
+                  <a:txBody>
+                    <a:bodyPr/>
+                    <a:lstStyle/>
+                    <a:p>
+                      <a:pPr marL="0" marR="0" indent="0" algn="ctr" defTabSz="914400" rtl="0" eaLnBrk="1" fontAlgn="auto" latinLnBrk="0" hangingPunct="1">
+                        <a:lnSpc>
+                          <a:spcPct val="100000"/>
+                        </a:lnSpc>
+                        <a:spcBef>
+                          <a:spcPts val="0"/>
+                        </a:spcBef>
+                        <a:spcAft>
+                          <a:spcPts val="0"/>
+                        </a:spcAft>
+                        <a:buClrTx/>
+                        <a:buSzTx/>
+                        <a:buFontTx/>
+                        <a:buNone/>
+                        <a:tabLst/>
+                        <a:defRPr/>
+                      </a:pPr>
+                      <a:endParaRPr lang="zh-TW" altLang="en-US" dirty="0">
+                        <a:latin typeface="Times New Roman" panose="02020603050405020304" pitchFamily="18" charset="0"/>
+                        <a:ea typeface="標楷體" panose="03000509000000000000" pitchFamily="65" charset="-120"/>
+                        <a:cs typeface="Times New Roman" panose="02020603050405020304" pitchFamily="18" charset="0"/>
+                      </a:endParaRPr>
+                    </a:p>
+                  </a:txBody>
+                  <a:tcPr anchor="ctr"/>
+                </a:tc>
+                <a:tc>
+                  <a:txBody>
+                    <a:bodyPr/>
+                    <a:lstStyle/>
+                    <a:p>
+                      <a:r>
+                        <a:rPr lang="zh-CN" altLang="en-US" dirty="0">
+                          <a:latin typeface="Times New Roman" panose="02020603050405020304" pitchFamily="18" charset="0"/>
+                          <a:ea typeface="標楷體" panose="03000509000000000000" pitchFamily="65" charset="-120"/>
+                          <a:cs typeface="Times New Roman" panose="02020603050405020304" pitchFamily="18" charset="0"/>
+                        </a:rPr>
+                        <a:t>厚度</a:t>
+                      </a:r>
+                      <a:r>
+                        <a:rPr lang="en-US" altLang="zh-CN" dirty="0">
+                          <a:latin typeface="Times New Roman" panose="02020603050405020304" pitchFamily="18" charset="0"/>
+                          <a:ea typeface="標楷體" panose="03000509000000000000" pitchFamily="65" charset="-120"/>
+                          <a:cs typeface="Times New Roman" panose="02020603050405020304" pitchFamily="18" charset="0"/>
+                        </a:rPr>
+                        <a:t>(</a:t>
+                      </a:r>
+                      <a:r>
+                        <a:rPr lang="en-US" altLang="zh-CN" dirty="0" err="1">
+                          <a:latin typeface="Times New Roman" panose="02020603050405020304" pitchFamily="18" charset="0"/>
+                          <a:ea typeface="標楷體" panose="03000509000000000000" pitchFamily="65" charset="-120"/>
+                          <a:cs typeface="Times New Roman" panose="02020603050405020304" pitchFamily="18" charset="0"/>
+                        </a:rPr>
+                        <a:t>μm</a:t>
+                      </a:r>
+                      <a:r>
+                        <a:rPr lang="en-US" altLang="zh-CN" dirty="0">
+                          <a:latin typeface="Times New Roman" panose="02020603050405020304" pitchFamily="18" charset="0"/>
+                          <a:ea typeface="標楷體" panose="03000509000000000000" pitchFamily="65" charset="-120"/>
+                          <a:cs typeface="Times New Roman" panose="02020603050405020304" pitchFamily="18" charset="0"/>
+                        </a:rPr>
+                        <a:t>)</a:t>
+                      </a:r>
+                      <a:endParaRPr lang="zh-TW" altLang="en-US" dirty="0">
+                        <a:latin typeface="Times New Roman" panose="02020603050405020304" pitchFamily="18" charset="0"/>
+                        <a:ea typeface="標楷體" panose="03000509000000000000" pitchFamily="65" charset="-120"/>
+                        <a:cs typeface="Times New Roman" panose="02020603050405020304" pitchFamily="18" charset="0"/>
+                      </a:endParaRPr>
+                    </a:p>
+                  </a:txBody>
+                  <a:tcPr anchor="ctr"/>
+                </a:tc>
+                <a:tc>
+                  <a:txBody>
+                    <a:bodyPr/>
+                    <a:lstStyle/>
+                    <a:p>
+                      <a:pPr marL="0" marR="0" indent="0" algn="ctr" defTabSz="914400" rtl="0" eaLnBrk="1" fontAlgn="auto" latinLnBrk="0" hangingPunct="1">
+                        <a:lnSpc>
+                          <a:spcPct val="100000"/>
+                        </a:lnSpc>
+                        <a:spcBef>
+                          <a:spcPts val="0"/>
+                        </a:spcBef>
+                        <a:spcAft>
+                          <a:spcPts val="0"/>
+                        </a:spcAft>
+                        <a:buClrTx/>
+                        <a:buSzTx/>
+                        <a:buFontTx/>
+                        <a:buNone/>
+                        <a:tabLst/>
+                        <a:defRPr/>
+                      </a:pPr>
+                      <a:r>
+                        <a:rPr lang="en-US" altLang="zh-CN">
+                          <a:latin typeface="Times New Roman" panose="02020603050405020304" pitchFamily="18" charset="0"/>
+                          <a:ea typeface="標楷體" panose="03000509000000000000" pitchFamily="65" charset="-120"/>
+                          <a:cs typeface="Times New Roman" panose="02020603050405020304" pitchFamily="18" charset="0"/>
+                        </a:rPr>
+                        <a:t>B0-1μm</a:t>
+                      </a:r>
+                      <a:endParaRPr lang="zh-TW" altLang="en-US" dirty="0">
+                        <a:latin typeface="Times New Roman" panose="02020603050405020304" pitchFamily="18" charset="0"/>
+                        <a:ea typeface="標楷體" panose="03000509000000000000" pitchFamily="65" charset="-120"/>
+                        <a:cs typeface="Times New Roman" panose="02020603050405020304" pitchFamily="18" charset="0"/>
+                      </a:endParaRPr>
+                    </a:p>
+                  </a:txBody>
+                  <a:tcPr anchor="ctr"/>
+                </a:tc>
+                <a:tc>
+                  <a:txBody>
+                    <a:bodyPr/>
+                    <a:lstStyle/>
+                    <a:p>
+                      <a:pPr marL="0" marR="0" indent="0" algn="ctr" defTabSz="914400" rtl="0" eaLnBrk="1" fontAlgn="auto" latinLnBrk="0" hangingPunct="1">
+                        <a:lnSpc>
+                          <a:spcPct val="100000"/>
+                        </a:lnSpc>
+                        <a:spcBef>
+                          <a:spcPts val="0"/>
+                        </a:spcBef>
+                        <a:spcAft>
+                          <a:spcPts val="0"/>
+                        </a:spcAft>
+                        <a:buClrTx/>
+                        <a:buSzTx/>
+                        <a:buFontTx/>
+                        <a:buNone/>
+                        <a:tabLst/>
+                        <a:defRPr/>
+                      </a:pPr>
+                      <a:r>
+                        <a:rPr lang="en-US" altLang="zh-CN">
+                          <a:latin typeface="Times New Roman" panose="02020603050405020304" pitchFamily="18" charset="0"/>
+                          <a:ea typeface="標楷體" panose="03000509000000000000" pitchFamily="65" charset="-120"/>
+                          <a:cs typeface="Times New Roman" panose="02020603050405020304" pitchFamily="18" charset="0"/>
+                        </a:rPr>
+                        <a:t>B1-1μm</a:t>
+                      </a:r>
+                      <a:endParaRPr lang="zh-TW" altLang="en-US" dirty="0">
+                        <a:latin typeface="Times New Roman" panose="02020603050405020304" pitchFamily="18" charset="0"/>
+                        <a:ea typeface="標楷體" panose="03000509000000000000" pitchFamily="65" charset="-120"/>
+                        <a:cs typeface="Times New Roman" panose="02020603050405020304" pitchFamily="18" charset="0"/>
+                      </a:endParaRPr>
+                    </a:p>
+                  </a:txBody>
+                  <a:tcPr anchor="ctr"/>
+                </a:tc>
+                <a:tc>
+                  <a:txBody>
+                    <a:bodyPr/>
+                    <a:lstStyle/>
+                    <a:p>
+                      <a:pPr marL="0" marR="0" indent="0" algn="ctr" defTabSz="914400" rtl="0" eaLnBrk="1" fontAlgn="auto" latinLnBrk="0" hangingPunct="1">
+                        <a:lnSpc>
+                          <a:spcPct val="100000"/>
+                        </a:lnSpc>
+                        <a:spcBef>
+                          <a:spcPts val="0"/>
+                        </a:spcBef>
+                        <a:spcAft>
+                          <a:spcPts val="0"/>
+                        </a:spcAft>
+                        <a:buClrTx/>
+                        <a:buSzTx/>
+                        <a:buFontTx/>
+                        <a:buNone/>
+                        <a:tabLst/>
+                        <a:defRPr/>
+                      </a:pPr>
+                      <a:r>
+                        <a:rPr lang="en-US" altLang="zh-CN">
+                          <a:latin typeface="Times New Roman" panose="02020603050405020304" pitchFamily="18" charset="0"/>
+                          <a:ea typeface="標楷體" panose="03000509000000000000" pitchFamily="65" charset="-120"/>
+                          <a:cs typeface="Times New Roman" panose="02020603050405020304" pitchFamily="18" charset="0"/>
+                        </a:rPr>
+                        <a:t>B2-1μm</a:t>
+                      </a:r>
+                      <a:endParaRPr lang="zh-TW" altLang="en-US" dirty="0">
+                        <a:latin typeface="Times New Roman" panose="02020603050405020304" pitchFamily="18" charset="0"/>
+                        <a:ea typeface="標楷體" panose="03000509000000000000" pitchFamily="65" charset="-120"/>
+                        <a:cs typeface="Times New Roman" panose="02020603050405020304" pitchFamily="18" charset="0"/>
+                      </a:endParaRPr>
+                    </a:p>
+                  </a:txBody>
+                  <a:tcPr anchor="ctr"/>
+                </a:tc>
+                <a:extLst>
+                  <a:ext uri="{0D108BD9-81ED-4DB2-BD59-A6C34878D82A}">
+                    <a16:rowId xmlns:a16="http://schemas.microsoft.com/office/drawing/2014/main" val="10006"/>
+                  </a:ext>
+                </a:extLst>
+              </a:tr>
+              <a:tr h="368096">
+                <a:tc vMerge="1">
+                  <a:txBody>
+                    <a:bodyPr/>
+                    <a:lstStyle/>
+                    <a:p>
+                      <a:pPr marL="0" marR="0" indent="0" algn="ctr" defTabSz="914400" rtl="0" eaLnBrk="1" fontAlgn="auto" latinLnBrk="0" hangingPunct="1">
+                        <a:lnSpc>
+                          <a:spcPct val="100000"/>
+                        </a:lnSpc>
+                        <a:spcBef>
+                          <a:spcPts val="0"/>
+                        </a:spcBef>
+                        <a:spcAft>
+                          <a:spcPts val="0"/>
+                        </a:spcAft>
+                        <a:buClrTx/>
+                        <a:buSzTx/>
+                        <a:buFontTx/>
+                        <a:buNone/>
+                        <a:tabLst/>
+                        <a:defRPr/>
+                      </a:pPr>
+                      <a:endParaRPr lang="zh-TW" altLang="en-US" dirty="0">
+                        <a:latin typeface="Times New Roman" panose="02020603050405020304" pitchFamily="18" charset="0"/>
+                        <a:ea typeface="標楷體" panose="03000509000000000000" pitchFamily="65" charset="-120"/>
+                        <a:cs typeface="Times New Roman" panose="02020603050405020304" pitchFamily="18" charset="0"/>
+                      </a:endParaRPr>
+                    </a:p>
+                  </a:txBody>
+                  <a:tcPr anchor="ctr"/>
+                </a:tc>
+                <a:tc>
+                  <a:txBody>
+                    <a:bodyPr/>
+                    <a:lstStyle/>
+                    <a:p>
+                      <a:r>
+                        <a:rPr lang="zh-CN" altLang="en-US" dirty="0">
+                          <a:latin typeface="Times New Roman" panose="02020603050405020304" pitchFamily="18" charset="0"/>
+                          <a:ea typeface="標楷體" panose="03000509000000000000" pitchFamily="65" charset="-120"/>
+                          <a:cs typeface="Times New Roman" panose="02020603050405020304" pitchFamily="18" charset="0"/>
+                        </a:rPr>
+                        <a:t>硬度</a:t>
+                      </a:r>
+                      <a:r>
+                        <a:rPr lang="en-US" altLang="zh-CN" dirty="0">
+                          <a:latin typeface="Times New Roman" panose="02020603050405020304" pitchFamily="18" charset="0"/>
+                          <a:ea typeface="標楷體" panose="03000509000000000000" pitchFamily="65" charset="-120"/>
+                          <a:cs typeface="Times New Roman" panose="02020603050405020304" pitchFamily="18" charset="0"/>
+                        </a:rPr>
+                        <a:t>(HV)</a:t>
+                      </a:r>
+                      <a:endParaRPr lang="zh-TW" altLang="en-US" dirty="0">
+                        <a:latin typeface="Times New Roman" panose="02020603050405020304" pitchFamily="18" charset="0"/>
+                        <a:ea typeface="標楷體" panose="03000509000000000000" pitchFamily="65" charset="-120"/>
+                        <a:cs typeface="Times New Roman" panose="02020603050405020304" pitchFamily="18" charset="0"/>
+                      </a:endParaRPr>
+                    </a:p>
+                  </a:txBody>
+                  <a:tcPr anchor="ctr"/>
+                </a:tc>
+                <a:tc>
+                  <a:txBody>
+                    <a:bodyPr/>
+                    <a:lstStyle/>
+                    <a:p>
+                      <a:pPr algn="ctr"/>
+                      <a:r>
+                        <a:rPr lang="en-US" altLang="zh-CN">
+                          <a:latin typeface="Times New Roman" panose="02020603050405020304" pitchFamily="18" charset="0"/>
+                          <a:ea typeface="標楷體" panose="03000509000000000000" pitchFamily="65" charset="-120"/>
+                          <a:cs typeface="Times New Roman" panose="02020603050405020304" pitchFamily="18" charset="0"/>
+                        </a:rPr>
+                        <a:t>B0-2</a:t>
+                      </a:r>
+                      <a:endParaRPr lang="zh-TW" altLang="en-US" dirty="0">
+                        <a:latin typeface="Times New Roman" panose="02020603050405020304" pitchFamily="18" charset="0"/>
+                        <a:ea typeface="標楷體" panose="03000509000000000000" pitchFamily="65" charset="-120"/>
+                        <a:cs typeface="Times New Roman" panose="02020603050405020304" pitchFamily="18" charset="0"/>
+                      </a:endParaRPr>
+                    </a:p>
+                  </a:txBody>
+                  <a:tcPr anchor="ctr"/>
+                </a:tc>
+                <a:tc>
+                  <a:txBody>
+                    <a:bodyPr/>
+                    <a:lstStyle/>
+                    <a:p>
+                      <a:pPr algn="ctr"/>
+                      <a:r>
+                        <a:rPr lang="en-US" altLang="zh-CN">
+                          <a:latin typeface="Times New Roman" panose="02020603050405020304" pitchFamily="18" charset="0"/>
+                          <a:ea typeface="標楷體" panose="03000509000000000000" pitchFamily="65" charset="-120"/>
+                          <a:cs typeface="Times New Roman" panose="02020603050405020304" pitchFamily="18" charset="0"/>
+                        </a:rPr>
+                        <a:t>B1-2</a:t>
+                      </a:r>
+                      <a:endParaRPr lang="zh-TW" altLang="en-US" dirty="0">
+                        <a:latin typeface="Times New Roman" panose="02020603050405020304" pitchFamily="18" charset="0"/>
+                        <a:ea typeface="標楷體" panose="03000509000000000000" pitchFamily="65" charset="-120"/>
+                        <a:cs typeface="Times New Roman" panose="02020603050405020304" pitchFamily="18" charset="0"/>
+                      </a:endParaRPr>
+                    </a:p>
+                  </a:txBody>
+                  <a:tcPr anchor="ctr"/>
+                </a:tc>
+                <a:tc>
+                  <a:txBody>
+                    <a:bodyPr/>
+                    <a:lstStyle/>
+                    <a:p>
+                      <a:pPr algn="ctr"/>
+                      <a:r>
+                        <a:rPr lang="en-US" altLang="zh-CN">
+                          <a:latin typeface="Times New Roman" panose="02020603050405020304" pitchFamily="18" charset="0"/>
+                          <a:ea typeface="標楷體" panose="03000509000000000000" pitchFamily="65" charset="-120"/>
+                          <a:cs typeface="Times New Roman" panose="02020603050405020304" pitchFamily="18" charset="0"/>
+                        </a:rPr>
+                        <a:t>B2-2</a:t>
+                      </a:r>
+                      <a:endParaRPr lang="zh-TW" altLang="en-US" dirty="0">
+                        <a:latin typeface="Times New Roman" panose="02020603050405020304" pitchFamily="18" charset="0"/>
+                        <a:ea typeface="標楷體" panose="03000509000000000000" pitchFamily="65" charset="-120"/>
+                        <a:cs typeface="Times New Roman" panose="02020603050405020304" pitchFamily="18" charset="0"/>
+                      </a:endParaRPr>
+                    </a:p>
+                  </a:txBody>
+                  <a:tcPr anchor="ctr"/>
+                </a:tc>
+                <a:extLst>
+                  <a:ext uri="{0D108BD9-81ED-4DB2-BD59-A6C34878D82A}">
+                    <a16:rowId xmlns:a16="http://schemas.microsoft.com/office/drawing/2014/main" val="10007"/>
                   </a:ext>
                 </a:extLst>
               </a:tr>
@@ -11948,7 +10842,7 @@
     </p:spTree>
     <p:extLst>
       <p:ext uri="{BB962C8B-B14F-4D97-AF65-F5344CB8AC3E}">
-        <p14:creationId xmlns:p14="http://schemas.microsoft.com/office/powerpoint/2010/main" val="3049125031"/>
+        <p14:creationId xmlns:p14="http://schemas.microsoft.com/office/powerpoint/2010/main" val="2149375605"/>
       </p:ext>
     </p:extLst>
   </p:cSld>
@@ -12089,7 +10983,7 @@
               <a:t>-</a:t>
             </a:r>
             <a:r>
-              <a:rPr lang="zh-CN" altLang="en-US" b="1" dirty="0">
+              <a:rPr lang="zh-CN" altLang="en-US" b="1">
                 <a:solidFill>
                   <a:srgbClr val="000000"/>
                 </a:solidFill>
@@ -12121,11 +11015,17 @@
           <p:cNvGraphicFramePr>
             <a:graphicFrameLocks noGrp="1"/>
           </p:cNvGraphicFramePr>
-          <p:nvPr/>
+          <p:nvPr>
+            <p:extLst>
+              <p:ext uri="{D42A27DB-BD31-4B8C-83A1-F6EECF244321}">
+                <p14:modId xmlns:p14="http://schemas.microsoft.com/office/powerpoint/2010/main" val="3020575749"/>
+              </p:ext>
+            </p:extLst>
+          </p:nvPr>
         </p:nvGraphicFramePr>
         <p:xfrm>
-          <a:off x="29029" y="573948"/>
-          <a:ext cx="11887201" cy="6163047"/>
+          <a:off x="136609" y="573948"/>
+          <a:ext cx="11887199" cy="6163047"/>
         </p:xfrm>
         <a:graphic>
           <a:graphicData uri="http://schemas.openxmlformats.org/drawingml/2006/table">
@@ -12141,34 +11041,55 @@
                     </a:ext>
                   </a:extLst>
                 </a:gridCol>
-                <a:gridCol w="1132114">
+                <a:gridCol w="1632320">
                   <a:extLst>
                     <a:ext uri="{9D8B030D-6E8A-4147-A177-3AD203B41FA5}">
                       <a16:colId xmlns:a16="http://schemas.microsoft.com/office/drawing/2014/main" val="20001"/>
                     </a:ext>
                   </a:extLst>
                 </a:gridCol>
-                <a:gridCol w="3425372">
+                <a:gridCol w="1629318">
                   <a:extLst>
                     <a:ext uri="{9D8B030D-6E8A-4147-A177-3AD203B41FA5}">
                       <a16:colId xmlns:a16="http://schemas.microsoft.com/office/drawing/2014/main" val="20002"/>
                     </a:ext>
                   </a:extLst>
                 </a:gridCol>
-                <a:gridCol w="3425372">
+                <a:gridCol w="1629318">
+                  <a:extLst>
+                    <a:ext uri="{9D8B030D-6E8A-4147-A177-3AD203B41FA5}">
+                      <a16:colId xmlns:a16="http://schemas.microsoft.com/office/drawing/2014/main" val="3795221645"/>
+                    </a:ext>
+                  </a:extLst>
+                </a:gridCol>
+                <a:gridCol w="1629318">
                   <a:extLst>
                     <a:ext uri="{9D8B030D-6E8A-4147-A177-3AD203B41FA5}">
                       <a16:colId xmlns:a16="http://schemas.microsoft.com/office/drawing/2014/main" val="20003"/>
                     </a:ext>
                   </a:extLst>
                 </a:gridCol>
-                <a:gridCol w="3425372">
+                <a:gridCol w="1629318">
+                  <a:extLst>
+                    <a:ext uri="{9D8B030D-6E8A-4147-A177-3AD203B41FA5}">
+                      <a16:colId xmlns:a16="http://schemas.microsoft.com/office/drawing/2014/main" val="3614160323"/>
+                    </a:ext>
+                  </a:extLst>
+                </a:gridCol>
+                <a:gridCol w="1629318">
                   <a:extLst>
                     <a:ext uri="{9D8B030D-6E8A-4147-A177-3AD203B41FA5}">
                       <a16:colId xmlns:a16="http://schemas.microsoft.com/office/drawing/2014/main" val="20004"/>
                     </a:ext>
                   </a:extLst>
                 </a:gridCol>
+                <a:gridCol w="1629318">
+                  <a:extLst>
+                    <a:ext uri="{9D8B030D-6E8A-4147-A177-3AD203B41FA5}">
+                      <a16:colId xmlns:a16="http://schemas.microsoft.com/office/drawing/2014/main" val="3542158680"/>
+                    </a:ext>
+                  </a:extLst>
+                </a:gridCol>
               </a:tblGrid>
               <a:tr h="398930">
                 <a:tc gridSpan="2">
@@ -12204,7 +11125,7 @@
                   </a:txBody>
                   <a:tcPr/>
                 </a:tc>
-                <a:tc gridSpan="3">
+                <a:tc gridSpan="6">
                   <a:txBody>
                     <a:bodyPr/>
                     <a:lstStyle/>
@@ -12216,19 +11137,34 @@
                           <a:ea typeface="標楷體" panose="03000509000000000000" pitchFamily="65" charset="-120"/>
                           <a:cs typeface="Times New Roman" panose="02020603050405020304" pitchFamily="18" charset="0"/>
                         </a:rPr>
-                        <a:t>XRD</a:t>
-                      </a:r>
-                      <a:r>
-                        <a:rPr lang="zh-CN" altLang="en-US" b="1">
-                          <a:latin typeface="Times New Roman" panose="02020603050405020304" pitchFamily="18" charset="0"/>
-                          <a:ea typeface="標楷體" panose="03000509000000000000" pitchFamily="65" charset="-120"/>
-                          <a:cs typeface="Times New Roman" panose="02020603050405020304" pitchFamily="18" charset="0"/>
-                        </a:rPr>
-                        <a:t>表面分析</a:t>
-                      </a:r>
-                    </a:p>
-                  </a:txBody>
-                  <a:tcPr anchor="ctr"/>
+                        <a:t>SEM</a:t>
+                      </a:r>
+                      <a:r>
+                        <a:rPr lang="zh-TW" altLang="en-US" b="1">
+                          <a:latin typeface="Times New Roman" panose="02020603050405020304" pitchFamily="18" charset="0"/>
+                          <a:ea typeface="標楷體" panose="03000509000000000000" pitchFamily="65" charset="-120"/>
+                          <a:cs typeface="Times New Roman" panose="02020603050405020304" pitchFamily="18" charset="0"/>
+                        </a:rPr>
+                        <a:t>相比例</a:t>
+                      </a:r>
+                      <a:endParaRPr lang="zh-TW" altLang="en-US" b="1" dirty="0">
+                        <a:latin typeface="Times New Roman" panose="02020603050405020304" pitchFamily="18" charset="0"/>
+                        <a:ea typeface="標楷體" panose="03000509000000000000" pitchFamily="65" charset="-120"/>
+                        <a:cs typeface="Times New Roman" panose="02020603050405020304" pitchFamily="18" charset="0"/>
+                      </a:endParaRPr>
+                    </a:p>
+                  </a:txBody>
+                  <a:tcPr anchor="ctr"/>
+                </a:tc>
+                <a:tc hMerge="1">
+                  <a:txBody>
+                    <a:bodyPr/>
+                    <a:lstStyle/>
+                    <a:p>
+                      <a:endParaRPr lang="en-US"/>
+                    </a:p>
+                  </a:txBody>
+                  <a:tcPr/>
                 </a:tc>
                 <a:tc hMerge="1">
                   <a:txBody>
@@ -12246,11 +11182,31 @@
                     <a:bodyPr/>
                     <a:lstStyle/>
                     <a:p>
+                      <a:endParaRPr lang="en-US"/>
+                    </a:p>
+                  </a:txBody>
+                  <a:tcPr/>
+                </a:tc>
+                <a:tc hMerge="1">
+                  <a:txBody>
+                    <a:bodyPr/>
+                    <a:lstStyle/>
+                    <a:p>
                       <a:pPr algn="ctr"/>
                       <a:endParaRPr lang="zh-TW" altLang="en-US" dirty="0"/>
                     </a:p>
                   </a:txBody>
                   <a:tcPr anchor="ctr"/>
+                </a:tc>
+                <a:tc hMerge="1">
+                  <a:txBody>
+                    <a:bodyPr/>
+                    <a:lstStyle/>
+                    <a:p>
+                      <a:endParaRPr lang="en-US"/>
+                    </a:p>
+                  </a:txBody>
+                  <a:tcPr/>
                 </a:tc>
                 <a:extLst>
                   <a:ext uri="{0D108BD9-81ED-4DB2-BD59-A6C34878D82A}">
@@ -12292,7 +11248,7 @@
                   </a:txBody>
                   <a:tcPr/>
                 </a:tc>
-                <a:tc>
+                <a:tc gridSpan="2">
                   <a:txBody>
                     <a:bodyPr/>
                     <a:lstStyle/>
@@ -12331,7 +11287,17 @@
                   </a:txBody>
                   <a:tcPr anchor="ctr"/>
                 </a:tc>
-                <a:tc>
+                <a:tc hMerge="1">
+                  <a:txBody>
+                    <a:bodyPr/>
+                    <a:lstStyle/>
+                    <a:p>
+                      <a:endParaRPr lang="en-US"/>
+                    </a:p>
+                  </a:txBody>
+                  <a:tcPr/>
+                </a:tc>
+                <a:tc gridSpan="2">
                   <a:txBody>
                     <a:bodyPr/>
                     <a:lstStyle/>
@@ -12370,7 +11336,17 @@
                   </a:txBody>
                   <a:tcPr anchor="ctr"/>
                 </a:tc>
-                <a:tc>
+                <a:tc hMerge="1">
+                  <a:txBody>
+                    <a:bodyPr/>
+                    <a:lstStyle/>
+                    <a:p>
+                      <a:endParaRPr lang="en-US"/>
+                    </a:p>
+                  </a:txBody>
+                  <a:tcPr/>
+                </a:tc>
+                <a:tc gridSpan="2">
                   <a:txBody>
                     <a:bodyPr/>
                     <a:lstStyle/>
@@ -12409,14 +11385,24 @@
                   </a:txBody>
                   <a:tcPr anchor="ctr"/>
                 </a:tc>
+                <a:tc hMerge="1">
+                  <a:txBody>
+                    <a:bodyPr/>
+                    <a:lstStyle/>
+                    <a:p>
+                      <a:endParaRPr lang="en-US"/>
+                    </a:p>
+                  </a:txBody>
+                  <a:tcPr/>
+                </a:tc>
                 <a:extLst>
                   <a:ext uri="{0D108BD9-81ED-4DB2-BD59-A6C34878D82A}">
                     <a16:rowId xmlns:a16="http://schemas.microsoft.com/office/drawing/2014/main" val="10001"/>
                   </a:ext>
                 </a:extLst>
               </a:tr>
-              <a:tr h="2678087">
-                <a:tc>
+              <a:tr h="1946567">
+                <a:tc rowSpan="3">
                   <a:txBody>
                     <a:bodyPr/>
                     <a:lstStyle/>
@@ -12494,7 +11480,7 @@
                   </a:txBody>
                   <a:tcPr anchor="ctr"/>
                 </a:tc>
-                <a:tc>
+                <a:tc gridSpan="2">
                   <a:txBody>
                     <a:bodyPr/>
                     <a:lstStyle/>
@@ -12517,7 +11503,17 @@
                   </a:txBody>
                   <a:tcPr anchor="ctr"/>
                 </a:tc>
-                <a:tc>
+                <a:tc hMerge="1">
+                  <a:txBody>
+                    <a:bodyPr/>
+                    <a:lstStyle/>
+                    <a:p>
+                      <a:endParaRPr lang="en-US"/>
+                    </a:p>
+                  </a:txBody>
+                  <a:tcPr/>
+                </a:tc>
+                <a:tc gridSpan="2">
                   <a:txBody>
                     <a:bodyPr/>
                     <a:lstStyle/>
@@ -12532,7 +11528,17 @@
                   </a:txBody>
                   <a:tcPr anchor="ctr"/>
                 </a:tc>
-                <a:tc>
+                <a:tc hMerge="1">
+                  <a:txBody>
+                    <a:bodyPr/>
+                    <a:lstStyle/>
+                    <a:p>
+                      <a:endParaRPr lang="en-US"/>
+                    </a:p>
+                  </a:txBody>
+                  <a:tcPr/>
+                </a:tc>
+                <a:tc gridSpan="2">
                   <a:txBody>
                     <a:bodyPr/>
                     <a:lstStyle/>
@@ -12546,6 +11552,16 @@
                     </a:p>
                   </a:txBody>
                   <a:tcPr anchor="ctr"/>
+                </a:tc>
+                <a:tc hMerge="1">
+                  <a:txBody>
+                    <a:bodyPr/>
+                    <a:lstStyle/>
+                    <a:p>
+                      <a:endParaRPr lang="en-US"/>
+                    </a:p>
+                  </a:txBody>
+                  <a:tcPr/>
                 </a:tc>
                 <a:extLst>
                   <a:ext uri="{0D108BD9-81ED-4DB2-BD59-A6C34878D82A}">
@@ -12553,8 +11569,8 @@
                   </a:ext>
                 </a:extLst>
               </a:tr>
-              <a:tr h="2687100">
-                <a:tc>
+              <a:tr h="365760">
+                <a:tc vMerge="1">
                   <a:txBody>
                     <a:bodyPr/>
                     <a:lstStyle/>
@@ -12576,24 +11592,184 @@
                         <a:tabLst/>
                         <a:defRPr/>
                       </a:pPr>
+                      <a:endParaRPr lang="zh-TW" altLang="en-US" dirty="0">
+                        <a:latin typeface="Times New Roman" panose="02020603050405020304" pitchFamily="18" charset="0"/>
+                        <a:ea typeface="標楷體" panose="03000509000000000000" pitchFamily="65" charset="-120"/>
+                        <a:cs typeface="Times New Roman" panose="02020603050405020304" pitchFamily="18" charset="0"/>
+                      </a:endParaRPr>
+                    </a:p>
+                  </a:txBody>
+                  <a:tcPr anchor="ctr"/>
+                </a:tc>
+                <a:tc>
+                  <a:txBody>
+                    <a:bodyPr/>
+                    <a:lstStyle/>
+                    <a:p>
+                      <a:pPr algn="ctr"/>
                       <a:r>
                         <a:rPr lang="zh-CN" altLang="en-US" dirty="0">
                           <a:latin typeface="Times New Roman" panose="02020603050405020304" pitchFamily="18" charset="0"/>
                           <a:ea typeface="標楷體" panose="03000509000000000000" pitchFamily="65" charset="-120"/>
                           <a:cs typeface="Times New Roman" panose="02020603050405020304" pitchFamily="18" charset="0"/>
                         </a:rPr>
-                        <a:t>下表面</a:t>
-                      </a:r>
-                      <a:endParaRPr lang="zh-TW" altLang="en-US" dirty="0">
-                        <a:latin typeface="Times New Roman" panose="02020603050405020304" pitchFamily="18" charset="0"/>
-                        <a:ea typeface="標楷體" panose="03000509000000000000" pitchFamily="65" charset="-120"/>
-                        <a:cs typeface="Times New Roman" panose="02020603050405020304" pitchFamily="18" charset="0"/>
-                      </a:endParaRPr>
-                    </a:p>
-                  </a:txBody>
-                  <a:tcPr anchor="ctr"/>
-                </a:tc>
-                <a:tc>
+                        <a:t>顏色</a:t>
+                      </a:r>
+                      <a:endParaRPr lang="zh-TW" altLang="en-US" dirty="0">
+                        <a:latin typeface="Times New Roman" panose="02020603050405020304" pitchFamily="18" charset="0"/>
+                        <a:ea typeface="標楷體" panose="03000509000000000000" pitchFamily="65" charset="-120"/>
+                        <a:cs typeface="Times New Roman" panose="02020603050405020304" pitchFamily="18" charset="0"/>
+                      </a:endParaRPr>
+                    </a:p>
+                  </a:txBody>
+                  <a:tcPr anchor="ctr"/>
+                </a:tc>
+                <a:tc>
+                  <a:txBody>
+                    <a:bodyPr/>
+                    <a:lstStyle/>
+                    <a:p>
+                      <a:pPr algn="ctr"/>
+                      <a:r>
+                        <a:rPr lang="zh-CN" altLang="en-US" dirty="0">
+                          <a:latin typeface="Times New Roman" panose="02020603050405020304" pitchFamily="18" charset="0"/>
+                          <a:ea typeface="標楷體" panose="03000509000000000000" pitchFamily="65" charset="-120"/>
+                          <a:cs typeface="Times New Roman" panose="02020603050405020304" pitchFamily="18" charset="0"/>
+                        </a:rPr>
+                        <a:t>白色</a:t>
+                      </a:r>
+                      <a:endParaRPr lang="zh-TW" altLang="en-US" dirty="0">
+                        <a:latin typeface="Times New Roman" panose="02020603050405020304" pitchFamily="18" charset="0"/>
+                        <a:ea typeface="標楷體" panose="03000509000000000000" pitchFamily="65" charset="-120"/>
+                        <a:cs typeface="Times New Roman" panose="02020603050405020304" pitchFamily="18" charset="0"/>
+                      </a:endParaRPr>
+                    </a:p>
+                  </a:txBody>
+                  <a:tcPr anchor="ctr"/>
+                </a:tc>
+                <a:tc>
+                  <a:txBody>
+                    <a:bodyPr/>
+                    <a:lstStyle/>
+                    <a:p>
+                      <a:pPr algn="ctr"/>
+                      <a:r>
+                        <a:rPr lang="zh-CN" altLang="en-US" dirty="0">
+                          <a:latin typeface="Times New Roman" panose="02020603050405020304" pitchFamily="18" charset="0"/>
+                          <a:ea typeface="標楷體" panose="03000509000000000000" pitchFamily="65" charset="-120"/>
+                          <a:cs typeface="Times New Roman" panose="02020603050405020304" pitchFamily="18" charset="0"/>
+                        </a:rPr>
+                        <a:t>灰色</a:t>
+                      </a:r>
+                      <a:endParaRPr lang="zh-TW" altLang="en-US" dirty="0">
+                        <a:latin typeface="Times New Roman" panose="02020603050405020304" pitchFamily="18" charset="0"/>
+                        <a:ea typeface="標楷體" panose="03000509000000000000" pitchFamily="65" charset="-120"/>
+                        <a:cs typeface="Times New Roman" panose="02020603050405020304" pitchFamily="18" charset="0"/>
+                      </a:endParaRPr>
+                    </a:p>
+                  </a:txBody>
+                  <a:tcPr anchor="ctr"/>
+                </a:tc>
+                <a:tc>
+                  <a:txBody>
+                    <a:bodyPr/>
+                    <a:lstStyle/>
+                    <a:p>
+                      <a:pPr algn="ctr"/>
+                      <a:r>
+                        <a:rPr lang="zh-CN" altLang="en-US" dirty="0">
+                          <a:latin typeface="Times New Roman" panose="02020603050405020304" pitchFamily="18" charset="0"/>
+                          <a:ea typeface="標楷體" panose="03000509000000000000" pitchFamily="65" charset="-120"/>
+                          <a:cs typeface="Times New Roman" panose="02020603050405020304" pitchFamily="18" charset="0"/>
+                        </a:rPr>
+                        <a:t>白色</a:t>
+                      </a:r>
+                      <a:endParaRPr lang="zh-TW" altLang="en-US" dirty="0">
+                        <a:latin typeface="Times New Roman" panose="02020603050405020304" pitchFamily="18" charset="0"/>
+                        <a:ea typeface="標楷體" panose="03000509000000000000" pitchFamily="65" charset="-120"/>
+                        <a:cs typeface="Times New Roman" panose="02020603050405020304" pitchFamily="18" charset="0"/>
+                      </a:endParaRPr>
+                    </a:p>
+                  </a:txBody>
+                  <a:tcPr anchor="ctr"/>
+                </a:tc>
+                <a:tc>
+                  <a:txBody>
+                    <a:bodyPr/>
+                    <a:lstStyle/>
+                    <a:p>
+                      <a:pPr algn="ctr"/>
+                      <a:r>
+                        <a:rPr lang="zh-CN" altLang="en-US" dirty="0">
+                          <a:latin typeface="Times New Roman" panose="02020603050405020304" pitchFamily="18" charset="0"/>
+                          <a:ea typeface="標楷體" panose="03000509000000000000" pitchFamily="65" charset="-120"/>
+                          <a:cs typeface="Times New Roman" panose="02020603050405020304" pitchFamily="18" charset="0"/>
+                        </a:rPr>
+                        <a:t>灰色</a:t>
+                      </a:r>
+                      <a:endParaRPr lang="zh-TW" altLang="en-US" dirty="0">
+                        <a:latin typeface="Times New Roman" panose="02020603050405020304" pitchFamily="18" charset="0"/>
+                        <a:ea typeface="標楷體" panose="03000509000000000000" pitchFamily="65" charset="-120"/>
+                        <a:cs typeface="Times New Roman" panose="02020603050405020304" pitchFamily="18" charset="0"/>
+                      </a:endParaRPr>
+                    </a:p>
+                  </a:txBody>
+                  <a:tcPr anchor="ctr"/>
+                </a:tc>
+                <a:tc>
+                  <a:txBody>
+                    <a:bodyPr/>
+                    <a:lstStyle/>
+                    <a:p>
+                      <a:pPr algn="ctr"/>
+                      <a:r>
+                        <a:rPr lang="zh-CN" altLang="en-US" dirty="0">
+                          <a:latin typeface="Times New Roman" panose="02020603050405020304" pitchFamily="18" charset="0"/>
+                          <a:ea typeface="標楷體" panose="03000509000000000000" pitchFamily="65" charset="-120"/>
+                          <a:cs typeface="Times New Roman" panose="02020603050405020304" pitchFamily="18" charset="0"/>
+                        </a:rPr>
+                        <a:t>白色</a:t>
+                      </a:r>
+                      <a:endParaRPr lang="zh-TW" altLang="en-US" dirty="0">
+                        <a:latin typeface="Times New Roman" panose="02020603050405020304" pitchFamily="18" charset="0"/>
+                        <a:ea typeface="標楷體" panose="03000509000000000000" pitchFamily="65" charset="-120"/>
+                        <a:cs typeface="Times New Roman" panose="02020603050405020304" pitchFamily="18" charset="0"/>
+                      </a:endParaRPr>
+                    </a:p>
+                  </a:txBody>
+                  <a:tcPr anchor="ctr"/>
+                </a:tc>
+                <a:tc>
+                  <a:txBody>
+                    <a:bodyPr/>
+                    <a:lstStyle/>
+                    <a:p>
+                      <a:pPr algn="ctr"/>
+                      <a:r>
+                        <a:rPr lang="zh-CN" altLang="en-US" dirty="0">
+                          <a:latin typeface="Times New Roman" panose="02020603050405020304" pitchFamily="18" charset="0"/>
+                          <a:ea typeface="標楷體" panose="03000509000000000000" pitchFamily="65" charset="-120"/>
+                          <a:cs typeface="Times New Roman" panose="02020603050405020304" pitchFamily="18" charset="0"/>
+                        </a:rPr>
+                        <a:t>灰色</a:t>
+                      </a:r>
+                      <a:endParaRPr lang="zh-TW" altLang="en-US" dirty="0">
+                        <a:latin typeface="Times New Roman" panose="02020603050405020304" pitchFamily="18" charset="0"/>
+                        <a:ea typeface="標楷體" panose="03000509000000000000" pitchFamily="65" charset="-120"/>
+                        <a:cs typeface="Times New Roman" panose="02020603050405020304" pitchFamily="18" charset="0"/>
+                      </a:endParaRPr>
+                    </a:p>
+                  </a:txBody>
+                  <a:tcPr anchor="ctr"/>
+                </a:tc>
+                <a:extLst>
+                  <a:ext uri="{0D108BD9-81ED-4DB2-BD59-A6C34878D82A}">
+                    <a16:rowId xmlns:a16="http://schemas.microsoft.com/office/drawing/2014/main" val="10003"/>
+                  </a:ext>
+                </a:extLst>
+              </a:tr>
+              <a:tr h="365760">
+                <a:tc vMerge="1">
                   <a:txBody>
                     <a:bodyPr/>
                     <a:lstStyle/>
@@ -12615,12 +11791,360 @@
                         <a:tabLst/>
                         <a:defRPr/>
                       </a:pPr>
+                      <a:endParaRPr lang="zh-TW" altLang="en-US" dirty="0">
+                        <a:latin typeface="Times New Roman" panose="02020603050405020304" pitchFamily="18" charset="0"/>
+                        <a:ea typeface="標楷體" panose="03000509000000000000" pitchFamily="65" charset="-120"/>
+                        <a:cs typeface="Times New Roman" panose="02020603050405020304" pitchFamily="18" charset="0"/>
+                      </a:endParaRPr>
+                    </a:p>
+                  </a:txBody>
+                  <a:tcPr anchor="ctr"/>
+                </a:tc>
+                <a:tc>
+                  <a:txBody>
+                    <a:bodyPr/>
+                    <a:lstStyle/>
+                    <a:p>
+                      <a:pPr algn="ctr"/>
+                      <a:r>
+                        <a:rPr lang="zh-CN" altLang="en-US">
+                          <a:latin typeface="Times New Roman" panose="02020603050405020304" pitchFamily="18" charset="0"/>
+                          <a:ea typeface="標楷體" panose="03000509000000000000" pitchFamily="65" charset="-120"/>
+                          <a:cs typeface="Times New Roman" panose="02020603050405020304" pitchFamily="18" charset="0"/>
+                        </a:rPr>
+                        <a:t>相比例</a:t>
+                      </a:r>
+                      <a:r>
+                        <a:rPr lang="vi-VN" altLang="zh-CN">
+                          <a:latin typeface="Times New Roman" panose="02020603050405020304" pitchFamily="18" charset="0"/>
+                          <a:ea typeface="標楷體" panose="03000509000000000000" pitchFamily="65" charset="-120"/>
+                          <a:cs typeface="Times New Roman" panose="02020603050405020304" pitchFamily="18" charset="0"/>
+                        </a:rPr>
+                        <a:t>(%)</a:t>
+                      </a:r>
+                      <a:endParaRPr lang="zh-TW" altLang="en-US" dirty="0">
+                        <a:latin typeface="Times New Roman" panose="02020603050405020304" pitchFamily="18" charset="0"/>
+                        <a:ea typeface="標楷體" panose="03000509000000000000" pitchFamily="65" charset="-120"/>
+                        <a:cs typeface="Times New Roman" panose="02020603050405020304" pitchFamily="18" charset="0"/>
+                      </a:endParaRPr>
+                    </a:p>
+                  </a:txBody>
+                  <a:tcPr anchor="ctr"/>
+                </a:tc>
+                <a:tc>
+                  <a:txBody>
+                    <a:bodyPr/>
+                    <a:lstStyle/>
+                    <a:p>
+                      <a:pPr algn="ctr" fontAlgn="ctr"/>
+                      <a:r>
+                        <a:rPr lang="en-US" altLang="zh-CN" sz="1800" b="0" i="0" u="none" strike="noStrike">
+                          <a:solidFill>
+                            <a:srgbClr val="000000"/>
+                          </a:solidFill>
+                          <a:effectLst/>
+                          <a:latin typeface="Times New Roman" panose="02020603050405020304" pitchFamily="18" charset="0"/>
+                          <a:cs typeface="Times New Roman" panose="02020603050405020304" pitchFamily="18" charset="0"/>
+                        </a:rPr>
+                        <a:t>T0</a:t>
+                      </a:r>
+                      <a:r>
+                        <a:rPr lang="vi-VN" altLang="zh-CN" sz="1800" b="0" i="0" u="none" strike="noStrike">
+                          <a:solidFill>
+                            <a:srgbClr val="000000"/>
+                          </a:solidFill>
+                          <a:effectLst/>
+                          <a:latin typeface="Times New Roman" panose="02020603050405020304" pitchFamily="18" charset="0"/>
+                          <a:cs typeface="Times New Roman" panose="02020603050405020304" pitchFamily="18" charset="0"/>
+                        </a:rPr>
+                        <a:t>-1</a:t>
+                      </a:r>
+                      <a:endParaRPr lang="en-US" altLang="zh-CN" sz="1800" b="0" i="0" u="none" strike="noStrike">
+                        <a:solidFill>
+                          <a:srgbClr val="000000"/>
+                        </a:solidFill>
+                        <a:effectLst/>
+                        <a:latin typeface="Times New Roman" panose="02020603050405020304" pitchFamily="18" charset="0"/>
+                        <a:cs typeface="Times New Roman" panose="02020603050405020304" pitchFamily="18" charset="0"/>
+                      </a:endParaRPr>
+                    </a:p>
+                  </a:txBody>
+                  <a:tcPr marL="9525" marR="9525" marT="9525" marB="0" anchor="ctr"/>
+                </a:tc>
+                <a:tc>
+                  <a:txBody>
+                    <a:bodyPr/>
+                    <a:lstStyle/>
+                    <a:p>
+                      <a:pPr algn="ctr" fontAlgn="ctr"/>
+                      <a:r>
+                        <a:rPr lang="en-US" altLang="zh-CN" sz="1800" b="0" i="0" u="none" strike="noStrike">
+                          <a:solidFill>
+                            <a:srgbClr val="000000"/>
+                          </a:solidFill>
+                          <a:effectLst/>
+                          <a:latin typeface="Times New Roman" panose="02020603050405020304" pitchFamily="18" charset="0"/>
+                          <a:cs typeface="Times New Roman" panose="02020603050405020304" pitchFamily="18" charset="0"/>
+                        </a:rPr>
+                        <a:t>T0</a:t>
+                      </a:r>
+                      <a:r>
+                        <a:rPr lang="vi-VN" altLang="zh-CN" sz="1800" b="0" i="0" u="none" strike="noStrike">
+                          <a:solidFill>
+                            <a:srgbClr val="000000"/>
+                          </a:solidFill>
+                          <a:effectLst/>
+                          <a:latin typeface="Times New Roman" panose="02020603050405020304" pitchFamily="18" charset="0"/>
+                          <a:cs typeface="Times New Roman" panose="02020603050405020304" pitchFamily="18" charset="0"/>
+                        </a:rPr>
+                        <a:t>-2</a:t>
+                      </a:r>
+                      <a:endParaRPr lang="en-US" altLang="zh-CN" sz="1800" b="0" i="0" u="none" strike="noStrike" dirty="0">
+                        <a:solidFill>
+                          <a:srgbClr val="000000"/>
+                        </a:solidFill>
+                        <a:effectLst/>
+                        <a:latin typeface="Times New Roman" panose="02020603050405020304" pitchFamily="18" charset="0"/>
+                        <a:cs typeface="Times New Roman" panose="02020603050405020304" pitchFamily="18" charset="0"/>
+                      </a:endParaRPr>
+                    </a:p>
+                  </a:txBody>
+                  <a:tcPr marL="9525" marR="9525" marT="9525" marB="0" anchor="ctr"/>
+                </a:tc>
+                <a:tc>
+                  <a:txBody>
+                    <a:bodyPr/>
+                    <a:lstStyle/>
+                    <a:p>
+                      <a:pPr algn="ctr" fontAlgn="ctr"/>
+                      <a:r>
+                        <a:rPr lang="en-US" altLang="zh-CN" sz="1800" b="0" i="0" u="none" strike="noStrike">
+                          <a:solidFill>
+                            <a:srgbClr val="000000"/>
+                          </a:solidFill>
+                          <a:effectLst/>
+                          <a:latin typeface="Times New Roman" panose="02020603050405020304" pitchFamily="18" charset="0"/>
+                          <a:cs typeface="Times New Roman" panose="02020603050405020304" pitchFamily="18" charset="0"/>
+                        </a:rPr>
+                        <a:t>T1</a:t>
+                      </a:r>
+                      <a:r>
+                        <a:rPr lang="vi-VN" altLang="zh-CN" sz="1800" b="0" i="0" u="none" strike="noStrike">
+                          <a:solidFill>
+                            <a:srgbClr val="000000"/>
+                          </a:solidFill>
+                          <a:effectLst/>
+                          <a:latin typeface="Times New Roman" panose="02020603050405020304" pitchFamily="18" charset="0"/>
+                          <a:cs typeface="Times New Roman" panose="02020603050405020304" pitchFamily="18" charset="0"/>
+                        </a:rPr>
+                        <a:t>-1</a:t>
+                      </a:r>
+                      <a:endParaRPr lang="en-US" altLang="zh-CN" sz="1800" b="0" i="0" u="none" strike="noStrike">
+                        <a:solidFill>
+                          <a:srgbClr val="000000"/>
+                        </a:solidFill>
+                        <a:effectLst/>
+                        <a:latin typeface="Times New Roman" panose="02020603050405020304" pitchFamily="18" charset="0"/>
+                        <a:cs typeface="Times New Roman" panose="02020603050405020304" pitchFamily="18" charset="0"/>
+                      </a:endParaRPr>
+                    </a:p>
+                  </a:txBody>
+                  <a:tcPr marL="9525" marR="9525" marT="9525" marB="0" anchor="ctr"/>
+                </a:tc>
+                <a:tc>
+                  <a:txBody>
+                    <a:bodyPr/>
+                    <a:lstStyle/>
+                    <a:p>
+                      <a:pPr algn="ctr" fontAlgn="ctr"/>
+                      <a:r>
+                        <a:rPr lang="en-US" altLang="zh-CN" sz="1800" b="0" i="0" u="none" strike="noStrike">
+                          <a:solidFill>
+                            <a:srgbClr val="000000"/>
+                          </a:solidFill>
+                          <a:effectLst/>
+                          <a:latin typeface="Times New Roman" panose="02020603050405020304" pitchFamily="18" charset="0"/>
+                          <a:cs typeface="Times New Roman" panose="02020603050405020304" pitchFamily="18" charset="0"/>
+                        </a:rPr>
+                        <a:t>T1</a:t>
+                      </a:r>
+                      <a:r>
+                        <a:rPr lang="vi-VN" altLang="zh-CN" sz="1800" b="0" i="0" u="none" strike="noStrike">
+                          <a:solidFill>
+                            <a:srgbClr val="000000"/>
+                          </a:solidFill>
+                          <a:effectLst/>
+                          <a:latin typeface="Times New Roman" panose="02020603050405020304" pitchFamily="18" charset="0"/>
+                          <a:cs typeface="Times New Roman" panose="02020603050405020304" pitchFamily="18" charset="0"/>
+                        </a:rPr>
+                        <a:t>-2</a:t>
+                      </a:r>
+                      <a:endParaRPr lang="en-US" altLang="zh-CN" sz="1800" b="0" i="0" u="none" strike="noStrike" dirty="0">
+                        <a:solidFill>
+                          <a:srgbClr val="000000"/>
+                        </a:solidFill>
+                        <a:effectLst/>
+                        <a:latin typeface="Times New Roman" panose="02020603050405020304" pitchFamily="18" charset="0"/>
+                        <a:cs typeface="Times New Roman" panose="02020603050405020304" pitchFamily="18" charset="0"/>
+                      </a:endParaRPr>
+                    </a:p>
+                  </a:txBody>
+                  <a:tcPr marL="9525" marR="9525" marT="9525" marB="0" anchor="ctr"/>
+                </a:tc>
+                <a:tc>
+                  <a:txBody>
+                    <a:bodyPr/>
+                    <a:lstStyle/>
+                    <a:p>
+                      <a:pPr algn="ctr" fontAlgn="ctr"/>
+                      <a:r>
+                        <a:rPr lang="en-US" altLang="zh-CN" sz="1800" b="0" i="0" u="none" strike="noStrike">
+                          <a:solidFill>
+                            <a:srgbClr val="000000"/>
+                          </a:solidFill>
+                          <a:effectLst/>
+                          <a:latin typeface="Times New Roman" panose="02020603050405020304" pitchFamily="18" charset="0"/>
+                          <a:cs typeface="Times New Roman" panose="02020603050405020304" pitchFamily="18" charset="0"/>
+                        </a:rPr>
+                        <a:t>T2</a:t>
+                      </a:r>
+                      <a:r>
+                        <a:rPr lang="vi-VN" altLang="zh-CN" sz="1800" b="0" i="0" u="none" strike="noStrike">
+                          <a:solidFill>
+                            <a:srgbClr val="000000"/>
+                          </a:solidFill>
+                          <a:effectLst/>
+                          <a:latin typeface="Times New Roman" panose="02020603050405020304" pitchFamily="18" charset="0"/>
+                          <a:cs typeface="Times New Roman" panose="02020603050405020304" pitchFamily="18" charset="0"/>
+                        </a:rPr>
+                        <a:t>-1</a:t>
+                      </a:r>
+                      <a:endParaRPr lang="en-US" altLang="zh-CN" sz="1800" b="0" i="0" u="none" strike="noStrike">
+                        <a:solidFill>
+                          <a:srgbClr val="000000"/>
+                        </a:solidFill>
+                        <a:effectLst/>
+                        <a:latin typeface="Times New Roman" panose="02020603050405020304" pitchFamily="18" charset="0"/>
+                        <a:cs typeface="Times New Roman" panose="02020603050405020304" pitchFamily="18" charset="0"/>
+                      </a:endParaRPr>
+                    </a:p>
+                  </a:txBody>
+                  <a:tcPr marL="9525" marR="9525" marT="9525" marB="0" anchor="ctr"/>
+                </a:tc>
+                <a:tc>
+                  <a:txBody>
+                    <a:bodyPr/>
+                    <a:lstStyle/>
+                    <a:p>
+                      <a:pPr algn="ctr" fontAlgn="ctr"/>
+                      <a:r>
+                        <a:rPr lang="en-US" altLang="zh-CN" sz="1800" b="0" i="0" u="none" strike="noStrike">
+                          <a:solidFill>
+                            <a:srgbClr val="000000"/>
+                          </a:solidFill>
+                          <a:effectLst/>
+                          <a:latin typeface="Times New Roman" panose="02020603050405020304" pitchFamily="18" charset="0"/>
+                          <a:cs typeface="Times New Roman" panose="02020603050405020304" pitchFamily="18" charset="0"/>
+                        </a:rPr>
+                        <a:t>T2</a:t>
+                      </a:r>
+                      <a:r>
+                        <a:rPr lang="vi-VN" altLang="zh-CN" sz="1800" b="0" i="0" u="none" strike="noStrike">
+                          <a:solidFill>
+                            <a:srgbClr val="000000"/>
+                          </a:solidFill>
+                          <a:effectLst/>
+                          <a:latin typeface="Times New Roman" panose="02020603050405020304" pitchFamily="18" charset="0"/>
+                          <a:cs typeface="Times New Roman" panose="02020603050405020304" pitchFamily="18" charset="0"/>
+                        </a:rPr>
+                        <a:t>-2</a:t>
+                      </a:r>
+                      <a:endParaRPr lang="en-US" altLang="zh-CN" sz="1800" b="0" i="0" u="none" strike="noStrike" dirty="0">
+                        <a:solidFill>
+                          <a:srgbClr val="000000"/>
+                        </a:solidFill>
+                        <a:effectLst/>
+                        <a:latin typeface="Times New Roman" panose="02020603050405020304" pitchFamily="18" charset="0"/>
+                        <a:cs typeface="Times New Roman" panose="02020603050405020304" pitchFamily="18" charset="0"/>
+                      </a:endParaRPr>
+                    </a:p>
+                  </a:txBody>
+                  <a:tcPr marL="9525" marR="9525" marT="9525" marB="0" anchor="ctr"/>
+                </a:tc>
+                <a:extLst>
+                  <a:ext uri="{0D108BD9-81ED-4DB2-BD59-A6C34878D82A}">
+                    <a16:rowId xmlns:a16="http://schemas.microsoft.com/office/drawing/2014/main" val="10004"/>
+                  </a:ext>
+                </a:extLst>
+              </a:tr>
+              <a:tr h="1950908">
+                <a:tc rowSpan="3">
+                  <a:txBody>
+                    <a:bodyPr/>
+                    <a:lstStyle/>
+                    <a:p>
+                      <a:pPr marL="0" marR="0" indent="0" algn="ctr" defTabSz="914400" rtl="0" eaLnBrk="1" fontAlgn="auto" latinLnBrk="0" hangingPunct="1">
+                        <a:lnSpc>
+                          <a:spcPct val="100000"/>
+                        </a:lnSpc>
+                        <a:spcBef>
+                          <a:spcPts val="0"/>
+                        </a:spcBef>
+                        <a:spcAft>
+                          <a:spcPts val="0"/>
+                        </a:spcAft>
+                        <a:buClrTx/>
+                        <a:buSzTx/>
+                        <a:buFontTx/>
+                        <a:buNone/>
+                        <a:tabLst/>
+                        <a:defRPr/>
+                      </a:pPr>
                       <a:r>
                         <a:rPr lang="zh-CN" altLang="en-US" dirty="0">
                           <a:latin typeface="Times New Roman" panose="02020603050405020304" pitchFamily="18" charset="0"/>
                           <a:ea typeface="標楷體" panose="03000509000000000000" pitchFamily="65" charset="-120"/>
                           <a:cs typeface="Times New Roman" panose="02020603050405020304" pitchFamily="18" charset="0"/>
                         </a:rPr>
+                        <a:t>下表面</a:t>
+                      </a:r>
+                      <a:endParaRPr lang="zh-TW" altLang="en-US" dirty="0">
+                        <a:latin typeface="Times New Roman" panose="02020603050405020304" pitchFamily="18" charset="0"/>
+                        <a:ea typeface="標楷體" panose="03000509000000000000" pitchFamily="65" charset="-120"/>
+                        <a:cs typeface="Times New Roman" panose="02020603050405020304" pitchFamily="18" charset="0"/>
+                      </a:endParaRPr>
+                    </a:p>
+                  </a:txBody>
+                  <a:tcPr anchor="ctr"/>
+                </a:tc>
+                <a:tc>
+                  <a:txBody>
+                    <a:bodyPr/>
+                    <a:lstStyle/>
+                    <a:p>
+                      <a:pPr marL="0" marR="0" indent="0" algn="ctr" defTabSz="914400" rtl="0" eaLnBrk="1" fontAlgn="auto" latinLnBrk="0" hangingPunct="1">
+                        <a:lnSpc>
+                          <a:spcPct val="100000"/>
+                        </a:lnSpc>
+                        <a:spcBef>
+                          <a:spcPts val="0"/>
+                        </a:spcBef>
+                        <a:spcAft>
+                          <a:spcPts val="0"/>
+                        </a:spcAft>
+                        <a:buClrTx/>
+                        <a:buSzTx/>
+                        <a:buFontTx/>
+                        <a:buNone/>
+                        <a:tabLst/>
+                        <a:defRPr/>
+                      </a:pPr>
+                      <a:r>
+                        <a:rPr lang="zh-CN" altLang="en-US" dirty="0">
+                          <a:latin typeface="Times New Roman" panose="02020603050405020304" pitchFamily="18" charset="0"/>
+                          <a:ea typeface="標楷體" panose="03000509000000000000" pitchFamily="65" charset="-120"/>
+                          <a:cs typeface="Times New Roman" panose="02020603050405020304" pitchFamily="18" charset="0"/>
+                        </a:rPr>
                         <a:t>照片</a:t>
                       </a:r>
                       <a:endParaRPr lang="zh-TW" altLang="en-US" dirty="0">
@@ -12632,7 +12156,7 @@
                   </a:txBody>
                   <a:tcPr anchor="ctr"/>
                 </a:tc>
-                <a:tc>
+                <a:tc gridSpan="2">
                   <a:txBody>
                     <a:bodyPr/>
                     <a:lstStyle/>
@@ -12711,7 +12235,17 @@
                   </a:txBody>
                   <a:tcPr anchor="ctr"/>
                 </a:tc>
-                <a:tc>
+                <a:tc hMerge="1">
+                  <a:txBody>
+                    <a:bodyPr/>
+                    <a:lstStyle/>
+                    <a:p>
+                      <a:endParaRPr lang="en-US"/>
+                    </a:p>
+                  </a:txBody>
+                  <a:tcPr/>
+                </a:tc>
+                <a:tc gridSpan="2">
                   <a:txBody>
                     <a:bodyPr/>
                     <a:lstStyle/>
@@ -12742,7 +12276,17 @@
                   </a:txBody>
                   <a:tcPr anchor="ctr"/>
                 </a:tc>
-                <a:tc>
+                <a:tc hMerge="1">
+                  <a:txBody>
+                    <a:bodyPr/>
+                    <a:lstStyle/>
+                    <a:p>
+                      <a:endParaRPr lang="en-US"/>
+                    </a:p>
+                  </a:txBody>
+                  <a:tcPr/>
+                </a:tc>
+                <a:tc gridSpan="2">
                   <a:txBody>
                     <a:bodyPr/>
                     <a:lstStyle/>
@@ -12773,9 +12317,519 @@
                   </a:txBody>
                   <a:tcPr anchor="ctr"/>
                 </a:tc>
+                <a:tc hMerge="1">
+                  <a:txBody>
+                    <a:bodyPr/>
+                    <a:lstStyle/>
+                    <a:p>
+                      <a:endParaRPr lang="en-US"/>
+                    </a:p>
+                  </a:txBody>
+                  <a:tcPr/>
+                </a:tc>
                 <a:extLst>
                   <a:ext uri="{0D108BD9-81ED-4DB2-BD59-A6C34878D82A}">
                     <a16:rowId xmlns:a16="http://schemas.microsoft.com/office/drawing/2014/main" val="10005"/>
+                  </a:ext>
+                </a:extLst>
+              </a:tr>
+              <a:tr h="368096">
+                <a:tc vMerge="1">
+                  <a:txBody>
+                    <a:bodyPr/>
+                    <a:lstStyle/>
+                    <a:p>
+                      <a:pPr marL="0" marR="0" indent="0" algn="ctr" defTabSz="914400" rtl="0" eaLnBrk="1" fontAlgn="auto" latinLnBrk="0" hangingPunct="1">
+                        <a:lnSpc>
+                          <a:spcPct val="100000"/>
+                        </a:lnSpc>
+                        <a:spcBef>
+                          <a:spcPts val="0"/>
+                        </a:spcBef>
+                        <a:spcAft>
+                          <a:spcPts val="0"/>
+                        </a:spcAft>
+                        <a:buClrTx/>
+                        <a:buSzTx/>
+                        <a:buFontTx/>
+                        <a:buNone/>
+                        <a:tabLst/>
+                        <a:defRPr/>
+                      </a:pPr>
+                      <a:endParaRPr lang="zh-TW" altLang="en-US" dirty="0">
+                        <a:latin typeface="Times New Roman" panose="02020603050405020304" pitchFamily="18" charset="0"/>
+                        <a:ea typeface="標楷體" panose="03000509000000000000" pitchFamily="65" charset="-120"/>
+                        <a:cs typeface="Times New Roman" panose="02020603050405020304" pitchFamily="18" charset="0"/>
+                      </a:endParaRPr>
+                    </a:p>
+                  </a:txBody>
+                  <a:tcPr anchor="ctr"/>
+                </a:tc>
+                <a:tc>
+                  <a:txBody>
+                    <a:bodyPr/>
+                    <a:lstStyle/>
+                    <a:p>
+                      <a:pPr algn="ctr"/>
+                      <a:r>
+                        <a:rPr lang="zh-CN" altLang="en-US" dirty="0">
+                          <a:latin typeface="Times New Roman" panose="02020603050405020304" pitchFamily="18" charset="0"/>
+                          <a:ea typeface="標楷體" panose="03000509000000000000" pitchFamily="65" charset="-120"/>
+                          <a:cs typeface="Times New Roman" panose="02020603050405020304" pitchFamily="18" charset="0"/>
+                        </a:rPr>
+                        <a:t>顏色</a:t>
+                      </a:r>
+                      <a:endParaRPr lang="zh-TW" altLang="en-US" dirty="0">
+                        <a:latin typeface="Times New Roman" panose="02020603050405020304" pitchFamily="18" charset="0"/>
+                        <a:ea typeface="標楷體" panose="03000509000000000000" pitchFamily="65" charset="-120"/>
+                        <a:cs typeface="Times New Roman" panose="02020603050405020304" pitchFamily="18" charset="0"/>
+                      </a:endParaRPr>
+                    </a:p>
+                  </a:txBody>
+                  <a:tcPr anchor="ctr"/>
+                </a:tc>
+                <a:tc>
+                  <a:txBody>
+                    <a:bodyPr/>
+                    <a:lstStyle/>
+                    <a:p>
+                      <a:pPr algn="ctr"/>
+                      <a:r>
+                        <a:rPr lang="zh-CN" altLang="en-US" dirty="0">
+                          <a:latin typeface="Times New Roman" panose="02020603050405020304" pitchFamily="18" charset="0"/>
+                          <a:ea typeface="標楷體" panose="03000509000000000000" pitchFamily="65" charset="-120"/>
+                          <a:cs typeface="Times New Roman" panose="02020603050405020304" pitchFamily="18" charset="0"/>
+                        </a:rPr>
+                        <a:t>白色</a:t>
+                      </a:r>
+                      <a:endParaRPr lang="zh-TW" altLang="en-US" dirty="0">
+                        <a:latin typeface="Times New Roman" panose="02020603050405020304" pitchFamily="18" charset="0"/>
+                        <a:ea typeface="標楷體" panose="03000509000000000000" pitchFamily="65" charset="-120"/>
+                        <a:cs typeface="Times New Roman" panose="02020603050405020304" pitchFamily="18" charset="0"/>
+                      </a:endParaRPr>
+                    </a:p>
+                  </a:txBody>
+                  <a:tcPr anchor="ctr"/>
+                </a:tc>
+                <a:tc>
+                  <a:txBody>
+                    <a:bodyPr/>
+                    <a:lstStyle/>
+                    <a:p>
+                      <a:pPr algn="ctr"/>
+                      <a:r>
+                        <a:rPr lang="zh-CN" altLang="en-US" dirty="0">
+                          <a:latin typeface="Times New Roman" panose="02020603050405020304" pitchFamily="18" charset="0"/>
+                          <a:ea typeface="標楷體" panose="03000509000000000000" pitchFamily="65" charset="-120"/>
+                          <a:cs typeface="Times New Roman" panose="02020603050405020304" pitchFamily="18" charset="0"/>
+                        </a:rPr>
+                        <a:t>灰色</a:t>
+                      </a:r>
+                      <a:endParaRPr lang="zh-TW" altLang="en-US" dirty="0">
+                        <a:latin typeface="Times New Roman" panose="02020603050405020304" pitchFamily="18" charset="0"/>
+                        <a:ea typeface="標楷體" panose="03000509000000000000" pitchFamily="65" charset="-120"/>
+                        <a:cs typeface="Times New Roman" panose="02020603050405020304" pitchFamily="18" charset="0"/>
+                      </a:endParaRPr>
+                    </a:p>
+                  </a:txBody>
+                  <a:tcPr anchor="ctr"/>
+                </a:tc>
+                <a:tc>
+                  <a:txBody>
+                    <a:bodyPr/>
+                    <a:lstStyle/>
+                    <a:p>
+                      <a:pPr algn="ctr"/>
+                      <a:r>
+                        <a:rPr lang="zh-CN" altLang="en-US" dirty="0">
+                          <a:latin typeface="Times New Roman" panose="02020603050405020304" pitchFamily="18" charset="0"/>
+                          <a:ea typeface="標楷體" panose="03000509000000000000" pitchFamily="65" charset="-120"/>
+                          <a:cs typeface="Times New Roman" panose="02020603050405020304" pitchFamily="18" charset="0"/>
+                        </a:rPr>
+                        <a:t>白色</a:t>
+                      </a:r>
+                      <a:endParaRPr lang="zh-TW" altLang="en-US" dirty="0">
+                        <a:latin typeface="Times New Roman" panose="02020603050405020304" pitchFamily="18" charset="0"/>
+                        <a:ea typeface="標楷體" panose="03000509000000000000" pitchFamily="65" charset="-120"/>
+                        <a:cs typeface="Times New Roman" panose="02020603050405020304" pitchFamily="18" charset="0"/>
+                      </a:endParaRPr>
+                    </a:p>
+                  </a:txBody>
+                  <a:tcPr anchor="ctr"/>
+                </a:tc>
+                <a:tc>
+                  <a:txBody>
+                    <a:bodyPr/>
+                    <a:lstStyle/>
+                    <a:p>
+                      <a:pPr algn="ctr"/>
+                      <a:r>
+                        <a:rPr lang="zh-CN" altLang="en-US" dirty="0">
+                          <a:latin typeface="Times New Roman" panose="02020603050405020304" pitchFamily="18" charset="0"/>
+                          <a:ea typeface="標楷體" panose="03000509000000000000" pitchFamily="65" charset="-120"/>
+                          <a:cs typeface="Times New Roman" panose="02020603050405020304" pitchFamily="18" charset="0"/>
+                        </a:rPr>
+                        <a:t>灰色</a:t>
+                      </a:r>
+                      <a:endParaRPr lang="zh-TW" altLang="en-US" dirty="0">
+                        <a:latin typeface="Times New Roman" panose="02020603050405020304" pitchFamily="18" charset="0"/>
+                        <a:ea typeface="標楷體" panose="03000509000000000000" pitchFamily="65" charset="-120"/>
+                        <a:cs typeface="Times New Roman" panose="02020603050405020304" pitchFamily="18" charset="0"/>
+                      </a:endParaRPr>
+                    </a:p>
+                  </a:txBody>
+                  <a:tcPr anchor="ctr"/>
+                </a:tc>
+                <a:tc>
+                  <a:txBody>
+                    <a:bodyPr/>
+                    <a:lstStyle/>
+                    <a:p>
+                      <a:pPr algn="ctr"/>
+                      <a:r>
+                        <a:rPr lang="zh-CN" altLang="en-US" dirty="0">
+                          <a:latin typeface="Times New Roman" panose="02020603050405020304" pitchFamily="18" charset="0"/>
+                          <a:ea typeface="標楷體" panose="03000509000000000000" pitchFamily="65" charset="-120"/>
+                          <a:cs typeface="Times New Roman" panose="02020603050405020304" pitchFamily="18" charset="0"/>
+                        </a:rPr>
+                        <a:t>白色</a:t>
+                      </a:r>
+                      <a:endParaRPr lang="zh-TW" altLang="en-US" dirty="0">
+                        <a:latin typeface="Times New Roman" panose="02020603050405020304" pitchFamily="18" charset="0"/>
+                        <a:ea typeface="標楷體" panose="03000509000000000000" pitchFamily="65" charset="-120"/>
+                        <a:cs typeface="Times New Roman" panose="02020603050405020304" pitchFamily="18" charset="0"/>
+                      </a:endParaRPr>
+                    </a:p>
+                  </a:txBody>
+                  <a:tcPr anchor="ctr"/>
+                </a:tc>
+                <a:tc>
+                  <a:txBody>
+                    <a:bodyPr/>
+                    <a:lstStyle/>
+                    <a:p>
+                      <a:pPr algn="ctr"/>
+                      <a:r>
+                        <a:rPr lang="zh-CN" altLang="en-US" dirty="0">
+                          <a:latin typeface="Times New Roman" panose="02020603050405020304" pitchFamily="18" charset="0"/>
+                          <a:ea typeface="標楷體" panose="03000509000000000000" pitchFamily="65" charset="-120"/>
+                          <a:cs typeface="Times New Roman" panose="02020603050405020304" pitchFamily="18" charset="0"/>
+                        </a:rPr>
+                        <a:t>灰色</a:t>
+                      </a:r>
+                      <a:endParaRPr lang="zh-TW" altLang="en-US" dirty="0">
+                        <a:latin typeface="Times New Roman" panose="02020603050405020304" pitchFamily="18" charset="0"/>
+                        <a:ea typeface="標楷體" panose="03000509000000000000" pitchFamily="65" charset="-120"/>
+                        <a:cs typeface="Times New Roman" panose="02020603050405020304" pitchFamily="18" charset="0"/>
+                      </a:endParaRPr>
+                    </a:p>
+                  </a:txBody>
+                  <a:tcPr anchor="ctr"/>
+                </a:tc>
+                <a:extLst>
+                  <a:ext uri="{0D108BD9-81ED-4DB2-BD59-A6C34878D82A}">
+                    <a16:rowId xmlns:a16="http://schemas.microsoft.com/office/drawing/2014/main" val="10006"/>
+                  </a:ext>
+                </a:extLst>
+              </a:tr>
+              <a:tr h="368096">
+                <a:tc vMerge="1">
+                  <a:txBody>
+                    <a:bodyPr/>
+                    <a:lstStyle/>
+                    <a:p>
+                      <a:pPr marL="0" marR="0" indent="0" algn="ctr" defTabSz="914400" rtl="0" eaLnBrk="1" fontAlgn="auto" latinLnBrk="0" hangingPunct="1">
+                        <a:lnSpc>
+                          <a:spcPct val="100000"/>
+                        </a:lnSpc>
+                        <a:spcBef>
+                          <a:spcPts val="0"/>
+                        </a:spcBef>
+                        <a:spcAft>
+                          <a:spcPts val="0"/>
+                        </a:spcAft>
+                        <a:buClrTx/>
+                        <a:buSzTx/>
+                        <a:buFontTx/>
+                        <a:buNone/>
+                        <a:tabLst/>
+                        <a:defRPr/>
+                      </a:pPr>
+                      <a:endParaRPr lang="zh-TW" altLang="en-US" dirty="0">
+                        <a:latin typeface="Times New Roman" panose="02020603050405020304" pitchFamily="18" charset="0"/>
+                        <a:ea typeface="標楷體" panose="03000509000000000000" pitchFamily="65" charset="-120"/>
+                        <a:cs typeface="Times New Roman" panose="02020603050405020304" pitchFamily="18" charset="0"/>
+                      </a:endParaRPr>
+                    </a:p>
+                  </a:txBody>
+                  <a:tcPr anchor="ctr"/>
+                </a:tc>
+                <a:tc>
+                  <a:txBody>
+                    <a:bodyPr/>
+                    <a:lstStyle/>
+                    <a:p>
+                      <a:pPr algn="ctr"/>
+                      <a:r>
+                        <a:rPr lang="zh-CN" altLang="en-US" dirty="0">
+                          <a:latin typeface="Times New Roman" panose="02020603050405020304" pitchFamily="18" charset="0"/>
+                          <a:ea typeface="標楷體" panose="03000509000000000000" pitchFamily="65" charset="-120"/>
+                          <a:cs typeface="Times New Roman" panose="02020603050405020304" pitchFamily="18" charset="0"/>
+                        </a:rPr>
+                        <a:t>相比例</a:t>
+                      </a:r>
+                      <a:endParaRPr lang="zh-TW" altLang="en-US" dirty="0">
+                        <a:latin typeface="Times New Roman" panose="02020603050405020304" pitchFamily="18" charset="0"/>
+                        <a:ea typeface="標楷體" panose="03000509000000000000" pitchFamily="65" charset="-120"/>
+                        <a:cs typeface="Times New Roman" panose="02020603050405020304" pitchFamily="18" charset="0"/>
+                      </a:endParaRPr>
+                    </a:p>
+                  </a:txBody>
+                  <a:tcPr anchor="ctr"/>
+                </a:tc>
+                <a:tc>
+                  <a:txBody>
+                    <a:bodyPr/>
+                    <a:lstStyle/>
+                    <a:p>
+                      <a:pPr algn="ctr" fontAlgn="ctr"/>
+                      <a:r>
+                        <a:rPr lang="en-US" altLang="zh-CN" sz="1800" b="0" i="0" u="none" strike="noStrike">
+                          <a:solidFill>
+                            <a:srgbClr val="000000"/>
+                          </a:solidFill>
+                          <a:effectLst/>
+                          <a:latin typeface="Times New Roman" panose="02020603050405020304" pitchFamily="18" charset="0"/>
+                          <a:cs typeface="Times New Roman" panose="02020603050405020304" pitchFamily="18" charset="0"/>
+                        </a:rPr>
+                        <a:t>B0</a:t>
+                      </a:r>
+                      <a:r>
+                        <a:rPr lang="vi-VN" altLang="zh-CN" sz="1800" b="0" i="0" u="none" strike="noStrike">
+                          <a:solidFill>
+                            <a:srgbClr val="000000"/>
+                          </a:solidFill>
+                          <a:effectLst/>
+                          <a:latin typeface="Times New Roman" panose="02020603050405020304" pitchFamily="18" charset="0"/>
+                          <a:cs typeface="Times New Roman" panose="02020603050405020304" pitchFamily="18" charset="0"/>
+                        </a:rPr>
+                        <a:t>-1</a:t>
+                      </a:r>
+                      <a:endParaRPr lang="en-US" altLang="zh-CN" sz="1800" b="0" i="0" u="none" strike="noStrike">
+                        <a:solidFill>
+                          <a:srgbClr val="000000"/>
+                        </a:solidFill>
+                        <a:effectLst/>
+                        <a:latin typeface="Times New Roman" panose="02020603050405020304" pitchFamily="18" charset="0"/>
+                        <a:cs typeface="Times New Roman" panose="02020603050405020304" pitchFamily="18" charset="0"/>
+                      </a:endParaRPr>
+                    </a:p>
+                  </a:txBody>
+                  <a:tcPr marL="9525" marR="9525" marT="9525" marB="0" anchor="ctr"/>
+                </a:tc>
+                <a:tc>
+                  <a:txBody>
+                    <a:bodyPr/>
+                    <a:lstStyle/>
+                    <a:p>
+                      <a:pPr algn="ctr" fontAlgn="ctr"/>
+                      <a:r>
+                        <a:rPr lang="en-US" altLang="zh-CN" sz="1800" b="0" i="0" u="none" strike="noStrike">
+                          <a:solidFill>
+                            <a:srgbClr val="000000"/>
+                          </a:solidFill>
+                          <a:effectLst/>
+                          <a:latin typeface="Times New Roman" panose="02020603050405020304" pitchFamily="18" charset="0"/>
+                          <a:cs typeface="Times New Roman" panose="02020603050405020304" pitchFamily="18" charset="0"/>
+                        </a:rPr>
+                        <a:t>B0</a:t>
+                      </a:r>
+                      <a:r>
+                        <a:rPr lang="vi-VN" altLang="zh-CN" sz="1800" b="0" i="0" u="none" strike="noStrike">
+                          <a:solidFill>
+                            <a:srgbClr val="000000"/>
+                          </a:solidFill>
+                          <a:effectLst/>
+                          <a:latin typeface="Times New Roman" panose="02020603050405020304" pitchFamily="18" charset="0"/>
+                          <a:cs typeface="Times New Roman" panose="02020603050405020304" pitchFamily="18" charset="0"/>
+                        </a:rPr>
+                        <a:t>-2</a:t>
+                      </a:r>
+                      <a:endParaRPr lang="en-US" altLang="zh-CN" sz="1800" b="0" i="0" u="none" strike="noStrike" dirty="0">
+                        <a:solidFill>
+                          <a:srgbClr val="000000"/>
+                        </a:solidFill>
+                        <a:effectLst/>
+                        <a:latin typeface="Times New Roman" panose="02020603050405020304" pitchFamily="18" charset="0"/>
+                        <a:cs typeface="Times New Roman" panose="02020603050405020304" pitchFamily="18" charset="0"/>
+                      </a:endParaRPr>
+                    </a:p>
+                  </a:txBody>
+                  <a:tcPr marL="9525" marR="9525" marT="9525" marB="0" anchor="ctr"/>
+                </a:tc>
+                <a:tc>
+                  <a:txBody>
+                    <a:bodyPr/>
+                    <a:lstStyle/>
+                    <a:p>
+                      <a:pPr algn="ctr" fontAlgn="ctr"/>
+                      <a:r>
+                        <a:rPr lang="en-US" altLang="zh-CN" sz="1800" b="0" i="0" u="none" strike="noStrike">
+                          <a:solidFill>
+                            <a:srgbClr val="000000"/>
+                          </a:solidFill>
+                          <a:effectLst/>
+                          <a:latin typeface="Times New Roman" panose="02020603050405020304" pitchFamily="18" charset="0"/>
+                          <a:cs typeface="Times New Roman" panose="02020603050405020304" pitchFamily="18" charset="0"/>
+                        </a:rPr>
+                        <a:t>B1</a:t>
+                      </a:r>
+                      <a:r>
+                        <a:rPr lang="vi-VN" altLang="zh-CN" sz="1800" b="0" i="0" u="none" strike="noStrike">
+                          <a:solidFill>
+                            <a:srgbClr val="000000"/>
+                          </a:solidFill>
+                          <a:effectLst/>
+                          <a:latin typeface="Times New Roman" panose="02020603050405020304" pitchFamily="18" charset="0"/>
+                          <a:cs typeface="Times New Roman" panose="02020603050405020304" pitchFamily="18" charset="0"/>
+                        </a:rPr>
+                        <a:t>-1</a:t>
+                      </a:r>
+                      <a:endParaRPr lang="en-US" altLang="zh-CN" sz="1800" b="0" i="0" u="none" strike="noStrike">
+                        <a:solidFill>
+                          <a:srgbClr val="000000"/>
+                        </a:solidFill>
+                        <a:effectLst/>
+                        <a:latin typeface="Times New Roman" panose="02020603050405020304" pitchFamily="18" charset="0"/>
+                        <a:cs typeface="Times New Roman" panose="02020603050405020304" pitchFamily="18" charset="0"/>
+                      </a:endParaRPr>
+                    </a:p>
+                  </a:txBody>
+                  <a:tcPr marL="9525" marR="9525" marT="9525" marB="0" anchor="ctr"/>
+                </a:tc>
+                <a:tc>
+                  <a:txBody>
+                    <a:bodyPr/>
+                    <a:lstStyle/>
+                    <a:p>
+                      <a:pPr algn="ctr" fontAlgn="ctr"/>
+                      <a:r>
+                        <a:rPr lang="en-US" altLang="zh-CN" sz="1800" b="0" i="0" u="none" strike="noStrike">
+                          <a:solidFill>
+                            <a:srgbClr val="000000"/>
+                          </a:solidFill>
+                          <a:effectLst/>
+                          <a:latin typeface="Times New Roman" panose="02020603050405020304" pitchFamily="18" charset="0"/>
+                          <a:cs typeface="Times New Roman" panose="02020603050405020304" pitchFamily="18" charset="0"/>
+                        </a:rPr>
+                        <a:t>B1</a:t>
+                      </a:r>
+                      <a:r>
+                        <a:rPr lang="vi-VN" altLang="zh-CN" sz="1800" b="0" i="0" u="none" strike="noStrike">
+                          <a:solidFill>
+                            <a:srgbClr val="000000"/>
+                          </a:solidFill>
+                          <a:effectLst/>
+                          <a:latin typeface="Times New Roman" panose="02020603050405020304" pitchFamily="18" charset="0"/>
+                          <a:cs typeface="Times New Roman" panose="02020603050405020304" pitchFamily="18" charset="0"/>
+                        </a:rPr>
+                        <a:t>-2</a:t>
+                      </a:r>
+                      <a:endParaRPr lang="en-US" altLang="zh-CN" sz="1800" b="0" i="0" u="none" strike="noStrike" dirty="0">
+                        <a:solidFill>
+                          <a:srgbClr val="000000"/>
+                        </a:solidFill>
+                        <a:effectLst/>
+                        <a:latin typeface="Times New Roman" panose="02020603050405020304" pitchFamily="18" charset="0"/>
+                        <a:cs typeface="Times New Roman" panose="02020603050405020304" pitchFamily="18" charset="0"/>
+                      </a:endParaRPr>
+                    </a:p>
+                  </a:txBody>
+                  <a:tcPr marL="9525" marR="9525" marT="9525" marB="0" anchor="ctr"/>
+                </a:tc>
+                <a:tc>
+                  <a:txBody>
+                    <a:bodyPr/>
+                    <a:lstStyle/>
+                    <a:p>
+                      <a:pPr algn="ctr" fontAlgn="ctr"/>
+                      <a:r>
+                        <a:rPr lang="en-US" altLang="zh-CN" sz="1800" b="0" i="0" u="none" strike="noStrike">
+                          <a:solidFill>
+                            <a:srgbClr val="000000"/>
+                          </a:solidFill>
+                          <a:effectLst/>
+                          <a:latin typeface="Times New Roman" panose="02020603050405020304" pitchFamily="18" charset="0"/>
+                          <a:cs typeface="Times New Roman" panose="02020603050405020304" pitchFamily="18" charset="0"/>
+                        </a:rPr>
+                        <a:t>B2</a:t>
+                      </a:r>
+                      <a:r>
+                        <a:rPr lang="vi-VN" altLang="zh-CN" sz="1800" b="0" i="0" u="none" strike="noStrike">
+                          <a:solidFill>
+                            <a:srgbClr val="000000"/>
+                          </a:solidFill>
+                          <a:effectLst/>
+                          <a:latin typeface="Times New Roman" panose="02020603050405020304" pitchFamily="18" charset="0"/>
+                          <a:cs typeface="Times New Roman" panose="02020603050405020304" pitchFamily="18" charset="0"/>
+                        </a:rPr>
+                        <a:t>-1</a:t>
+                      </a:r>
+                      <a:endParaRPr lang="en-US" altLang="zh-CN" sz="1800" b="0" i="0" u="none" strike="noStrike">
+                        <a:solidFill>
+                          <a:srgbClr val="000000"/>
+                        </a:solidFill>
+                        <a:effectLst/>
+                        <a:latin typeface="Times New Roman" panose="02020603050405020304" pitchFamily="18" charset="0"/>
+                        <a:cs typeface="Times New Roman" panose="02020603050405020304" pitchFamily="18" charset="0"/>
+                      </a:endParaRPr>
+                    </a:p>
+                  </a:txBody>
+                  <a:tcPr marL="9525" marR="9525" marT="9525" marB="0" anchor="ctr"/>
+                </a:tc>
+                <a:tc>
+                  <a:txBody>
+                    <a:bodyPr/>
+                    <a:lstStyle/>
+                    <a:p>
+                      <a:pPr algn="ctr" fontAlgn="ctr"/>
+                      <a:r>
+                        <a:rPr lang="en-US" altLang="zh-CN" sz="1800" b="0" i="0" u="none" strike="noStrike">
+                          <a:solidFill>
+                            <a:srgbClr val="000000"/>
+                          </a:solidFill>
+                          <a:effectLst/>
+                          <a:latin typeface="Times New Roman" panose="02020603050405020304" pitchFamily="18" charset="0"/>
+                          <a:cs typeface="Times New Roman" panose="02020603050405020304" pitchFamily="18" charset="0"/>
+                        </a:rPr>
+                        <a:t>B2</a:t>
+                      </a:r>
+                      <a:r>
+                        <a:rPr lang="vi-VN" altLang="zh-CN" sz="1800" b="0" i="0" u="none" strike="noStrike">
+                          <a:solidFill>
+                            <a:srgbClr val="000000"/>
+                          </a:solidFill>
+                          <a:effectLst/>
+                          <a:latin typeface="Times New Roman" panose="02020603050405020304" pitchFamily="18" charset="0"/>
+                          <a:cs typeface="Times New Roman" panose="02020603050405020304" pitchFamily="18" charset="0"/>
+                        </a:rPr>
+                        <a:t>-2</a:t>
+                      </a:r>
+                      <a:endParaRPr lang="en-US" altLang="zh-CN" sz="1800" b="0" i="0" u="none" strike="noStrike" dirty="0">
+                        <a:solidFill>
+                          <a:srgbClr val="000000"/>
+                        </a:solidFill>
+                        <a:effectLst/>
+                        <a:latin typeface="Times New Roman" panose="02020603050405020304" pitchFamily="18" charset="0"/>
+                        <a:cs typeface="Times New Roman" panose="02020603050405020304" pitchFamily="18" charset="0"/>
+                      </a:endParaRPr>
+                    </a:p>
+                  </a:txBody>
+                  <a:tcPr marL="9525" marR="9525" marT="9525" marB="0" anchor="ctr"/>
+                </a:tc>
+                <a:extLst>
+                  <a:ext uri="{0D108BD9-81ED-4DB2-BD59-A6C34878D82A}">
+                    <a16:rowId xmlns:a16="http://schemas.microsoft.com/office/drawing/2014/main" val="10007"/>
                   </a:ext>
                 </a:extLst>
               </a:tr>
@@ -12786,7 +12840,7 @@
     </p:spTree>
     <p:extLst>
       <p:ext uri="{BB962C8B-B14F-4D97-AF65-F5344CB8AC3E}">
-        <p14:creationId xmlns:p14="http://schemas.microsoft.com/office/powerpoint/2010/main" val="1212513190"/>
+        <p14:creationId xmlns:p14="http://schemas.microsoft.com/office/powerpoint/2010/main" val="2956591765"/>
       </p:ext>
     </p:extLst>
   </p:cSld>

</xml_diff>